<commit_message>
Added VGA sync hardware diagram to the design document. Also, added status of goals to the PowerPoint.
</commit_message>
<xml_diff>
--- a/Project_Presentation/PresentationPong.pptx
+++ b/Project_Presentation/PresentationPong.pptx
@@ -109,7 +109,16 @@
       </a:defRPr>
     </a:lvl9pPr>
   </p:defaultTextStyle>
+  <p:extLst>
+    <p:ext uri="{EFAFB233-063F-42B5-8137-9DF3F51BA10A}">
+      <p15:sldGuideLst xmlns:p15="http://schemas.microsoft.com/office/powerpoint/2012/main"/>
+    </p:ext>
+  </p:extLst>
 </p:presentation>
+</file>
+
+<file path=ppt/revisionInfo.xml><?xml version="1.0" encoding="utf-8"?>
+<p1510:revInfo xmlns:a="http://schemas.openxmlformats.org/drawingml/2006/main" xmlns:r="http://schemas.openxmlformats.org/officeDocument/2006/relationships" xmlns:p1510="http://schemas.microsoft.com/office/powerpoint/2015/10/main"/>
 </file>
 
 <file path=ppt/slideLayouts/slideLayout1.xml><?xml version="1.0" encoding="utf-8"?>
@@ -169,7 +178,7 @@
           <a:noFill/>
           <a:extLst>
             <a:ext uri="{909E8E84-426E-40dd-AFC4-6F175D3DCCD1}">
-              <a14:hiddenFill xmlns:a14="http://schemas.microsoft.com/office/drawing/2010/main" xmlns="">
+              <a14:hiddenFill xmlns="" xmlns:a14="http://schemas.microsoft.com/office/drawing/2010/main">
                 <a:solidFill>
                   <a:srgbClr val="FFFFFF"/>
                 </a:solidFill>
@@ -228,7 +237,7 @@
             </a:ln>
             <a:extLst>
               <a:ext uri="{91240B29-F687-4f45-9708-019B960494DF}">
-                <a14:hiddenLine xmlns:a14="http://schemas.microsoft.com/office/drawing/2010/main" xmlns="" w="9525">
+                <a14:hiddenLine xmlns="" xmlns:a14="http://schemas.microsoft.com/office/drawing/2010/main" w="9525">
                   <a:solidFill>
                     <a:srgbClr val="000000"/>
                   </a:solidFill>
@@ -318,7 +327,7 @@
             </a:ln>
             <a:extLst>
               <a:ext uri="{91240B29-F687-4f45-9708-019B960494DF}">
-                <a14:hiddenLine xmlns:a14="http://schemas.microsoft.com/office/drawing/2010/main" xmlns="" w="9525">
+                <a14:hiddenLine xmlns="" xmlns:a14="http://schemas.microsoft.com/office/drawing/2010/main" w="9525">
                   <a:solidFill>
                     <a:srgbClr val="000000"/>
                   </a:solidFill>
@@ -408,7 +417,7 @@
             </a:ln>
             <a:extLst>
               <a:ext uri="{91240B29-F687-4f45-9708-019B960494DF}">
-                <a14:hiddenLine xmlns:a14="http://schemas.microsoft.com/office/drawing/2010/main" xmlns="" w="9525">
+                <a14:hiddenLine xmlns="" xmlns:a14="http://schemas.microsoft.com/office/drawing/2010/main" w="9525">
                   <a:solidFill>
                     <a:srgbClr val="000000"/>
                   </a:solidFill>
@@ -442,7 +451,7 @@
             </a:ln>
             <a:extLst>
               <a:ext uri="{91240B29-F687-4f45-9708-019B960494DF}">
-                <a14:hiddenLine xmlns:a14="http://schemas.microsoft.com/office/drawing/2010/main" xmlns="" w="9525">
+                <a14:hiddenLine xmlns="" xmlns:a14="http://schemas.microsoft.com/office/drawing/2010/main" w="9525">
                   <a:solidFill>
                     <a:srgbClr val="000000"/>
                   </a:solidFill>
@@ -532,7 +541,7 @@
             </a:ln>
             <a:extLst>
               <a:ext uri="{91240B29-F687-4f45-9708-019B960494DF}">
-                <a14:hiddenLine xmlns:a14="http://schemas.microsoft.com/office/drawing/2010/main" xmlns="" w="9525">
+                <a14:hiddenLine xmlns="" xmlns:a14="http://schemas.microsoft.com/office/drawing/2010/main" w="9525">
                   <a:solidFill>
                     <a:srgbClr val="000000"/>
                   </a:solidFill>
@@ -594,7 +603,7 @@
             </a:ln>
             <a:extLst>
               <a:ext uri="{91240B29-F687-4f45-9708-019B960494DF}">
-                <a14:hiddenLine xmlns:a14="http://schemas.microsoft.com/office/drawing/2010/main" xmlns="" w="9525">
+                <a14:hiddenLine xmlns="" xmlns:a14="http://schemas.microsoft.com/office/drawing/2010/main" w="9525">
                   <a:solidFill>
                     <a:srgbClr val="000000"/>
                   </a:solidFill>
@@ -656,7 +665,7 @@
             </a:ln>
             <a:extLst>
               <a:ext uri="{91240B29-F687-4f45-9708-019B960494DF}">
-                <a14:hiddenLine xmlns:a14="http://schemas.microsoft.com/office/drawing/2010/main" xmlns="" w="9525">
+                <a14:hiddenLine xmlns="" xmlns:a14="http://schemas.microsoft.com/office/drawing/2010/main" w="9525">
                   <a:solidFill>
                     <a:srgbClr val="000000"/>
                   </a:solidFill>
@@ -746,7 +755,7 @@
             </a:ln>
             <a:extLst>
               <a:ext uri="{91240B29-F687-4f45-9708-019B960494DF}">
-                <a14:hiddenLine xmlns:a14="http://schemas.microsoft.com/office/drawing/2010/main" xmlns="" w="9525">
+                <a14:hiddenLine xmlns="" xmlns:a14="http://schemas.microsoft.com/office/drawing/2010/main" w="9525">
                   <a:solidFill>
                     <a:srgbClr val="000000"/>
                   </a:solidFill>
@@ -808,7 +817,7 @@
             </a:ln>
             <a:extLst>
               <a:ext uri="{91240B29-F687-4f45-9708-019B960494DF}">
-                <a14:hiddenLine xmlns:a14="http://schemas.microsoft.com/office/drawing/2010/main" xmlns="" w="9525">
+                <a14:hiddenLine xmlns="" xmlns:a14="http://schemas.microsoft.com/office/drawing/2010/main" w="9525">
                   <a:solidFill>
                     <a:srgbClr val="000000"/>
                   </a:solidFill>
@@ -870,7 +879,7 @@
             </a:ln>
             <a:extLst>
               <a:ext uri="{91240B29-F687-4f45-9708-019B960494DF}">
-                <a14:hiddenLine xmlns:a14="http://schemas.microsoft.com/office/drawing/2010/main" xmlns="" w="9525">
+                <a14:hiddenLine xmlns="" xmlns:a14="http://schemas.microsoft.com/office/drawing/2010/main" w="9525">
                   <a:solidFill>
                     <a:srgbClr val="000000"/>
                   </a:solidFill>
@@ -960,7 +969,7 @@
             </a:ln>
             <a:extLst>
               <a:ext uri="{91240B29-F687-4f45-9708-019B960494DF}">
-                <a14:hiddenLine xmlns:a14="http://schemas.microsoft.com/office/drawing/2010/main" xmlns="" w="9525">
+                <a14:hiddenLine xmlns="" xmlns:a14="http://schemas.microsoft.com/office/drawing/2010/main" w="9525">
                   <a:solidFill>
                     <a:srgbClr val="000000"/>
                   </a:solidFill>
@@ -1050,7 +1059,7 @@
             </a:ln>
             <a:extLst>
               <a:ext uri="{91240B29-F687-4f45-9708-019B960494DF}">
-                <a14:hiddenLine xmlns:a14="http://schemas.microsoft.com/office/drawing/2010/main" xmlns="" w="9525">
+                <a14:hiddenLine xmlns="" xmlns:a14="http://schemas.microsoft.com/office/drawing/2010/main" w="9525">
                   <a:solidFill>
                     <a:srgbClr val="000000"/>
                   </a:solidFill>
@@ -1112,7 +1121,7 @@
             </a:ln>
             <a:extLst>
               <a:ext uri="{91240B29-F687-4f45-9708-019B960494DF}">
-                <a14:hiddenLine xmlns:a14="http://schemas.microsoft.com/office/drawing/2010/main" xmlns="" w="9525">
+                <a14:hiddenLine xmlns="" xmlns:a14="http://schemas.microsoft.com/office/drawing/2010/main" w="9525">
                   <a:solidFill>
                     <a:srgbClr val="000000"/>
                   </a:solidFill>
@@ -1222,7 +1231,7 @@
             </a:ln>
             <a:extLst>
               <a:ext uri="{91240B29-F687-4f45-9708-019B960494DF}">
-                <a14:hiddenLine xmlns:a14="http://schemas.microsoft.com/office/drawing/2010/main" xmlns="" w="9525">
+                <a14:hiddenLine xmlns="" xmlns:a14="http://schemas.microsoft.com/office/drawing/2010/main" w="9525">
                   <a:solidFill>
                     <a:srgbClr val="000000"/>
                   </a:solidFill>
@@ -1284,7 +1293,7 @@
             </a:ln>
             <a:extLst>
               <a:ext uri="{91240B29-F687-4f45-9708-019B960494DF}">
-                <a14:hiddenLine xmlns:a14="http://schemas.microsoft.com/office/drawing/2010/main" xmlns="" w="9525">
+                <a14:hiddenLine xmlns="" xmlns:a14="http://schemas.microsoft.com/office/drawing/2010/main" w="9525">
                   <a:solidFill>
                     <a:srgbClr val="000000"/>
                   </a:solidFill>
@@ -1374,7 +1383,7 @@
             </a:ln>
             <a:extLst>
               <a:ext uri="{91240B29-F687-4f45-9708-019B960494DF}">
-                <a14:hiddenLine xmlns:a14="http://schemas.microsoft.com/office/drawing/2010/main" xmlns="" w="9525">
+                <a14:hiddenLine xmlns="" xmlns:a14="http://schemas.microsoft.com/office/drawing/2010/main" w="9525">
                   <a:solidFill>
                     <a:srgbClr val="000000"/>
                   </a:solidFill>
@@ -1464,7 +1473,7 @@
             </a:ln>
             <a:extLst>
               <a:ext uri="{91240B29-F687-4f45-9708-019B960494DF}">
-                <a14:hiddenLine xmlns:a14="http://schemas.microsoft.com/office/drawing/2010/main" xmlns="" w="9525">
+                <a14:hiddenLine xmlns="" xmlns:a14="http://schemas.microsoft.com/office/drawing/2010/main" w="9525">
                   <a:solidFill>
                     <a:srgbClr val="000000"/>
                   </a:solidFill>
@@ -1526,7 +1535,7 @@
             </a:ln>
             <a:extLst>
               <a:ext uri="{91240B29-F687-4f45-9708-019B960494DF}">
-                <a14:hiddenLine xmlns:a14="http://schemas.microsoft.com/office/drawing/2010/main" xmlns="" w="9525">
+                <a14:hiddenLine xmlns="" xmlns:a14="http://schemas.microsoft.com/office/drawing/2010/main" w="9525">
                   <a:solidFill>
                     <a:srgbClr val="000000"/>
                   </a:solidFill>
@@ -1616,7 +1625,7 @@
             </a:ln>
             <a:extLst>
               <a:ext uri="{91240B29-F687-4f45-9708-019B960494DF}">
-                <a14:hiddenLine xmlns:a14="http://schemas.microsoft.com/office/drawing/2010/main" xmlns="" w="9525">
+                <a14:hiddenLine xmlns="" xmlns:a14="http://schemas.microsoft.com/office/drawing/2010/main" w="9525">
                   <a:solidFill>
                     <a:srgbClr val="000000"/>
                   </a:solidFill>
@@ -1706,7 +1715,7 @@
             </a:ln>
             <a:extLst>
               <a:ext uri="{91240B29-F687-4f45-9708-019B960494DF}">
-                <a14:hiddenLine xmlns:a14="http://schemas.microsoft.com/office/drawing/2010/main" xmlns="" w="9525">
+                <a14:hiddenLine xmlns="" xmlns:a14="http://schemas.microsoft.com/office/drawing/2010/main" w="9525">
                   <a:solidFill>
                     <a:srgbClr val="000000"/>
                   </a:solidFill>
@@ -1762,7 +1771,7 @@
             </a:ln>
             <a:extLst>
               <a:ext uri="{91240B29-F687-4f45-9708-019B960494DF}">
-                <a14:hiddenLine xmlns:a14="http://schemas.microsoft.com/office/drawing/2010/main" xmlns="" w="9525">
+                <a14:hiddenLine xmlns="" xmlns:a14="http://schemas.microsoft.com/office/drawing/2010/main" w="9525">
                   <a:solidFill>
                     <a:srgbClr val="000000"/>
                   </a:solidFill>
@@ -1852,7 +1861,7 @@
             </a:ln>
             <a:extLst>
               <a:ext uri="{91240B29-F687-4f45-9708-019B960494DF}">
-                <a14:hiddenLine xmlns:a14="http://schemas.microsoft.com/office/drawing/2010/main" xmlns="" w="9525">
+                <a14:hiddenLine xmlns="" xmlns:a14="http://schemas.microsoft.com/office/drawing/2010/main" w="9525">
                   <a:solidFill>
                     <a:srgbClr val="000000"/>
                   </a:solidFill>
@@ -1908,7 +1917,7 @@
             </a:ln>
             <a:extLst>
               <a:ext uri="{91240B29-F687-4f45-9708-019B960494DF}">
-                <a14:hiddenLine xmlns:a14="http://schemas.microsoft.com/office/drawing/2010/main" xmlns="" w="9525">
+                <a14:hiddenLine xmlns="" xmlns:a14="http://schemas.microsoft.com/office/drawing/2010/main" w="9525">
                   <a:solidFill>
                     <a:srgbClr val="000000"/>
                   </a:solidFill>
@@ -1998,7 +2007,7 @@
             </a:ln>
             <a:extLst>
               <a:ext uri="{91240B29-F687-4f45-9708-019B960494DF}">
-                <a14:hiddenLine xmlns:a14="http://schemas.microsoft.com/office/drawing/2010/main" xmlns="" w="9525">
+                <a14:hiddenLine xmlns="" xmlns:a14="http://schemas.microsoft.com/office/drawing/2010/main" w="9525">
                   <a:solidFill>
                     <a:srgbClr val="000000"/>
                   </a:solidFill>
@@ -2066,7 +2075,7 @@
             </a:ln>
             <a:extLst>
               <a:ext uri="{91240B29-F687-4f45-9708-019B960494DF}">
-                <a14:hiddenLine xmlns:a14="http://schemas.microsoft.com/office/drawing/2010/main" xmlns="" w="9525">
+                <a14:hiddenLine xmlns="" xmlns:a14="http://schemas.microsoft.com/office/drawing/2010/main" w="9525">
                   <a:solidFill>
                     <a:srgbClr val="000000"/>
                   </a:solidFill>
@@ -2156,7 +2165,7 @@
             </a:ln>
             <a:extLst>
               <a:ext uri="{91240B29-F687-4f45-9708-019B960494DF}">
-                <a14:hiddenLine xmlns:a14="http://schemas.microsoft.com/office/drawing/2010/main" xmlns="" w="9525">
+                <a14:hiddenLine xmlns="" xmlns:a14="http://schemas.microsoft.com/office/drawing/2010/main" w="9525">
                   <a:solidFill>
                     <a:srgbClr val="000000"/>
                   </a:solidFill>
@@ -2224,7 +2233,7 @@
             </a:ln>
             <a:extLst>
               <a:ext uri="{91240B29-F687-4f45-9708-019B960494DF}">
-                <a14:hiddenLine xmlns:a14="http://schemas.microsoft.com/office/drawing/2010/main" xmlns="" w="9525">
+                <a14:hiddenLine xmlns="" xmlns:a14="http://schemas.microsoft.com/office/drawing/2010/main" w="9525">
                   <a:solidFill>
                     <a:srgbClr val="000000"/>
                   </a:solidFill>
@@ -2314,7 +2323,7 @@
             </a:ln>
             <a:extLst>
               <a:ext uri="{91240B29-F687-4f45-9708-019B960494DF}">
-                <a14:hiddenLine xmlns:a14="http://schemas.microsoft.com/office/drawing/2010/main" xmlns="" w="9525">
+                <a14:hiddenLine xmlns="" xmlns:a14="http://schemas.microsoft.com/office/drawing/2010/main" w="9525">
                   <a:solidFill>
                     <a:srgbClr val="000000"/>
                   </a:solidFill>
@@ -2348,7 +2357,7 @@
             </a:ln>
             <a:extLst>
               <a:ext uri="{91240B29-F687-4f45-9708-019B960494DF}">
-                <a14:hiddenLine xmlns:a14="http://schemas.microsoft.com/office/drawing/2010/main" xmlns="" w="9525">
+                <a14:hiddenLine xmlns="" xmlns:a14="http://schemas.microsoft.com/office/drawing/2010/main" w="9525">
                   <a:solidFill>
                     <a:srgbClr val="000000"/>
                   </a:solidFill>
@@ -2438,7 +2447,7 @@
             </a:ln>
             <a:extLst>
               <a:ext uri="{91240B29-F687-4f45-9708-019B960494DF}">
-                <a14:hiddenLine xmlns:a14="http://schemas.microsoft.com/office/drawing/2010/main" xmlns="" w="9525">
+                <a14:hiddenLine xmlns="" xmlns:a14="http://schemas.microsoft.com/office/drawing/2010/main" w="9525">
                   <a:solidFill>
                     <a:srgbClr val="000000"/>
                   </a:solidFill>
@@ -2500,7 +2509,7 @@
             </a:ln>
             <a:extLst>
               <a:ext uri="{91240B29-F687-4f45-9708-019B960494DF}">
-                <a14:hiddenLine xmlns:a14="http://schemas.microsoft.com/office/drawing/2010/main" xmlns="" w="9525">
+                <a14:hiddenLine xmlns="" xmlns:a14="http://schemas.microsoft.com/office/drawing/2010/main" w="9525">
                   <a:solidFill>
                     <a:srgbClr val="000000"/>
                   </a:solidFill>
@@ -2562,7 +2571,7 @@
             </a:ln>
             <a:extLst>
               <a:ext uri="{91240B29-F687-4f45-9708-019B960494DF}">
-                <a14:hiddenLine xmlns:a14="http://schemas.microsoft.com/office/drawing/2010/main" xmlns="" w="9525">
+                <a14:hiddenLine xmlns="" xmlns:a14="http://schemas.microsoft.com/office/drawing/2010/main" w="9525">
                   <a:solidFill>
                     <a:srgbClr val="000000"/>
                   </a:solidFill>
@@ -2652,7 +2661,7 @@
             </a:ln>
             <a:extLst>
               <a:ext uri="{91240B29-F687-4f45-9708-019B960494DF}">
-                <a14:hiddenLine xmlns:a14="http://schemas.microsoft.com/office/drawing/2010/main" xmlns="" w="9525">
+                <a14:hiddenLine xmlns="" xmlns:a14="http://schemas.microsoft.com/office/drawing/2010/main" w="9525">
                   <a:solidFill>
                     <a:srgbClr val="000000"/>
                   </a:solidFill>
@@ -2720,7 +2729,7 @@
             </a:ln>
             <a:extLst>
               <a:ext uri="{91240B29-F687-4f45-9708-019B960494DF}">
-                <a14:hiddenLine xmlns:a14="http://schemas.microsoft.com/office/drawing/2010/main" xmlns="" w="9525">
+                <a14:hiddenLine xmlns="" xmlns:a14="http://schemas.microsoft.com/office/drawing/2010/main" w="9525">
                   <a:solidFill>
                     <a:srgbClr val="000000"/>
                   </a:solidFill>
@@ -2782,7 +2791,7 @@
             </a:ln>
             <a:extLst>
               <a:ext uri="{91240B29-F687-4f45-9708-019B960494DF}">
-                <a14:hiddenLine xmlns:a14="http://schemas.microsoft.com/office/drawing/2010/main" xmlns="" w="9525">
+                <a14:hiddenLine xmlns="" xmlns:a14="http://schemas.microsoft.com/office/drawing/2010/main" w="9525">
                   <a:solidFill>
                     <a:srgbClr val="000000"/>
                   </a:solidFill>
@@ -2872,7 +2881,7 @@
             </a:ln>
             <a:extLst>
               <a:ext uri="{91240B29-F687-4f45-9708-019B960494DF}">
-                <a14:hiddenLine xmlns:a14="http://schemas.microsoft.com/office/drawing/2010/main" xmlns="" w="9525">
+                <a14:hiddenLine xmlns="" xmlns:a14="http://schemas.microsoft.com/office/drawing/2010/main" w="9525">
                   <a:solidFill>
                     <a:srgbClr val="000000"/>
                   </a:solidFill>
@@ -2934,7 +2943,7 @@
             </a:ln>
             <a:extLst>
               <a:ext uri="{91240B29-F687-4f45-9708-019B960494DF}">
-                <a14:hiddenLine xmlns:a14="http://schemas.microsoft.com/office/drawing/2010/main" xmlns="" w="9525">
+                <a14:hiddenLine xmlns="" xmlns:a14="http://schemas.microsoft.com/office/drawing/2010/main" w="9525">
                   <a:solidFill>
                     <a:srgbClr val="000000"/>
                   </a:solidFill>
@@ -3024,7 +3033,7 @@
             </a:ln>
             <a:extLst>
               <a:ext uri="{91240B29-F687-4f45-9708-019B960494DF}">
-                <a14:hiddenLine xmlns:a14="http://schemas.microsoft.com/office/drawing/2010/main" xmlns="" w="9525">
+                <a14:hiddenLine xmlns="" xmlns:a14="http://schemas.microsoft.com/office/drawing/2010/main" w="9525">
                   <a:solidFill>
                     <a:srgbClr val="000000"/>
                   </a:solidFill>
@@ -3086,7 +3095,7 @@
             </a:ln>
             <a:extLst>
               <a:ext uri="{91240B29-F687-4f45-9708-019B960494DF}">
-                <a14:hiddenLine xmlns:a14="http://schemas.microsoft.com/office/drawing/2010/main" xmlns="" w="9525">
+                <a14:hiddenLine xmlns="" xmlns:a14="http://schemas.microsoft.com/office/drawing/2010/main" w="9525">
                   <a:solidFill>
                     <a:srgbClr val="000000"/>
                   </a:solidFill>
@@ -3176,7 +3185,7 @@
             </a:ln>
             <a:extLst>
               <a:ext uri="{91240B29-F687-4f45-9708-019B960494DF}">
-                <a14:hiddenLine xmlns:a14="http://schemas.microsoft.com/office/drawing/2010/main" xmlns="" w="9525">
+                <a14:hiddenLine xmlns="" xmlns:a14="http://schemas.microsoft.com/office/drawing/2010/main" w="9525">
                   <a:solidFill>
                     <a:srgbClr val="000000"/>
                   </a:solidFill>
@@ -3210,7 +3219,7 @@
             </a:ln>
             <a:extLst>
               <a:ext uri="{91240B29-F687-4f45-9708-019B960494DF}">
-                <a14:hiddenLine xmlns:a14="http://schemas.microsoft.com/office/drawing/2010/main" xmlns="" w="9525">
+                <a14:hiddenLine xmlns="" xmlns:a14="http://schemas.microsoft.com/office/drawing/2010/main" w="9525">
                   <a:solidFill>
                     <a:srgbClr val="000000"/>
                   </a:solidFill>
@@ -3275,7 +3284,7 @@
             </a:ln>
             <a:extLst>
               <a:ext uri="{91240B29-F687-4f45-9708-019B960494DF}">
-                <a14:hiddenLine xmlns:a14="http://schemas.microsoft.com/office/drawing/2010/main" xmlns="" w="9525">
+                <a14:hiddenLine xmlns="" xmlns:a14="http://schemas.microsoft.com/office/drawing/2010/main" w="9525">
                   <a:solidFill>
                     <a:srgbClr val="000000"/>
                   </a:solidFill>
@@ -3365,7 +3374,7 @@
             </a:ln>
             <a:extLst>
               <a:ext uri="{91240B29-F687-4f45-9708-019B960494DF}">
-                <a14:hiddenLine xmlns:a14="http://schemas.microsoft.com/office/drawing/2010/main" xmlns="" w="9525">
+                <a14:hiddenLine xmlns="" xmlns:a14="http://schemas.microsoft.com/office/drawing/2010/main" w="9525">
                   <a:solidFill>
                     <a:srgbClr val="000000"/>
                   </a:solidFill>
@@ -3427,7 +3436,7 @@
             </a:ln>
             <a:extLst>
               <a:ext uri="{91240B29-F687-4f45-9708-019B960494DF}">
-                <a14:hiddenLine xmlns:a14="http://schemas.microsoft.com/office/drawing/2010/main" xmlns="" w="9525">
+                <a14:hiddenLine xmlns="" xmlns:a14="http://schemas.microsoft.com/office/drawing/2010/main" w="9525">
                   <a:solidFill>
                     <a:srgbClr val="000000"/>
                   </a:solidFill>
@@ -3517,7 +3526,7 @@
             </a:ln>
             <a:extLst>
               <a:ext uri="{91240B29-F687-4f45-9708-019B960494DF}">
-                <a14:hiddenLine xmlns:a14="http://schemas.microsoft.com/office/drawing/2010/main" xmlns="" w="9525">
+                <a14:hiddenLine xmlns="" xmlns:a14="http://schemas.microsoft.com/office/drawing/2010/main" w="9525">
                   <a:solidFill>
                     <a:srgbClr val="000000"/>
                   </a:solidFill>
@@ -3607,7 +3616,7 @@
             </a:ln>
             <a:extLst>
               <a:ext uri="{91240B29-F687-4f45-9708-019B960494DF}">
-                <a14:hiddenLine xmlns:a14="http://schemas.microsoft.com/office/drawing/2010/main" xmlns="" w="9525">
+                <a14:hiddenLine xmlns="" xmlns:a14="http://schemas.microsoft.com/office/drawing/2010/main" w="9525">
                   <a:solidFill>
                     <a:srgbClr val="000000"/>
                   </a:solidFill>
@@ -3672,7 +3681,7 @@
             </a:ln>
             <a:extLst>
               <a:ext uri="{91240B29-F687-4f45-9708-019B960494DF}">
-                <a14:hiddenLine xmlns:a14="http://schemas.microsoft.com/office/drawing/2010/main" xmlns="" w="9525">
+                <a14:hiddenLine xmlns="" xmlns:a14="http://schemas.microsoft.com/office/drawing/2010/main" w="9525">
                   <a:solidFill>
                     <a:srgbClr val="000000"/>
                   </a:solidFill>
@@ -3734,7 +3743,7 @@
             </a:ln>
             <a:extLst>
               <a:ext uri="{91240B29-F687-4f45-9708-019B960494DF}">
-                <a14:hiddenLine xmlns:a14="http://schemas.microsoft.com/office/drawing/2010/main" xmlns="" w="9525">
+                <a14:hiddenLine xmlns="" xmlns:a14="http://schemas.microsoft.com/office/drawing/2010/main" w="9525">
                   <a:solidFill>
                     <a:srgbClr val="000000"/>
                   </a:solidFill>
@@ -3824,7 +3833,7 @@
             </a:ln>
             <a:extLst>
               <a:ext uri="{91240B29-F687-4f45-9708-019B960494DF}">
-                <a14:hiddenLine xmlns:a14="http://schemas.microsoft.com/office/drawing/2010/main" xmlns="" w="9525">
+                <a14:hiddenLine xmlns="" xmlns:a14="http://schemas.microsoft.com/office/drawing/2010/main" w="9525">
                   <a:solidFill>
                     <a:srgbClr val="000000"/>
                   </a:solidFill>
@@ -3914,7 +3923,7 @@
             </a:ln>
             <a:extLst>
               <a:ext uri="{91240B29-F687-4f45-9708-019B960494DF}">
-                <a14:hiddenLine xmlns:a14="http://schemas.microsoft.com/office/drawing/2010/main" xmlns="" w="9525">
+                <a14:hiddenLine xmlns="" xmlns:a14="http://schemas.microsoft.com/office/drawing/2010/main" w="9525">
                   <a:solidFill>
                     <a:srgbClr val="000000"/>
                   </a:solidFill>
@@ -3976,7 +3985,7 @@
             </a:ln>
             <a:extLst>
               <a:ext uri="{91240B29-F687-4f45-9708-019B960494DF}">
-                <a14:hiddenLine xmlns:a14="http://schemas.microsoft.com/office/drawing/2010/main" xmlns="" w="9525">
+                <a14:hiddenLine xmlns="" xmlns:a14="http://schemas.microsoft.com/office/drawing/2010/main" w="9525">
                   <a:solidFill>
                     <a:srgbClr val="000000"/>
                   </a:solidFill>
@@ -4096,7 +4105,7 @@
             </a:ln>
             <a:extLst>
               <a:ext uri="{91240B29-F687-4f45-9708-019B960494DF}">
-                <a14:hiddenLine xmlns:a14="http://schemas.microsoft.com/office/drawing/2010/main" xmlns="" w="9525">
+                <a14:hiddenLine xmlns="" xmlns:a14="http://schemas.microsoft.com/office/drawing/2010/main" w="9525">
                   <a:solidFill>
                     <a:srgbClr val="000000"/>
                   </a:solidFill>
@@ -4164,7 +4173,7 @@
             </a:ln>
             <a:extLst>
               <a:ext uri="{91240B29-F687-4f45-9708-019B960494DF}">
-                <a14:hiddenLine xmlns:a14="http://schemas.microsoft.com/office/drawing/2010/main" xmlns="" w="9525">
+                <a14:hiddenLine xmlns="" xmlns:a14="http://schemas.microsoft.com/office/drawing/2010/main" w="9525">
                   <a:solidFill>
                     <a:srgbClr val="000000"/>
                   </a:solidFill>
@@ -4254,7 +4263,7 @@
             </a:ln>
             <a:extLst>
               <a:ext uri="{91240B29-F687-4f45-9708-019B960494DF}">
-                <a14:hiddenLine xmlns:a14="http://schemas.microsoft.com/office/drawing/2010/main" xmlns="" w="9525">
+                <a14:hiddenLine xmlns="" xmlns:a14="http://schemas.microsoft.com/office/drawing/2010/main" w="9525">
                   <a:solidFill>
                     <a:srgbClr val="000000"/>
                   </a:solidFill>
@@ -4294,7 +4303,7 @@
           </a:lstStyle>
           <a:p>
             <a:r>
-              <a:rPr lang="en-US" smtClean="0"/>
+              <a:rPr lang="en-US"/>
               <a:t>Click to edit Master title style</a:t>
             </a:r>
             <a:endParaRPr lang="en-US" dirty="0"/>
@@ -4365,7 +4374,7 @@
           </a:lstStyle>
           <a:p>
             <a:r>
-              <a:rPr lang="en-US" smtClean="0"/>
+              <a:rPr lang="en-US"/>
               <a:t>Click to edit Master subtitle style</a:t>
             </a:r>
             <a:endParaRPr lang="en-US" dirty="0"/>
@@ -4394,7 +4403,7 @@
           <a:p>
             <a:fld id="{48A87A34-81AB-432B-8DAE-1953F412C126}" type="datetimeFigureOut">
               <a:rPr lang="en-US" dirty="0"/>
-              <a:t>12/10/2017</a:t>
+              <a:t>12/11/2017</a:t>
             </a:fld>
             <a:endParaRPr lang="en-US" dirty="0"/>
           </a:p>
@@ -4504,7 +4513,7 @@
           </a:lstStyle>
           <a:p>
             <a:r>
-              <a:rPr lang="en-US" smtClean="0"/>
+              <a:rPr lang="en-US"/>
               <a:t>Click to edit Master title style</a:t>
             </a:r>
             <a:endParaRPr lang="en-US" dirty="0"/>
@@ -4565,7 +4574,7 @@
               <a:buNone/>
             </a:pPr>
             <a:r>
-              <a:rPr lang="en-US" smtClean="0"/>
+              <a:rPr lang="en-US"/>
               <a:t>Click icon to add picture</a:t>
             </a:r>
             <a:endParaRPr lang="en-US" dirty="0"/>
@@ -4633,7 +4642,7 @@
           <a:p>
             <a:pPr lvl="0"/>
             <a:r>
-              <a:rPr lang="en-US" smtClean="0"/>
+              <a:rPr lang="en-US"/>
               <a:t>Edit Master text styles</a:t>
             </a:r>
           </a:p>
@@ -4656,7 +4665,7 @@
           <a:p>
             <a:fld id="{48A87A34-81AB-432B-8DAE-1953F412C126}" type="datetimeFigureOut">
               <a:rPr lang="en-US" dirty="0"/>
-              <a:t>12/10/2017</a:t>
+              <a:t>12/11/2017</a:t>
             </a:fld>
             <a:endParaRPr lang="en-US" dirty="0"/>
           </a:p>
@@ -4756,7 +4765,7 @@
           </a:lstStyle>
           <a:p>
             <a:r>
-              <a:rPr lang="en-US" smtClean="0"/>
+              <a:rPr lang="en-US"/>
               <a:t>Click to edit Master title style</a:t>
             </a:r>
             <a:endParaRPr lang="en-US" dirty="0"/>
@@ -4824,7 +4833,7 @@
           <a:p>
             <a:pPr lvl="0"/>
             <a:r>
-              <a:rPr lang="en-US" smtClean="0"/>
+              <a:rPr lang="en-US"/>
               <a:t>Edit Master text styles</a:t>
             </a:r>
           </a:p>
@@ -4847,7 +4856,7 @@
           <a:p>
             <a:fld id="{48A87A34-81AB-432B-8DAE-1953F412C126}" type="datetimeFigureOut">
               <a:rPr lang="en-US" dirty="0"/>
-              <a:t>12/10/2017</a:t>
+              <a:t>12/11/2017</a:t>
             </a:fld>
             <a:endParaRPr lang="en-US" dirty="0"/>
           </a:p>
@@ -4947,7 +4956,7 @@
           </a:lstStyle>
           <a:p>
             <a:r>
-              <a:rPr lang="en-US" smtClean="0"/>
+              <a:rPr lang="en-US"/>
               <a:t>Click to edit Master title style</a:t>
             </a:r>
             <a:endParaRPr lang="en-US" dirty="0"/>
@@ -5015,7 +5024,7 @@
           <a:p>
             <a:pPr lvl="0"/>
             <a:r>
-              <a:rPr lang="en-US" smtClean="0"/>
+              <a:rPr lang="en-US"/>
               <a:t>Edit Master text styles</a:t>
             </a:r>
           </a:p>
@@ -5082,7 +5091,7 @@
           <a:p>
             <a:pPr lvl="0"/>
             <a:r>
-              <a:rPr lang="en-US" smtClean="0"/>
+              <a:rPr lang="en-US"/>
               <a:t>Edit Master text styles</a:t>
             </a:r>
           </a:p>
@@ -5105,7 +5114,7 @@
           <a:p>
             <a:fld id="{48A87A34-81AB-432B-8DAE-1953F412C126}" type="datetimeFigureOut">
               <a:rPr lang="en-US" dirty="0"/>
-              <a:t>12/10/2017</a:t>
+              <a:t>12/11/2017</a:t>
             </a:fld>
             <a:endParaRPr lang="en-US" dirty="0"/>
           </a:p>
@@ -5443,7 +5452,7 @@
           </a:lstStyle>
           <a:p>
             <a:r>
-              <a:rPr lang="en-US" smtClean="0"/>
+              <a:rPr lang="en-US"/>
               <a:t>Click to edit Master title style</a:t>
             </a:r>
             <a:endParaRPr lang="en-US" dirty="0"/>
@@ -5511,7 +5520,7 @@
           <a:p>
             <a:pPr lvl="0"/>
             <a:r>
-              <a:rPr lang="en-US" smtClean="0"/>
+              <a:rPr lang="en-US"/>
               <a:t>Edit Master text styles</a:t>
             </a:r>
           </a:p>
@@ -5534,7 +5543,7 @@
           <a:p>
             <a:fld id="{48A87A34-81AB-432B-8DAE-1953F412C126}" type="datetimeFigureOut">
               <a:rPr lang="en-US" dirty="0"/>
-              <a:t>12/10/2017</a:t>
+              <a:t>12/11/2017</a:t>
             </a:fld>
             <a:endParaRPr lang="en-US" dirty="0"/>
           </a:p>
@@ -5628,7 +5637,7 @@
           <a:lstStyle/>
           <a:p>
             <a:r>
-              <a:rPr lang="en-US" smtClean="0"/>
+              <a:rPr lang="en-US"/>
               <a:t>Click to edit Master title style</a:t>
             </a:r>
             <a:endParaRPr lang="en-US" dirty="0"/>
@@ -5703,7 +5712,7 @@
           <a:p>
             <a:pPr lvl="0"/>
             <a:r>
-              <a:rPr lang="en-US" smtClean="0"/>
+              <a:rPr lang="en-US"/>
               <a:t>Edit Master text styles</a:t>
             </a:r>
           </a:p>
@@ -5770,7 +5779,7 @@
           <a:p>
             <a:pPr lvl="0"/>
             <a:r>
-              <a:rPr lang="en-US" smtClean="0"/>
+              <a:rPr lang="en-US"/>
               <a:t>Edit Master text styles</a:t>
             </a:r>
           </a:p>
@@ -5844,7 +5853,7 @@
           <a:p>
             <a:pPr lvl="0"/>
             <a:r>
-              <a:rPr lang="en-US" smtClean="0"/>
+              <a:rPr lang="en-US"/>
               <a:t>Edit Master text styles</a:t>
             </a:r>
           </a:p>
@@ -5911,7 +5920,7 @@
           <a:p>
             <a:pPr lvl="0"/>
             <a:r>
-              <a:rPr lang="en-US" smtClean="0"/>
+              <a:rPr lang="en-US"/>
               <a:t>Edit Master text styles</a:t>
             </a:r>
           </a:p>
@@ -5985,7 +5994,7 @@
           <a:p>
             <a:pPr lvl="0"/>
             <a:r>
-              <a:rPr lang="en-US" smtClean="0"/>
+              <a:rPr lang="en-US"/>
               <a:t>Edit Master text styles</a:t>
             </a:r>
           </a:p>
@@ -6052,7 +6061,7 @@
           <a:p>
             <a:pPr lvl="0"/>
             <a:r>
-              <a:rPr lang="en-US" smtClean="0"/>
+              <a:rPr lang="en-US"/>
               <a:t>Edit Master text styles</a:t>
             </a:r>
           </a:p>
@@ -6075,7 +6084,7 @@
           <a:p>
             <a:fld id="{48A87A34-81AB-432B-8DAE-1953F412C126}" type="datetimeFigureOut">
               <a:rPr lang="en-US" dirty="0"/>
-              <a:t>12/10/2017</a:t>
+              <a:t>12/11/2017</a:t>
             </a:fld>
             <a:endParaRPr lang="en-US" dirty="0"/>
           </a:p>
@@ -6169,7 +6178,7 @@
           <a:lstStyle/>
           <a:p>
             <a:r>
-              <a:rPr lang="en-US" smtClean="0"/>
+              <a:rPr lang="en-US"/>
               <a:t>Click to edit Master title style</a:t>
             </a:r>
             <a:endParaRPr lang="en-US" dirty="0"/>
@@ -6244,7 +6253,7 @@
           <a:p>
             <a:pPr lvl="0"/>
             <a:r>
-              <a:rPr lang="en-US" smtClean="0"/>
+              <a:rPr lang="en-US"/>
               <a:t>Edit Master text styles</a:t>
             </a:r>
           </a:p>
@@ -6301,7 +6310,7 @@
               <a:buNone/>
             </a:pPr>
             <a:r>
-              <a:rPr lang="en-US" smtClean="0"/>
+              <a:rPr lang="en-US"/>
               <a:t>Click icon to add picture</a:t>
             </a:r>
             <a:endParaRPr lang="en-US" dirty="0"/>
@@ -6369,7 +6378,7 @@
           <a:p>
             <a:pPr lvl="0"/>
             <a:r>
-              <a:rPr lang="en-US" smtClean="0"/>
+              <a:rPr lang="en-US"/>
               <a:t>Edit Master text styles</a:t>
             </a:r>
           </a:p>
@@ -6443,7 +6452,7 @@
           <a:p>
             <a:pPr lvl="0"/>
             <a:r>
-              <a:rPr lang="en-US" smtClean="0"/>
+              <a:rPr lang="en-US"/>
               <a:t>Edit Master text styles</a:t>
             </a:r>
           </a:p>
@@ -6500,7 +6509,7 @@
               <a:buNone/>
             </a:pPr>
             <a:r>
-              <a:rPr lang="en-US" smtClean="0"/>
+              <a:rPr lang="en-US"/>
               <a:t>Click icon to add picture</a:t>
             </a:r>
             <a:endParaRPr lang="en-US" dirty="0"/>
@@ -6568,7 +6577,7 @@
           <a:p>
             <a:pPr lvl="0"/>
             <a:r>
-              <a:rPr lang="en-US" smtClean="0"/>
+              <a:rPr lang="en-US"/>
               <a:t>Edit Master text styles</a:t>
             </a:r>
           </a:p>
@@ -6642,7 +6651,7 @@
           <a:p>
             <a:pPr lvl="0"/>
             <a:r>
-              <a:rPr lang="en-US" smtClean="0"/>
+              <a:rPr lang="en-US"/>
               <a:t>Edit Master text styles</a:t>
             </a:r>
           </a:p>
@@ -6699,7 +6708,7 @@
               <a:buNone/>
             </a:pPr>
             <a:r>
-              <a:rPr lang="en-US" smtClean="0"/>
+              <a:rPr lang="en-US"/>
               <a:t>Click icon to add picture</a:t>
             </a:r>
             <a:endParaRPr lang="en-US" dirty="0"/>
@@ -6767,7 +6776,7 @@
           <a:p>
             <a:pPr lvl="0"/>
             <a:r>
-              <a:rPr lang="en-US" smtClean="0"/>
+              <a:rPr lang="en-US"/>
               <a:t>Edit Master text styles</a:t>
             </a:r>
           </a:p>
@@ -6790,7 +6799,7 @@
           <a:p>
             <a:fld id="{48A87A34-81AB-432B-8DAE-1953F412C126}" type="datetimeFigureOut">
               <a:rPr lang="en-US" dirty="0"/>
-              <a:t>12/10/2017</a:t>
+              <a:t>12/11/2017</a:t>
             </a:fld>
             <a:endParaRPr lang="en-US" dirty="0"/>
           </a:p>
@@ -6879,7 +6888,7 @@
           <a:lstStyle/>
           <a:p>
             <a:r>
-              <a:rPr lang="en-US" smtClean="0"/>
+              <a:rPr lang="en-US"/>
               <a:t>Click to edit Master title style</a:t>
             </a:r>
             <a:endParaRPr lang="en-US" dirty="0"/>
@@ -6903,35 +6912,35 @@
           <a:p>
             <a:pPr lvl="0"/>
             <a:r>
-              <a:rPr lang="en-US" smtClean="0"/>
+              <a:rPr lang="en-US"/>
               <a:t>Edit Master text styles</a:t>
             </a:r>
           </a:p>
           <a:p>
             <a:pPr lvl="1"/>
             <a:r>
-              <a:rPr lang="en-US" smtClean="0"/>
+              <a:rPr lang="en-US"/>
               <a:t>Second level</a:t>
             </a:r>
           </a:p>
           <a:p>
             <a:pPr lvl="2"/>
             <a:r>
-              <a:rPr lang="en-US" smtClean="0"/>
+              <a:rPr lang="en-US"/>
               <a:t>Third level</a:t>
             </a:r>
           </a:p>
           <a:p>
             <a:pPr lvl="3"/>
             <a:r>
-              <a:rPr lang="en-US" smtClean="0"/>
+              <a:rPr lang="en-US"/>
               <a:t>Fourth level</a:t>
             </a:r>
           </a:p>
           <a:p>
             <a:pPr lvl="4"/>
             <a:r>
-              <a:rPr lang="en-US" smtClean="0"/>
+              <a:rPr lang="en-US"/>
               <a:t>Fifth level</a:t>
             </a:r>
             <a:endParaRPr lang="en-US" dirty="0"/>
@@ -6955,7 +6964,7 @@
           <a:p>
             <a:fld id="{48A87A34-81AB-432B-8DAE-1953F412C126}" type="datetimeFigureOut">
               <a:rPr lang="en-US" dirty="0"/>
-              <a:t>12/10/2017</a:t>
+              <a:t>12/11/2017</a:t>
             </a:fld>
             <a:endParaRPr lang="en-US" dirty="0"/>
           </a:p>
@@ -7049,7 +7058,7 @@
           <a:lstStyle/>
           <a:p>
             <a:r>
-              <a:rPr lang="en-US" smtClean="0"/>
+              <a:rPr lang="en-US"/>
               <a:t>Click to edit Master title style</a:t>
             </a:r>
             <a:endParaRPr lang="en-US" dirty="0"/>
@@ -7078,35 +7087,35 @@
           <a:p>
             <a:pPr lvl="0"/>
             <a:r>
-              <a:rPr lang="en-US" smtClean="0"/>
+              <a:rPr lang="en-US"/>
               <a:t>Edit Master text styles</a:t>
             </a:r>
           </a:p>
           <a:p>
             <a:pPr lvl="1"/>
             <a:r>
-              <a:rPr lang="en-US" smtClean="0"/>
+              <a:rPr lang="en-US"/>
               <a:t>Second level</a:t>
             </a:r>
           </a:p>
           <a:p>
             <a:pPr lvl="2"/>
             <a:r>
-              <a:rPr lang="en-US" smtClean="0"/>
+              <a:rPr lang="en-US"/>
               <a:t>Third level</a:t>
             </a:r>
           </a:p>
           <a:p>
             <a:pPr lvl="3"/>
             <a:r>
-              <a:rPr lang="en-US" smtClean="0"/>
+              <a:rPr lang="en-US"/>
               <a:t>Fourth level</a:t>
             </a:r>
           </a:p>
           <a:p>
             <a:pPr lvl="4"/>
             <a:r>
-              <a:rPr lang="en-US" smtClean="0"/>
+              <a:rPr lang="en-US"/>
               <a:t>Fifth level</a:t>
             </a:r>
             <a:endParaRPr lang="en-US" dirty="0"/>
@@ -7130,7 +7139,7 @@
           <a:p>
             <a:fld id="{48A87A34-81AB-432B-8DAE-1953F412C126}" type="datetimeFigureOut">
               <a:rPr lang="en-US" dirty="0"/>
-              <a:t>12/10/2017</a:t>
+              <a:t>12/11/2017</a:t>
             </a:fld>
             <a:endParaRPr lang="en-US" dirty="0"/>
           </a:p>
@@ -7219,7 +7228,7 @@
           <a:lstStyle/>
           <a:p>
             <a:r>
-              <a:rPr lang="en-US" smtClean="0"/>
+              <a:rPr lang="en-US"/>
               <a:t>Click to edit Master title style</a:t>
             </a:r>
             <a:endParaRPr lang="en-US" dirty="0"/>
@@ -7243,35 +7252,35 @@
           <a:p>
             <a:pPr lvl="0"/>
             <a:r>
-              <a:rPr lang="en-US" smtClean="0"/>
+              <a:rPr lang="en-US"/>
               <a:t>Edit Master text styles</a:t>
             </a:r>
           </a:p>
           <a:p>
             <a:pPr lvl="1"/>
             <a:r>
-              <a:rPr lang="en-US" smtClean="0"/>
+              <a:rPr lang="en-US"/>
               <a:t>Second level</a:t>
             </a:r>
           </a:p>
           <a:p>
             <a:pPr lvl="2"/>
             <a:r>
-              <a:rPr lang="en-US" smtClean="0"/>
+              <a:rPr lang="en-US"/>
               <a:t>Third level</a:t>
             </a:r>
           </a:p>
           <a:p>
             <a:pPr lvl="3"/>
             <a:r>
-              <a:rPr lang="en-US" smtClean="0"/>
+              <a:rPr lang="en-US"/>
               <a:t>Fourth level</a:t>
             </a:r>
           </a:p>
           <a:p>
             <a:pPr lvl="4"/>
             <a:r>
-              <a:rPr lang="en-US" smtClean="0"/>
+              <a:rPr lang="en-US"/>
               <a:t>Fifth level</a:t>
             </a:r>
             <a:endParaRPr lang="en-US" dirty="0"/>
@@ -7295,7 +7304,7 @@
           <a:p>
             <a:fld id="{48A87A34-81AB-432B-8DAE-1953F412C126}" type="datetimeFigureOut">
               <a:rPr lang="en-US" dirty="0"/>
-              <a:t>12/10/2017</a:t>
+              <a:t>12/11/2017</a:t>
             </a:fld>
             <a:endParaRPr lang="en-US" dirty="0"/>
           </a:p>
@@ -7395,7 +7404,7 @@
           </a:lstStyle>
           <a:p>
             <a:r>
-              <a:rPr lang="en-US" smtClean="0"/>
+              <a:rPr lang="en-US"/>
               <a:t>Click to edit Master title style</a:t>
             </a:r>
             <a:endParaRPr lang="en-US" dirty="0"/>
@@ -7517,7 +7526,7 @@
           <a:p>
             <a:pPr lvl="0"/>
             <a:r>
-              <a:rPr lang="en-US" smtClean="0"/>
+              <a:rPr lang="en-US"/>
               <a:t>Edit Master text styles</a:t>
             </a:r>
           </a:p>
@@ -7540,7 +7549,7 @@
           <a:p>
             <a:fld id="{48A87A34-81AB-432B-8DAE-1953F412C126}" type="datetimeFigureOut">
               <a:rPr lang="en-US" dirty="0"/>
-              <a:t>12/10/2017</a:t>
+              <a:t>12/11/2017</a:t>
             </a:fld>
             <a:endParaRPr lang="en-US" dirty="0"/>
           </a:p>
@@ -7629,7 +7638,7 @@
           <a:lstStyle/>
           <a:p>
             <a:r>
-              <a:rPr lang="en-US" smtClean="0"/>
+              <a:rPr lang="en-US"/>
               <a:t>Click to edit Master title style</a:t>
             </a:r>
             <a:endParaRPr lang="en-US" dirty="0"/>
@@ -7658,35 +7667,35 @@
           <a:p>
             <a:pPr lvl="0"/>
             <a:r>
-              <a:rPr lang="en-US" smtClean="0"/>
+              <a:rPr lang="en-US"/>
               <a:t>Edit Master text styles</a:t>
             </a:r>
           </a:p>
           <a:p>
             <a:pPr lvl="1"/>
             <a:r>
-              <a:rPr lang="en-US" smtClean="0"/>
+              <a:rPr lang="en-US"/>
               <a:t>Second level</a:t>
             </a:r>
           </a:p>
           <a:p>
             <a:pPr lvl="2"/>
             <a:r>
-              <a:rPr lang="en-US" smtClean="0"/>
+              <a:rPr lang="en-US"/>
               <a:t>Third level</a:t>
             </a:r>
           </a:p>
           <a:p>
             <a:pPr lvl="3"/>
             <a:r>
-              <a:rPr lang="en-US" smtClean="0"/>
+              <a:rPr lang="en-US"/>
               <a:t>Fourth level</a:t>
             </a:r>
           </a:p>
           <a:p>
             <a:pPr lvl="4"/>
             <a:r>
-              <a:rPr lang="en-US" smtClean="0"/>
+              <a:rPr lang="en-US"/>
               <a:t>Fifth level</a:t>
             </a:r>
             <a:endParaRPr lang="en-US" dirty="0"/>
@@ -7715,35 +7724,35 @@
           <a:p>
             <a:pPr lvl="0"/>
             <a:r>
-              <a:rPr lang="en-US" smtClean="0"/>
+              <a:rPr lang="en-US"/>
               <a:t>Edit Master text styles</a:t>
             </a:r>
           </a:p>
           <a:p>
             <a:pPr lvl="1"/>
             <a:r>
-              <a:rPr lang="en-US" smtClean="0"/>
+              <a:rPr lang="en-US"/>
               <a:t>Second level</a:t>
             </a:r>
           </a:p>
           <a:p>
             <a:pPr lvl="2"/>
             <a:r>
-              <a:rPr lang="en-US" smtClean="0"/>
+              <a:rPr lang="en-US"/>
               <a:t>Third level</a:t>
             </a:r>
           </a:p>
           <a:p>
             <a:pPr lvl="3"/>
             <a:r>
-              <a:rPr lang="en-US" smtClean="0"/>
+              <a:rPr lang="en-US"/>
               <a:t>Fourth level</a:t>
             </a:r>
           </a:p>
           <a:p>
             <a:pPr lvl="4"/>
             <a:r>
-              <a:rPr lang="en-US" smtClean="0"/>
+              <a:rPr lang="en-US"/>
               <a:t>Fifth level</a:t>
             </a:r>
             <a:endParaRPr lang="en-US" dirty="0"/>
@@ -7767,7 +7776,7 @@
           <a:p>
             <a:fld id="{48A87A34-81AB-432B-8DAE-1953F412C126}" type="datetimeFigureOut">
               <a:rPr lang="en-US" dirty="0"/>
-              <a:t>12/10/2017</a:t>
+              <a:t>12/11/2017</a:t>
             </a:fld>
             <a:endParaRPr lang="en-US" dirty="0"/>
           </a:p>
@@ -7861,7 +7870,7 @@
           <a:lstStyle/>
           <a:p>
             <a:r>
-              <a:rPr lang="en-US" smtClean="0"/>
+              <a:rPr lang="en-US"/>
               <a:t>Click to edit Master title style</a:t>
             </a:r>
             <a:endParaRPr lang="en-US" dirty="0"/>
@@ -7934,7 +7943,7 @@
           <a:p>
             <a:pPr lvl="0"/>
             <a:r>
-              <a:rPr lang="en-US" smtClean="0"/>
+              <a:rPr lang="en-US"/>
               <a:t>Edit Master text styles</a:t>
             </a:r>
           </a:p>
@@ -7962,35 +7971,35 @@
           <a:p>
             <a:pPr lvl="0"/>
             <a:r>
-              <a:rPr lang="en-US" smtClean="0"/>
+              <a:rPr lang="en-US"/>
               <a:t>Edit Master text styles</a:t>
             </a:r>
           </a:p>
           <a:p>
             <a:pPr lvl="1"/>
             <a:r>
-              <a:rPr lang="en-US" smtClean="0"/>
+              <a:rPr lang="en-US"/>
               <a:t>Second level</a:t>
             </a:r>
           </a:p>
           <a:p>
             <a:pPr lvl="2"/>
             <a:r>
-              <a:rPr lang="en-US" smtClean="0"/>
+              <a:rPr lang="en-US"/>
               <a:t>Third level</a:t>
             </a:r>
           </a:p>
           <a:p>
             <a:pPr lvl="3"/>
             <a:r>
-              <a:rPr lang="en-US" smtClean="0"/>
+              <a:rPr lang="en-US"/>
               <a:t>Fourth level</a:t>
             </a:r>
           </a:p>
           <a:p>
             <a:pPr lvl="4"/>
             <a:r>
-              <a:rPr lang="en-US" smtClean="0"/>
+              <a:rPr lang="en-US"/>
               <a:t>Fifth level</a:t>
             </a:r>
             <a:endParaRPr lang="en-US" dirty="0"/>
@@ -8063,7 +8072,7 @@
           <a:p>
             <a:pPr lvl="0"/>
             <a:r>
-              <a:rPr lang="en-US" smtClean="0"/>
+              <a:rPr lang="en-US"/>
               <a:t>Edit Master text styles</a:t>
             </a:r>
           </a:p>
@@ -8091,35 +8100,35 @@
           <a:p>
             <a:pPr lvl="0"/>
             <a:r>
-              <a:rPr lang="en-US" smtClean="0"/>
+              <a:rPr lang="en-US"/>
               <a:t>Edit Master text styles</a:t>
             </a:r>
           </a:p>
           <a:p>
             <a:pPr lvl="1"/>
             <a:r>
-              <a:rPr lang="en-US" smtClean="0"/>
+              <a:rPr lang="en-US"/>
               <a:t>Second level</a:t>
             </a:r>
           </a:p>
           <a:p>
             <a:pPr lvl="2"/>
             <a:r>
-              <a:rPr lang="en-US" smtClean="0"/>
+              <a:rPr lang="en-US"/>
               <a:t>Third level</a:t>
             </a:r>
           </a:p>
           <a:p>
             <a:pPr lvl="3"/>
             <a:r>
-              <a:rPr lang="en-US" smtClean="0"/>
+              <a:rPr lang="en-US"/>
               <a:t>Fourth level</a:t>
             </a:r>
           </a:p>
           <a:p>
             <a:pPr lvl="4"/>
             <a:r>
-              <a:rPr lang="en-US" smtClean="0"/>
+              <a:rPr lang="en-US"/>
               <a:t>Fifth level</a:t>
             </a:r>
             <a:endParaRPr lang="en-US" dirty="0"/>
@@ -8143,7 +8152,7 @@
           <a:p>
             <a:fld id="{48A87A34-81AB-432B-8DAE-1953F412C126}" type="datetimeFigureOut">
               <a:rPr lang="en-US" dirty="0"/>
-              <a:t>12/10/2017</a:t>
+              <a:t>12/11/2017</a:t>
             </a:fld>
             <a:endParaRPr lang="en-US" dirty="0"/>
           </a:p>
@@ -8232,7 +8241,7 @@
           <a:lstStyle/>
           <a:p>
             <a:r>
-              <a:rPr lang="en-US" smtClean="0"/>
+              <a:rPr lang="en-US"/>
               <a:t>Click to edit Master title style</a:t>
             </a:r>
             <a:endParaRPr lang="en-US" dirty="0"/>
@@ -8256,7 +8265,7 @@
           <a:p>
             <a:fld id="{48A87A34-81AB-432B-8DAE-1953F412C126}" type="datetimeFigureOut">
               <a:rPr lang="en-US" dirty="0"/>
-              <a:t>12/10/2017</a:t>
+              <a:t>12/11/2017</a:t>
             </a:fld>
             <a:endParaRPr lang="en-US" dirty="0"/>
           </a:p>
@@ -8346,7 +8355,7 @@
           <a:p>
             <a:fld id="{48A87A34-81AB-432B-8DAE-1953F412C126}" type="datetimeFigureOut">
               <a:rPr lang="en-US" dirty="0"/>
-              <a:t>12/10/2017</a:t>
+              <a:t>12/11/2017</a:t>
             </a:fld>
             <a:endParaRPr lang="en-US" dirty="0"/>
           </a:p>
@@ -8444,7 +8453,7 @@
           </a:lstStyle>
           <a:p>
             <a:r>
-              <a:rPr lang="en-US" smtClean="0"/>
+              <a:rPr lang="en-US"/>
               <a:t>Click to edit Master title style</a:t>
             </a:r>
             <a:endParaRPr lang="en-US" dirty="0"/>
@@ -8473,35 +8482,35 @@
           <a:p>
             <a:pPr lvl="0"/>
             <a:r>
-              <a:rPr lang="en-US" smtClean="0"/>
+              <a:rPr lang="en-US"/>
               <a:t>Edit Master text styles</a:t>
             </a:r>
           </a:p>
           <a:p>
             <a:pPr lvl="1"/>
             <a:r>
-              <a:rPr lang="en-US" smtClean="0"/>
+              <a:rPr lang="en-US"/>
               <a:t>Second level</a:t>
             </a:r>
           </a:p>
           <a:p>
             <a:pPr lvl="2"/>
             <a:r>
-              <a:rPr lang="en-US" smtClean="0"/>
+              <a:rPr lang="en-US"/>
               <a:t>Third level</a:t>
             </a:r>
           </a:p>
           <a:p>
             <a:pPr lvl="3"/>
             <a:r>
-              <a:rPr lang="en-US" smtClean="0"/>
+              <a:rPr lang="en-US"/>
               <a:t>Fourth level</a:t>
             </a:r>
           </a:p>
           <a:p>
             <a:pPr lvl="4"/>
             <a:r>
-              <a:rPr lang="en-US" smtClean="0"/>
+              <a:rPr lang="en-US"/>
               <a:t>Fifth level</a:t>
             </a:r>
             <a:endParaRPr lang="en-US" dirty="0"/>
@@ -8567,7 +8576,7 @@
           <a:p>
             <a:pPr lvl="0"/>
             <a:r>
-              <a:rPr lang="en-US" smtClean="0"/>
+              <a:rPr lang="en-US"/>
               <a:t>Edit Master text styles</a:t>
             </a:r>
           </a:p>
@@ -8590,7 +8599,7 @@
           <a:p>
             <a:fld id="{48A87A34-81AB-432B-8DAE-1953F412C126}" type="datetimeFigureOut">
               <a:rPr lang="en-US" dirty="0"/>
-              <a:t>12/10/2017</a:t>
+              <a:t>12/11/2017</a:t>
             </a:fld>
             <a:endParaRPr lang="en-US" dirty="0"/>
           </a:p>
@@ -8688,7 +8697,7 @@
           </a:lstStyle>
           <a:p>
             <a:r>
-              <a:rPr lang="en-US" smtClean="0"/>
+              <a:rPr lang="en-US"/>
               <a:t>Click to edit Master title style</a:t>
             </a:r>
             <a:endParaRPr lang="en-US" dirty="0"/>
@@ -8776,7 +8785,7 @@
           </a:lstStyle>
           <a:p>
             <a:r>
-              <a:rPr lang="en-US" smtClean="0"/>
+              <a:rPr lang="en-US"/>
               <a:t>Click icon to add picture</a:t>
             </a:r>
             <a:endParaRPr lang="en-US" dirty="0"/>
@@ -8842,7 +8851,7 @@
           <a:p>
             <a:pPr lvl="0"/>
             <a:r>
-              <a:rPr lang="en-US" smtClean="0"/>
+              <a:rPr lang="en-US"/>
               <a:t>Edit Master text styles</a:t>
             </a:r>
           </a:p>
@@ -8865,7 +8874,7 @@
           <a:p>
             <a:fld id="{48A87A34-81AB-432B-8DAE-1953F412C126}" type="datetimeFigureOut">
               <a:rPr lang="en-US" dirty="0"/>
-              <a:t>12/10/2017</a:t>
+              <a:t>12/11/2017</a:t>
             </a:fld>
             <a:endParaRPr lang="en-US" dirty="0"/>
           </a:p>
@@ -8983,7 +8992,7 @@
           <a:noFill/>
           <a:extLst>
             <a:ext uri="{909E8E84-426E-40dd-AFC4-6F175D3DCCD1}">
-              <a14:hiddenFill xmlns:a14="http://schemas.microsoft.com/office/drawing/2010/main" xmlns="">
+              <a14:hiddenFill xmlns="" xmlns:a14="http://schemas.microsoft.com/office/drawing/2010/main">
                 <a:solidFill>
                   <a:srgbClr val="FFFFFF"/>
                 </a:solidFill>
@@ -9057,7 +9066,7 @@
               </a:ln>
               <a:extLst>
                 <a:ext uri="{91240B29-F687-4f45-9708-019B960494DF}">
-                  <a14:hiddenLine xmlns:a14="http://schemas.microsoft.com/office/drawing/2010/main" xmlns="" w="9525">
+                  <a14:hiddenLine xmlns="" xmlns:a14="http://schemas.microsoft.com/office/drawing/2010/main" w="9525">
                     <a:solidFill>
                       <a:srgbClr val="000000"/>
                     </a:solidFill>
@@ -9147,7 +9156,7 @@
               </a:ln>
               <a:extLst>
                 <a:ext uri="{91240B29-F687-4f45-9708-019B960494DF}">
-                  <a14:hiddenLine xmlns:a14="http://schemas.microsoft.com/office/drawing/2010/main" xmlns="" w="9525">
+                  <a14:hiddenLine xmlns="" xmlns:a14="http://schemas.microsoft.com/office/drawing/2010/main" w="9525">
                     <a:solidFill>
                       <a:srgbClr val="000000"/>
                     </a:solidFill>
@@ -9237,7 +9246,7 @@
               </a:ln>
               <a:extLst>
                 <a:ext uri="{91240B29-F687-4f45-9708-019B960494DF}">
-                  <a14:hiddenLine xmlns:a14="http://schemas.microsoft.com/office/drawing/2010/main" xmlns="" w="9525">
+                  <a14:hiddenLine xmlns="" xmlns:a14="http://schemas.microsoft.com/office/drawing/2010/main" w="9525">
                     <a:solidFill>
                       <a:srgbClr val="000000"/>
                     </a:solidFill>
@@ -9299,7 +9308,7 @@
               </a:ln>
               <a:extLst>
                 <a:ext uri="{91240B29-F687-4f45-9708-019B960494DF}">
-                  <a14:hiddenLine xmlns:a14="http://schemas.microsoft.com/office/drawing/2010/main" xmlns="" w="9525">
+                  <a14:hiddenLine xmlns="" xmlns:a14="http://schemas.microsoft.com/office/drawing/2010/main" w="9525">
                     <a:solidFill>
                       <a:srgbClr val="000000"/>
                     </a:solidFill>
@@ -9389,7 +9398,7 @@
               </a:ln>
               <a:extLst>
                 <a:ext uri="{91240B29-F687-4f45-9708-019B960494DF}">
-                  <a14:hiddenLine xmlns:a14="http://schemas.microsoft.com/office/drawing/2010/main" xmlns="" w="9525">
+                  <a14:hiddenLine xmlns="" xmlns:a14="http://schemas.microsoft.com/office/drawing/2010/main" w="9525">
                     <a:solidFill>
                       <a:srgbClr val="000000"/>
                     </a:solidFill>
@@ -9451,7 +9460,7 @@
               </a:ln>
               <a:extLst>
                 <a:ext uri="{91240B29-F687-4f45-9708-019B960494DF}">
-                  <a14:hiddenLine xmlns:a14="http://schemas.microsoft.com/office/drawing/2010/main" xmlns="" w="9525">
+                  <a14:hiddenLine xmlns="" xmlns:a14="http://schemas.microsoft.com/office/drawing/2010/main" w="9525">
                     <a:solidFill>
                       <a:srgbClr val="000000"/>
                     </a:solidFill>
@@ -9513,7 +9522,7 @@
               </a:ln>
               <a:extLst>
                 <a:ext uri="{91240B29-F687-4f45-9708-019B960494DF}">
-                  <a14:hiddenLine xmlns:a14="http://schemas.microsoft.com/office/drawing/2010/main" xmlns="" w="9525">
+                  <a14:hiddenLine xmlns="" xmlns:a14="http://schemas.microsoft.com/office/drawing/2010/main" w="9525">
                     <a:solidFill>
                       <a:srgbClr val="000000"/>
                     </a:solidFill>
@@ -9603,7 +9612,7 @@
               </a:ln>
               <a:extLst>
                 <a:ext uri="{91240B29-F687-4f45-9708-019B960494DF}">
-                  <a14:hiddenLine xmlns:a14="http://schemas.microsoft.com/office/drawing/2010/main" xmlns="" w="9525">
+                  <a14:hiddenLine xmlns="" xmlns:a14="http://schemas.microsoft.com/office/drawing/2010/main" w="9525">
                     <a:solidFill>
                       <a:srgbClr val="000000"/>
                     </a:solidFill>
@@ -9693,7 +9702,7 @@
               </a:ln>
               <a:extLst>
                 <a:ext uri="{91240B29-F687-4f45-9708-019B960494DF}">
-                  <a14:hiddenLine xmlns:a14="http://schemas.microsoft.com/office/drawing/2010/main" xmlns="" w="9525">
+                  <a14:hiddenLine xmlns="" xmlns:a14="http://schemas.microsoft.com/office/drawing/2010/main" w="9525">
                     <a:solidFill>
                       <a:srgbClr val="000000"/>
                     </a:solidFill>
@@ -9755,7 +9764,7 @@
               </a:ln>
               <a:extLst>
                 <a:ext uri="{91240B29-F687-4f45-9708-019B960494DF}">
-                  <a14:hiddenLine xmlns:a14="http://schemas.microsoft.com/office/drawing/2010/main" xmlns="" w="9525">
+                  <a14:hiddenLine xmlns="" xmlns:a14="http://schemas.microsoft.com/office/drawing/2010/main" w="9525">
                     <a:solidFill>
                       <a:srgbClr val="000000"/>
                     </a:solidFill>
@@ -9865,7 +9874,7 @@
               </a:ln>
               <a:extLst>
                 <a:ext uri="{91240B29-F687-4f45-9708-019B960494DF}">
-                  <a14:hiddenLine xmlns:a14="http://schemas.microsoft.com/office/drawing/2010/main" xmlns="" w="9525">
+                  <a14:hiddenLine xmlns="" xmlns:a14="http://schemas.microsoft.com/office/drawing/2010/main" w="9525">
                     <a:solidFill>
                       <a:srgbClr val="000000"/>
                     </a:solidFill>
@@ -9949,7 +9958,7 @@
               </a:ln>
               <a:extLst>
                 <a:ext uri="{91240B29-F687-4f45-9708-019B960494DF}">
-                  <a14:hiddenLine xmlns:a14="http://schemas.microsoft.com/office/drawing/2010/main" xmlns="" w="9525">
+                  <a14:hiddenLine xmlns="" xmlns:a14="http://schemas.microsoft.com/office/drawing/2010/main" w="9525">
                     <a:solidFill>
                       <a:srgbClr val="000000"/>
                     </a:solidFill>
@@ -10011,7 +10020,7 @@
               </a:ln>
               <a:extLst>
                 <a:ext uri="{91240B29-F687-4f45-9708-019B960494DF}">
-                  <a14:hiddenLine xmlns:a14="http://schemas.microsoft.com/office/drawing/2010/main" xmlns="" w="9525">
+                  <a14:hiddenLine xmlns="" xmlns:a14="http://schemas.microsoft.com/office/drawing/2010/main" w="9525">
                     <a:solidFill>
                       <a:srgbClr val="000000"/>
                     </a:solidFill>
@@ -10073,7 +10082,7 @@
               </a:ln>
               <a:extLst>
                 <a:ext uri="{91240B29-F687-4f45-9708-019B960494DF}">
-                  <a14:hiddenLine xmlns:a14="http://schemas.microsoft.com/office/drawing/2010/main" xmlns="" w="9525">
+                  <a14:hiddenLine xmlns="" xmlns:a14="http://schemas.microsoft.com/office/drawing/2010/main" w="9525">
                     <a:solidFill>
                       <a:srgbClr val="000000"/>
                     </a:solidFill>
@@ -10163,7 +10172,7 @@
               </a:ln>
               <a:extLst>
                 <a:ext uri="{91240B29-F687-4f45-9708-019B960494DF}">
-                  <a14:hiddenLine xmlns:a14="http://schemas.microsoft.com/office/drawing/2010/main" xmlns="" w="9525">
+                  <a14:hiddenLine xmlns="" xmlns:a14="http://schemas.microsoft.com/office/drawing/2010/main" w="9525">
                     <a:solidFill>
                       <a:srgbClr val="000000"/>
                     </a:solidFill>
@@ -10197,7 +10206,7 @@
               </a:ln>
               <a:extLst>
                 <a:ext uri="{91240B29-F687-4f45-9708-019B960494DF}">
-                  <a14:hiddenLine xmlns:a14="http://schemas.microsoft.com/office/drawing/2010/main" xmlns="" w="9525">
+                  <a14:hiddenLine xmlns="" xmlns:a14="http://schemas.microsoft.com/office/drawing/2010/main" w="9525">
                     <a:solidFill>
                       <a:srgbClr val="000000"/>
                     </a:solidFill>
@@ -10262,7 +10271,7 @@
               </a:ln>
               <a:extLst>
                 <a:ext uri="{91240B29-F687-4f45-9708-019B960494DF}">
-                  <a14:hiddenLine xmlns:a14="http://schemas.microsoft.com/office/drawing/2010/main" xmlns="" w="9525">
+                  <a14:hiddenLine xmlns="" xmlns:a14="http://schemas.microsoft.com/office/drawing/2010/main" w="9525">
                     <a:solidFill>
                       <a:srgbClr val="000000"/>
                     </a:solidFill>
@@ -10352,7 +10361,7 @@
               </a:ln>
               <a:extLst>
                 <a:ext uri="{91240B29-F687-4f45-9708-019B960494DF}">
-                  <a14:hiddenLine xmlns:a14="http://schemas.microsoft.com/office/drawing/2010/main" xmlns="" w="9525">
+                  <a14:hiddenLine xmlns="" xmlns:a14="http://schemas.microsoft.com/office/drawing/2010/main" w="9525">
                     <a:solidFill>
                       <a:srgbClr val="000000"/>
                     </a:solidFill>
@@ -10414,7 +10423,7 @@
               </a:ln>
               <a:extLst>
                 <a:ext uri="{91240B29-F687-4f45-9708-019B960494DF}">
-                  <a14:hiddenLine xmlns:a14="http://schemas.microsoft.com/office/drawing/2010/main" xmlns="" w="9525">
+                  <a14:hiddenLine xmlns="" xmlns:a14="http://schemas.microsoft.com/office/drawing/2010/main" w="9525">
                     <a:solidFill>
                       <a:srgbClr val="000000"/>
                     </a:solidFill>
@@ -10504,7 +10513,7 @@
               </a:ln>
               <a:extLst>
                 <a:ext uri="{91240B29-F687-4f45-9708-019B960494DF}">
-                  <a14:hiddenLine xmlns:a14="http://schemas.microsoft.com/office/drawing/2010/main" xmlns="" w="9525">
+                  <a14:hiddenLine xmlns="" xmlns:a14="http://schemas.microsoft.com/office/drawing/2010/main" w="9525">
                     <a:solidFill>
                       <a:srgbClr val="000000"/>
                     </a:solidFill>
@@ -10569,7 +10578,7 @@
               </a:ln>
               <a:extLst>
                 <a:ext uri="{91240B29-F687-4f45-9708-019B960494DF}">
-                  <a14:hiddenLine xmlns:a14="http://schemas.microsoft.com/office/drawing/2010/main" xmlns="" w="9525">
+                  <a14:hiddenLine xmlns="" xmlns:a14="http://schemas.microsoft.com/office/drawing/2010/main" w="9525">
                     <a:solidFill>
                       <a:srgbClr val="000000"/>
                     </a:solidFill>
@@ -10631,7 +10640,7 @@
               </a:ln>
               <a:extLst>
                 <a:ext uri="{91240B29-F687-4f45-9708-019B960494DF}">
-                  <a14:hiddenLine xmlns:a14="http://schemas.microsoft.com/office/drawing/2010/main" xmlns="" w="9525">
+                  <a14:hiddenLine xmlns="" xmlns:a14="http://schemas.microsoft.com/office/drawing/2010/main" w="9525">
                     <a:solidFill>
                       <a:srgbClr val="000000"/>
                     </a:solidFill>
@@ -10721,7 +10730,7 @@
               </a:ln>
               <a:extLst>
                 <a:ext uri="{91240B29-F687-4f45-9708-019B960494DF}">
-                  <a14:hiddenLine xmlns:a14="http://schemas.microsoft.com/office/drawing/2010/main" xmlns="" w="9525">
+                  <a14:hiddenLine xmlns="" xmlns:a14="http://schemas.microsoft.com/office/drawing/2010/main" w="9525">
                     <a:solidFill>
                       <a:srgbClr val="000000"/>
                     </a:solidFill>
@@ -10811,7 +10820,7 @@
               </a:ln>
               <a:extLst>
                 <a:ext uri="{91240B29-F687-4f45-9708-019B960494DF}">
-                  <a14:hiddenLine xmlns:a14="http://schemas.microsoft.com/office/drawing/2010/main" xmlns="" w="9525">
+                  <a14:hiddenLine xmlns="" xmlns:a14="http://schemas.microsoft.com/office/drawing/2010/main" w="9525">
                     <a:solidFill>
                       <a:srgbClr val="000000"/>
                     </a:solidFill>
@@ -10876,7 +10885,7 @@
               </a:ln>
               <a:extLst>
                 <a:ext uri="{91240B29-F687-4f45-9708-019B960494DF}">
-                  <a14:hiddenLine xmlns:a14="http://schemas.microsoft.com/office/drawing/2010/main" xmlns="" w="9525">
+                  <a14:hiddenLine xmlns="" xmlns:a14="http://schemas.microsoft.com/office/drawing/2010/main" w="9525">
                     <a:solidFill>
                       <a:srgbClr val="000000"/>
                     </a:solidFill>
@@ -10996,7 +11005,7 @@
               </a:ln>
               <a:extLst>
                 <a:ext uri="{91240B29-F687-4f45-9708-019B960494DF}">
-                  <a14:hiddenLine xmlns:a14="http://schemas.microsoft.com/office/drawing/2010/main" xmlns="" w="9525">
+                  <a14:hiddenLine xmlns="" xmlns:a14="http://schemas.microsoft.com/office/drawing/2010/main" w="9525">
                     <a:solidFill>
                       <a:srgbClr val="000000"/>
                     </a:solidFill>
@@ -11077,7 +11086,7 @@
               </a:ln>
               <a:extLst>
                 <a:ext uri="{91240B29-F687-4f45-9708-019B960494DF}">
-                  <a14:hiddenLine xmlns:a14="http://schemas.microsoft.com/office/drawing/2010/main" xmlns="" w="9525">
+                  <a14:hiddenLine xmlns="" xmlns:a14="http://schemas.microsoft.com/office/drawing/2010/main" w="9525">
                     <a:solidFill>
                       <a:srgbClr val="000000"/>
                     </a:solidFill>
@@ -11192,7 +11201,7 @@
               </a:ln>
               <a:extLst>
                 <a:ext uri="{91240B29-F687-4f45-9708-019B960494DF}">
-                  <a14:hiddenLine xmlns:a14="http://schemas.microsoft.com/office/drawing/2010/main" xmlns="" w="9525">
+                  <a14:hiddenLine xmlns="" xmlns:a14="http://schemas.microsoft.com/office/drawing/2010/main" w="9525">
                     <a:solidFill>
                       <a:srgbClr val="000000"/>
                     </a:solidFill>
@@ -11282,7 +11291,7 @@
               </a:ln>
               <a:extLst>
                 <a:ext uri="{91240B29-F687-4f45-9708-019B960494DF}">
-                  <a14:hiddenLine xmlns:a14="http://schemas.microsoft.com/office/drawing/2010/main" xmlns="" w="9525">
+                  <a14:hiddenLine xmlns="" xmlns:a14="http://schemas.microsoft.com/office/drawing/2010/main" w="9525">
                     <a:solidFill>
                       <a:srgbClr val="000000"/>
                     </a:solidFill>
@@ -11347,7 +11356,7 @@
               </a:ln>
               <a:extLst>
                 <a:ext uri="{91240B29-F687-4f45-9708-019B960494DF}">
-                  <a14:hiddenLine xmlns:a14="http://schemas.microsoft.com/office/drawing/2010/main" xmlns="" w="9525">
+                  <a14:hiddenLine xmlns="" xmlns:a14="http://schemas.microsoft.com/office/drawing/2010/main" w="9525">
                     <a:solidFill>
                       <a:srgbClr val="000000"/>
                     </a:solidFill>
@@ -11437,7 +11446,7 @@
               </a:ln>
               <a:extLst>
                 <a:ext uri="{91240B29-F687-4f45-9708-019B960494DF}">
-                  <a14:hiddenLine xmlns:a14="http://schemas.microsoft.com/office/drawing/2010/main" xmlns="" w="9525">
+                  <a14:hiddenLine xmlns="" xmlns:a14="http://schemas.microsoft.com/office/drawing/2010/main" w="9525">
                     <a:solidFill>
                       <a:srgbClr val="000000"/>
                     </a:solidFill>
@@ -11505,7 +11514,7 @@
               </a:ln>
               <a:extLst>
                 <a:ext uri="{91240B29-F687-4f45-9708-019B960494DF}">
-                  <a14:hiddenLine xmlns:a14="http://schemas.microsoft.com/office/drawing/2010/main" xmlns="" w="9525">
+                  <a14:hiddenLine xmlns="" xmlns:a14="http://schemas.microsoft.com/office/drawing/2010/main" w="9525">
                     <a:solidFill>
                       <a:srgbClr val="000000"/>
                     </a:solidFill>
@@ -11595,7 +11604,7 @@
               </a:ln>
               <a:extLst>
                 <a:ext uri="{91240B29-F687-4f45-9708-019B960494DF}">
-                  <a14:hiddenLine xmlns:a14="http://schemas.microsoft.com/office/drawing/2010/main" xmlns="" w="9525">
+                  <a14:hiddenLine xmlns="" xmlns:a14="http://schemas.microsoft.com/office/drawing/2010/main" w="9525">
                     <a:solidFill>
                       <a:srgbClr val="000000"/>
                     </a:solidFill>
@@ -11663,7 +11672,7 @@
               </a:ln>
               <a:extLst>
                 <a:ext uri="{91240B29-F687-4f45-9708-019B960494DF}">
-                  <a14:hiddenLine xmlns:a14="http://schemas.microsoft.com/office/drawing/2010/main" xmlns="" w="9525">
+                  <a14:hiddenLine xmlns="" xmlns:a14="http://schemas.microsoft.com/office/drawing/2010/main" w="9525">
                     <a:solidFill>
                       <a:srgbClr val="000000"/>
                     </a:solidFill>
@@ -11753,7 +11762,7 @@
               </a:ln>
               <a:extLst>
                 <a:ext uri="{91240B29-F687-4f45-9708-019B960494DF}">
-                  <a14:hiddenLine xmlns:a14="http://schemas.microsoft.com/office/drawing/2010/main" xmlns="" w="9525">
+                  <a14:hiddenLine xmlns="" xmlns:a14="http://schemas.microsoft.com/office/drawing/2010/main" w="9525">
                     <a:solidFill>
                       <a:srgbClr val="000000"/>
                     </a:solidFill>
@@ -11787,7 +11796,7 @@
               </a:ln>
               <a:extLst>
                 <a:ext uri="{91240B29-F687-4f45-9708-019B960494DF}">
-                  <a14:hiddenLine xmlns:a14="http://schemas.microsoft.com/office/drawing/2010/main" xmlns="" w="9525">
+                  <a14:hiddenLine xmlns="" xmlns:a14="http://schemas.microsoft.com/office/drawing/2010/main" w="9525">
                     <a:solidFill>
                       <a:srgbClr val="000000"/>
                     </a:solidFill>
@@ -11857,35 +11866,35 @@
           <a:p>
             <a:pPr lvl="0"/>
             <a:r>
-              <a:rPr lang="en-US" smtClean="0"/>
+              <a:rPr lang="en-US"/>
               <a:t>Edit Master text styles</a:t>
             </a:r>
           </a:p>
           <a:p>
             <a:pPr lvl="1"/>
             <a:r>
-              <a:rPr lang="en-US" smtClean="0"/>
+              <a:rPr lang="en-US"/>
               <a:t>Second level</a:t>
             </a:r>
           </a:p>
           <a:p>
             <a:pPr lvl="2"/>
             <a:r>
-              <a:rPr lang="en-US" smtClean="0"/>
+              <a:rPr lang="en-US"/>
               <a:t>Third level</a:t>
             </a:r>
           </a:p>
           <a:p>
             <a:pPr lvl="3"/>
             <a:r>
-              <a:rPr lang="en-US" smtClean="0"/>
+              <a:rPr lang="en-US"/>
               <a:t>Fourth level</a:t>
             </a:r>
           </a:p>
           <a:p>
             <a:pPr lvl="4"/>
             <a:r>
-              <a:rPr lang="en-US" smtClean="0"/>
+              <a:rPr lang="en-US"/>
               <a:t>Fifth level</a:t>
             </a:r>
             <a:endParaRPr lang="en-US" dirty="0"/>
@@ -11928,7 +11937,7 @@
             <a:fld id="{48A87A34-81AB-432B-8DAE-1953F412C126}" type="datetimeFigureOut">
               <a:rPr lang="en-US" dirty="0"/>
               <a:pPr/>
-              <a:t>12/10/2017</a:t>
+              <a:t>12/11/2017</a:t>
             </a:fld>
             <a:endParaRPr lang="en-US" dirty="0"/>
           </a:p>
@@ -12366,10 +12375,9 @@
           <a:p>
             <a:pPr algn="ctr"/>
             <a:r>
-              <a:rPr lang="en-US" dirty="0" smtClean="0"/>
+              <a:rPr lang="en-US" dirty="0"/>
               <a:t>Pong!</a:t>
             </a:r>
-            <a:endParaRPr lang="en-US" dirty="0"/>
           </a:p>
         </p:txBody>
       </p:sp>
@@ -12394,10 +12402,9 @@
           <a:lstStyle/>
           <a:p>
             <a:r>
-              <a:rPr lang="en-US" dirty="0" smtClean="0"/>
+              <a:rPr lang="en-US" dirty="0"/>
               <a:t>By: McKenna Galle, Alex Blair, and Andrew Hutson</a:t>
             </a:r>
-            <a:endParaRPr lang="en-US" dirty="0"/>
           </a:p>
         </p:txBody>
       </p:sp>
@@ -12510,10 +12517,9 @@
           <a:lstStyle/>
           <a:p>
             <a:r>
-              <a:rPr lang="en-US" dirty="0" smtClean="0"/>
+              <a:rPr lang="en-US" dirty="0"/>
               <a:t>Goals</a:t>
             </a:r>
-            <a:endParaRPr lang="en-US" dirty="0"/>
           </a:p>
         </p:txBody>
       </p:sp>
@@ -12543,13 +12549,13 @@
               <a:buNone/>
             </a:pPr>
             <a:r>
-              <a:rPr lang="en-US" dirty="0" smtClean="0"/>
+              <a:rPr lang="en-US" dirty="0"/>
               <a:t>Ultimate goal:</a:t>
             </a:r>
           </a:p>
           <a:p>
             <a:r>
-              <a:rPr lang="en-US" dirty="0" smtClean="0"/>
+              <a:rPr lang="en-US" dirty="0"/>
               <a:t>To successfully implement Pong using VHDL and our Nexys 4 DDR Board.</a:t>
             </a:r>
           </a:p>
@@ -12558,40 +12564,39 @@
               <a:buNone/>
             </a:pPr>
             <a:r>
-              <a:rPr lang="en-US" dirty="0" smtClean="0"/>
+              <a:rPr lang="en-US" dirty="0"/>
               <a:t>Stepping Stones:</a:t>
             </a:r>
           </a:p>
           <a:p>
             <a:r>
-              <a:rPr lang="en-US" dirty="0" smtClean="0"/>
+              <a:rPr lang="en-US" dirty="0"/>
               <a:t>To reduce the size of the box in the bouncing box example</a:t>
             </a:r>
           </a:p>
           <a:p>
             <a:r>
-              <a:rPr lang="en-US" dirty="0" smtClean="0"/>
+              <a:rPr lang="en-US" dirty="0"/>
               <a:t>Add paddles</a:t>
             </a:r>
           </a:p>
           <a:p>
             <a:r>
-              <a:rPr lang="en-US" dirty="0" smtClean="0"/>
+              <a:rPr lang="en-US" dirty="0"/>
               <a:t>Map paddles to switches</a:t>
             </a:r>
           </a:p>
           <a:p>
             <a:r>
-              <a:rPr lang="en-US" dirty="0" smtClean="0"/>
+              <a:rPr lang="en-US" dirty="0"/>
               <a:t>Successfully implement collision</a:t>
             </a:r>
           </a:p>
           <a:p>
             <a:r>
-              <a:rPr lang="en-US" dirty="0" smtClean="0"/>
+              <a:rPr lang="en-US" dirty="0"/>
               <a:t>Map score to the 7seg display </a:t>
             </a:r>
-            <a:endParaRPr lang="en-US" dirty="0"/>
           </a:p>
         </p:txBody>
       </p:sp>
@@ -12640,7 +12645,10 @@
           <a:bodyPr/>
           <a:lstStyle/>
           <a:p>
-            <a:endParaRPr lang="en-US"/>
+            <a:r>
+              <a:rPr lang="en-US" dirty="0"/>
+              <a:t>Status of Goals</a:t>
+            </a:r>
           </a:p>
         </p:txBody>
       </p:sp>
@@ -12656,10 +12664,182 @@
         </p:nvSpPr>
         <p:spPr/>
         <p:txBody>
-          <a:bodyPr/>
+          <a:bodyPr>
+            <a:normAutofit fontScale="92500" lnSpcReduction="20000"/>
+          </a:bodyPr>
           <a:lstStyle/>
           <a:p>
-            <a:endParaRPr lang="en-US"/>
+            <a:pPr marL="0" lvl="0" indent="0">
+              <a:buNone/>
+            </a:pPr>
+            <a:r>
+              <a:rPr lang="en-US" sz="2200" dirty="0">
+                <a:solidFill>
+                  <a:prstClr val="white"/>
+                </a:solidFill>
+              </a:rPr>
+              <a:t>Ultimate goal:</a:t>
+            </a:r>
+          </a:p>
+          <a:p>
+            <a:pPr lvl="0"/>
+            <a:r>
+              <a:rPr lang="en-US" sz="2200" dirty="0">
+                <a:solidFill>
+                  <a:prstClr val="white"/>
+                </a:solidFill>
+              </a:rPr>
+              <a:t>To successfully implement Pong using VHDL and our Nexys 4 DDR Board. – </a:t>
+            </a:r>
+            <a:r>
+              <a:rPr lang="en-US" sz="2200" dirty="0">
+                <a:solidFill>
+                  <a:srgbClr val="FFC000"/>
+                </a:solidFill>
+              </a:rPr>
+              <a:t>Mostly Successful</a:t>
+            </a:r>
+            <a:endParaRPr lang="en-US" sz="2200" dirty="0">
+              <a:solidFill>
+                <a:prstClr val="white"/>
+              </a:solidFill>
+            </a:endParaRPr>
+          </a:p>
+          <a:p>
+            <a:pPr marL="0" lvl="0" indent="0">
+              <a:buNone/>
+            </a:pPr>
+            <a:r>
+              <a:rPr lang="en-US" sz="2200" dirty="0">
+                <a:solidFill>
+                  <a:prstClr val="white"/>
+                </a:solidFill>
+              </a:rPr>
+              <a:t>Stepping Stones:</a:t>
+            </a:r>
+          </a:p>
+          <a:p>
+            <a:pPr lvl="0"/>
+            <a:r>
+              <a:rPr lang="en-US" sz="2200" dirty="0">
+                <a:solidFill>
+                  <a:prstClr val="white"/>
+                </a:solidFill>
+              </a:rPr>
+              <a:t>To reduce the size of the box in the bouncing box example - </a:t>
+            </a:r>
+            <a:r>
+              <a:rPr lang="en-US" sz="2200" dirty="0">
+                <a:solidFill>
+                  <a:srgbClr val="00B050"/>
+                </a:solidFill>
+              </a:rPr>
+              <a:t>Successful</a:t>
+            </a:r>
+            <a:endParaRPr lang="en-US" sz="2200" dirty="0">
+              <a:solidFill>
+                <a:prstClr val="white"/>
+              </a:solidFill>
+            </a:endParaRPr>
+          </a:p>
+          <a:p>
+            <a:pPr lvl="0"/>
+            <a:r>
+              <a:rPr lang="en-US" sz="2200" dirty="0">
+                <a:solidFill>
+                  <a:prstClr val="white"/>
+                </a:solidFill>
+              </a:rPr>
+              <a:t>Add paddles - </a:t>
+            </a:r>
+            <a:r>
+              <a:rPr lang="en-US" sz="2200" dirty="0">
+                <a:solidFill>
+                  <a:srgbClr val="00B050"/>
+                </a:solidFill>
+              </a:rPr>
+              <a:t>Successful</a:t>
+            </a:r>
+            <a:endParaRPr lang="en-US" sz="2200" dirty="0">
+              <a:solidFill>
+                <a:prstClr val="white"/>
+              </a:solidFill>
+            </a:endParaRPr>
+          </a:p>
+          <a:p>
+            <a:pPr lvl="0"/>
+            <a:r>
+              <a:rPr lang="en-US" sz="2200" dirty="0">
+                <a:solidFill>
+                  <a:prstClr val="white"/>
+                </a:solidFill>
+              </a:rPr>
+              <a:t>Map paddles to switches - </a:t>
+            </a:r>
+            <a:r>
+              <a:rPr lang="en-US" sz="2200" dirty="0">
+                <a:solidFill>
+                  <a:srgbClr val="00B050"/>
+                </a:solidFill>
+              </a:rPr>
+              <a:t>Successful</a:t>
+            </a:r>
+            <a:endParaRPr lang="en-US" sz="2200" dirty="0">
+              <a:solidFill>
+                <a:prstClr val="white"/>
+              </a:solidFill>
+            </a:endParaRPr>
+          </a:p>
+          <a:p>
+            <a:pPr lvl="0"/>
+            <a:r>
+              <a:rPr lang="en-US" sz="2200" dirty="0">
+                <a:solidFill>
+                  <a:prstClr val="white"/>
+                </a:solidFill>
+              </a:rPr>
+              <a:t>Successfully implement collision – </a:t>
+            </a:r>
+            <a:r>
+              <a:rPr lang="en-US" sz="2200" dirty="0">
+                <a:solidFill>
+                  <a:srgbClr val="FFC000"/>
+                </a:solidFill>
+              </a:rPr>
+              <a:t>Mostly Successful</a:t>
+            </a:r>
+            <a:endParaRPr lang="en-US" sz="2200" dirty="0">
+              <a:solidFill>
+                <a:prstClr val="white"/>
+              </a:solidFill>
+            </a:endParaRPr>
+          </a:p>
+          <a:p>
+            <a:pPr lvl="0"/>
+            <a:r>
+              <a:rPr lang="en-US" sz="2200" dirty="0">
+                <a:solidFill>
+                  <a:prstClr val="white"/>
+                </a:solidFill>
+              </a:rPr>
+              <a:t>Map score to the 7seg display - </a:t>
+            </a:r>
+            <a:r>
+              <a:rPr lang="en-US" sz="2200" dirty="0">
+                <a:solidFill>
+                  <a:srgbClr val="FF0000"/>
+                </a:solidFill>
+              </a:rPr>
+              <a:t>Unsuccessful</a:t>
+            </a:r>
+            <a:endParaRPr lang="en-US" sz="2200" dirty="0">
+              <a:solidFill>
+                <a:prstClr val="white"/>
+              </a:solidFill>
+            </a:endParaRPr>
+          </a:p>
+          <a:p>
+            <a:endParaRPr lang="en-US" dirty="0"/>
           </a:p>
         </p:txBody>
       </p:sp>

</xml_diff>

<commit_message>
Finalized Presentation as well as design document
Any edits to the design document are welcome.
</commit_message>
<xml_diff>
--- a/Project_Presentation/PresentationPong.pptx
+++ b/Project_Presentation/PresentationPong.pptx
@@ -8,7 +8,7 @@
     <p:sldId id="256" r:id="rId2"/>
     <p:sldId id="257" r:id="rId3"/>
     <p:sldId id="258" r:id="rId4"/>
-    <p:sldId id="259" r:id="rId5"/>
+    <p:sldId id="263" r:id="rId5"/>
     <p:sldId id="261" r:id="rId6"/>
     <p:sldId id="260" r:id="rId7"/>
     <p:sldId id="262" r:id="rId8"/>
@@ -205,7 +205,7 @@
           <a:noFill/>
           <a:extLst>
             <a:ext uri="{909E8E84-426E-40dd-AFC4-6F175D3DCCD1}">
-              <a14:hiddenFill xmlns="" xmlns:a14="http://schemas.microsoft.com/office/drawing/2010/main">
+              <a14:hiddenFill xmlns:a14="http://schemas.microsoft.com/office/drawing/2010/main" xmlns="">
                 <a:solidFill>
                   <a:srgbClr val="FFFFFF"/>
                 </a:solidFill>
@@ -264,7 +264,7 @@
             </a:ln>
             <a:extLst>
               <a:ext uri="{91240B29-F687-4f45-9708-019B960494DF}">
-                <a14:hiddenLine xmlns="" xmlns:a14="http://schemas.microsoft.com/office/drawing/2010/main" w="9525">
+                <a14:hiddenLine xmlns:a14="http://schemas.microsoft.com/office/drawing/2010/main" xmlns="" w="9525">
                   <a:solidFill>
                     <a:srgbClr val="000000"/>
                   </a:solidFill>
@@ -354,7 +354,7 @@
             </a:ln>
             <a:extLst>
               <a:ext uri="{91240B29-F687-4f45-9708-019B960494DF}">
-                <a14:hiddenLine xmlns="" xmlns:a14="http://schemas.microsoft.com/office/drawing/2010/main" w="9525">
+                <a14:hiddenLine xmlns:a14="http://schemas.microsoft.com/office/drawing/2010/main" xmlns="" w="9525">
                   <a:solidFill>
                     <a:srgbClr val="000000"/>
                   </a:solidFill>
@@ -444,7 +444,7 @@
             </a:ln>
             <a:extLst>
               <a:ext uri="{91240B29-F687-4f45-9708-019B960494DF}">
-                <a14:hiddenLine xmlns="" xmlns:a14="http://schemas.microsoft.com/office/drawing/2010/main" w="9525">
+                <a14:hiddenLine xmlns:a14="http://schemas.microsoft.com/office/drawing/2010/main" xmlns="" w="9525">
                   <a:solidFill>
                     <a:srgbClr val="000000"/>
                   </a:solidFill>
@@ -478,7 +478,7 @@
             </a:ln>
             <a:extLst>
               <a:ext uri="{91240B29-F687-4f45-9708-019B960494DF}">
-                <a14:hiddenLine xmlns="" xmlns:a14="http://schemas.microsoft.com/office/drawing/2010/main" w="9525">
+                <a14:hiddenLine xmlns:a14="http://schemas.microsoft.com/office/drawing/2010/main" xmlns="" w="9525">
                   <a:solidFill>
                     <a:srgbClr val="000000"/>
                   </a:solidFill>
@@ -568,7 +568,7 @@
             </a:ln>
             <a:extLst>
               <a:ext uri="{91240B29-F687-4f45-9708-019B960494DF}">
-                <a14:hiddenLine xmlns="" xmlns:a14="http://schemas.microsoft.com/office/drawing/2010/main" w="9525">
+                <a14:hiddenLine xmlns:a14="http://schemas.microsoft.com/office/drawing/2010/main" xmlns="" w="9525">
                   <a:solidFill>
                     <a:srgbClr val="000000"/>
                   </a:solidFill>
@@ -630,7 +630,7 @@
             </a:ln>
             <a:extLst>
               <a:ext uri="{91240B29-F687-4f45-9708-019B960494DF}">
-                <a14:hiddenLine xmlns="" xmlns:a14="http://schemas.microsoft.com/office/drawing/2010/main" w="9525">
+                <a14:hiddenLine xmlns:a14="http://schemas.microsoft.com/office/drawing/2010/main" xmlns="" w="9525">
                   <a:solidFill>
                     <a:srgbClr val="000000"/>
                   </a:solidFill>
@@ -692,7 +692,7 @@
             </a:ln>
             <a:extLst>
               <a:ext uri="{91240B29-F687-4f45-9708-019B960494DF}">
-                <a14:hiddenLine xmlns="" xmlns:a14="http://schemas.microsoft.com/office/drawing/2010/main" w="9525">
+                <a14:hiddenLine xmlns:a14="http://schemas.microsoft.com/office/drawing/2010/main" xmlns="" w="9525">
                   <a:solidFill>
                     <a:srgbClr val="000000"/>
                   </a:solidFill>
@@ -782,7 +782,7 @@
             </a:ln>
             <a:extLst>
               <a:ext uri="{91240B29-F687-4f45-9708-019B960494DF}">
-                <a14:hiddenLine xmlns="" xmlns:a14="http://schemas.microsoft.com/office/drawing/2010/main" w="9525">
+                <a14:hiddenLine xmlns:a14="http://schemas.microsoft.com/office/drawing/2010/main" xmlns="" w="9525">
                   <a:solidFill>
                     <a:srgbClr val="000000"/>
                   </a:solidFill>
@@ -844,7 +844,7 @@
             </a:ln>
             <a:extLst>
               <a:ext uri="{91240B29-F687-4f45-9708-019B960494DF}">
-                <a14:hiddenLine xmlns="" xmlns:a14="http://schemas.microsoft.com/office/drawing/2010/main" w="9525">
+                <a14:hiddenLine xmlns:a14="http://schemas.microsoft.com/office/drawing/2010/main" xmlns="" w="9525">
                   <a:solidFill>
                     <a:srgbClr val="000000"/>
                   </a:solidFill>
@@ -906,7 +906,7 @@
             </a:ln>
             <a:extLst>
               <a:ext uri="{91240B29-F687-4f45-9708-019B960494DF}">
-                <a14:hiddenLine xmlns="" xmlns:a14="http://schemas.microsoft.com/office/drawing/2010/main" w="9525">
+                <a14:hiddenLine xmlns:a14="http://schemas.microsoft.com/office/drawing/2010/main" xmlns="" w="9525">
                   <a:solidFill>
                     <a:srgbClr val="000000"/>
                   </a:solidFill>
@@ -996,7 +996,7 @@
             </a:ln>
             <a:extLst>
               <a:ext uri="{91240B29-F687-4f45-9708-019B960494DF}">
-                <a14:hiddenLine xmlns="" xmlns:a14="http://schemas.microsoft.com/office/drawing/2010/main" w="9525">
+                <a14:hiddenLine xmlns:a14="http://schemas.microsoft.com/office/drawing/2010/main" xmlns="" w="9525">
                   <a:solidFill>
                     <a:srgbClr val="000000"/>
                   </a:solidFill>
@@ -1086,7 +1086,7 @@
             </a:ln>
             <a:extLst>
               <a:ext uri="{91240B29-F687-4f45-9708-019B960494DF}">
-                <a14:hiddenLine xmlns="" xmlns:a14="http://schemas.microsoft.com/office/drawing/2010/main" w="9525">
+                <a14:hiddenLine xmlns:a14="http://schemas.microsoft.com/office/drawing/2010/main" xmlns="" w="9525">
                   <a:solidFill>
                     <a:srgbClr val="000000"/>
                   </a:solidFill>
@@ -1148,7 +1148,7 @@
             </a:ln>
             <a:extLst>
               <a:ext uri="{91240B29-F687-4f45-9708-019B960494DF}">
-                <a14:hiddenLine xmlns="" xmlns:a14="http://schemas.microsoft.com/office/drawing/2010/main" w="9525">
+                <a14:hiddenLine xmlns:a14="http://schemas.microsoft.com/office/drawing/2010/main" xmlns="" w="9525">
                   <a:solidFill>
                     <a:srgbClr val="000000"/>
                   </a:solidFill>
@@ -1258,7 +1258,7 @@
             </a:ln>
             <a:extLst>
               <a:ext uri="{91240B29-F687-4f45-9708-019B960494DF}">
-                <a14:hiddenLine xmlns="" xmlns:a14="http://schemas.microsoft.com/office/drawing/2010/main" w="9525">
+                <a14:hiddenLine xmlns:a14="http://schemas.microsoft.com/office/drawing/2010/main" xmlns="" w="9525">
                   <a:solidFill>
                     <a:srgbClr val="000000"/>
                   </a:solidFill>
@@ -1320,7 +1320,7 @@
             </a:ln>
             <a:extLst>
               <a:ext uri="{91240B29-F687-4f45-9708-019B960494DF}">
-                <a14:hiddenLine xmlns="" xmlns:a14="http://schemas.microsoft.com/office/drawing/2010/main" w="9525">
+                <a14:hiddenLine xmlns:a14="http://schemas.microsoft.com/office/drawing/2010/main" xmlns="" w="9525">
                   <a:solidFill>
                     <a:srgbClr val="000000"/>
                   </a:solidFill>
@@ -1410,7 +1410,7 @@
             </a:ln>
             <a:extLst>
               <a:ext uri="{91240B29-F687-4f45-9708-019B960494DF}">
-                <a14:hiddenLine xmlns="" xmlns:a14="http://schemas.microsoft.com/office/drawing/2010/main" w="9525">
+                <a14:hiddenLine xmlns:a14="http://schemas.microsoft.com/office/drawing/2010/main" xmlns="" w="9525">
                   <a:solidFill>
                     <a:srgbClr val="000000"/>
                   </a:solidFill>
@@ -1500,7 +1500,7 @@
             </a:ln>
             <a:extLst>
               <a:ext uri="{91240B29-F687-4f45-9708-019B960494DF}">
-                <a14:hiddenLine xmlns="" xmlns:a14="http://schemas.microsoft.com/office/drawing/2010/main" w="9525">
+                <a14:hiddenLine xmlns:a14="http://schemas.microsoft.com/office/drawing/2010/main" xmlns="" w="9525">
                   <a:solidFill>
                     <a:srgbClr val="000000"/>
                   </a:solidFill>
@@ -1562,7 +1562,7 @@
             </a:ln>
             <a:extLst>
               <a:ext uri="{91240B29-F687-4f45-9708-019B960494DF}">
-                <a14:hiddenLine xmlns="" xmlns:a14="http://schemas.microsoft.com/office/drawing/2010/main" w="9525">
+                <a14:hiddenLine xmlns:a14="http://schemas.microsoft.com/office/drawing/2010/main" xmlns="" w="9525">
                   <a:solidFill>
                     <a:srgbClr val="000000"/>
                   </a:solidFill>
@@ -1652,7 +1652,7 @@
             </a:ln>
             <a:extLst>
               <a:ext uri="{91240B29-F687-4f45-9708-019B960494DF}">
-                <a14:hiddenLine xmlns="" xmlns:a14="http://schemas.microsoft.com/office/drawing/2010/main" w="9525">
+                <a14:hiddenLine xmlns:a14="http://schemas.microsoft.com/office/drawing/2010/main" xmlns="" w="9525">
                   <a:solidFill>
                     <a:srgbClr val="000000"/>
                   </a:solidFill>
@@ -1742,7 +1742,7 @@
             </a:ln>
             <a:extLst>
               <a:ext uri="{91240B29-F687-4f45-9708-019B960494DF}">
-                <a14:hiddenLine xmlns="" xmlns:a14="http://schemas.microsoft.com/office/drawing/2010/main" w="9525">
+                <a14:hiddenLine xmlns:a14="http://schemas.microsoft.com/office/drawing/2010/main" xmlns="" w="9525">
                   <a:solidFill>
                     <a:srgbClr val="000000"/>
                   </a:solidFill>
@@ -1798,7 +1798,7 @@
             </a:ln>
             <a:extLst>
               <a:ext uri="{91240B29-F687-4f45-9708-019B960494DF}">
-                <a14:hiddenLine xmlns="" xmlns:a14="http://schemas.microsoft.com/office/drawing/2010/main" w="9525">
+                <a14:hiddenLine xmlns:a14="http://schemas.microsoft.com/office/drawing/2010/main" xmlns="" w="9525">
                   <a:solidFill>
                     <a:srgbClr val="000000"/>
                   </a:solidFill>
@@ -1888,7 +1888,7 @@
             </a:ln>
             <a:extLst>
               <a:ext uri="{91240B29-F687-4f45-9708-019B960494DF}">
-                <a14:hiddenLine xmlns="" xmlns:a14="http://schemas.microsoft.com/office/drawing/2010/main" w="9525">
+                <a14:hiddenLine xmlns:a14="http://schemas.microsoft.com/office/drawing/2010/main" xmlns="" w="9525">
                   <a:solidFill>
                     <a:srgbClr val="000000"/>
                   </a:solidFill>
@@ -1944,7 +1944,7 @@
             </a:ln>
             <a:extLst>
               <a:ext uri="{91240B29-F687-4f45-9708-019B960494DF}">
-                <a14:hiddenLine xmlns="" xmlns:a14="http://schemas.microsoft.com/office/drawing/2010/main" w="9525">
+                <a14:hiddenLine xmlns:a14="http://schemas.microsoft.com/office/drawing/2010/main" xmlns="" w="9525">
                   <a:solidFill>
                     <a:srgbClr val="000000"/>
                   </a:solidFill>
@@ -2034,7 +2034,7 @@
             </a:ln>
             <a:extLst>
               <a:ext uri="{91240B29-F687-4f45-9708-019B960494DF}">
-                <a14:hiddenLine xmlns="" xmlns:a14="http://schemas.microsoft.com/office/drawing/2010/main" w="9525">
+                <a14:hiddenLine xmlns:a14="http://schemas.microsoft.com/office/drawing/2010/main" xmlns="" w="9525">
                   <a:solidFill>
                     <a:srgbClr val="000000"/>
                   </a:solidFill>
@@ -2102,7 +2102,7 @@
             </a:ln>
             <a:extLst>
               <a:ext uri="{91240B29-F687-4f45-9708-019B960494DF}">
-                <a14:hiddenLine xmlns="" xmlns:a14="http://schemas.microsoft.com/office/drawing/2010/main" w="9525">
+                <a14:hiddenLine xmlns:a14="http://schemas.microsoft.com/office/drawing/2010/main" xmlns="" w="9525">
                   <a:solidFill>
                     <a:srgbClr val="000000"/>
                   </a:solidFill>
@@ -2192,7 +2192,7 @@
             </a:ln>
             <a:extLst>
               <a:ext uri="{91240B29-F687-4f45-9708-019B960494DF}">
-                <a14:hiddenLine xmlns="" xmlns:a14="http://schemas.microsoft.com/office/drawing/2010/main" w="9525">
+                <a14:hiddenLine xmlns:a14="http://schemas.microsoft.com/office/drawing/2010/main" xmlns="" w="9525">
                   <a:solidFill>
                     <a:srgbClr val="000000"/>
                   </a:solidFill>
@@ -2260,7 +2260,7 @@
             </a:ln>
             <a:extLst>
               <a:ext uri="{91240B29-F687-4f45-9708-019B960494DF}">
-                <a14:hiddenLine xmlns="" xmlns:a14="http://schemas.microsoft.com/office/drawing/2010/main" w="9525">
+                <a14:hiddenLine xmlns:a14="http://schemas.microsoft.com/office/drawing/2010/main" xmlns="" w="9525">
                   <a:solidFill>
                     <a:srgbClr val="000000"/>
                   </a:solidFill>
@@ -2350,7 +2350,7 @@
             </a:ln>
             <a:extLst>
               <a:ext uri="{91240B29-F687-4f45-9708-019B960494DF}">
-                <a14:hiddenLine xmlns="" xmlns:a14="http://schemas.microsoft.com/office/drawing/2010/main" w="9525">
+                <a14:hiddenLine xmlns:a14="http://schemas.microsoft.com/office/drawing/2010/main" xmlns="" w="9525">
                   <a:solidFill>
                     <a:srgbClr val="000000"/>
                   </a:solidFill>
@@ -2384,7 +2384,7 @@
             </a:ln>
             <a:extLst>
               <a:ext uri="{91240B29-F687-4f45-9708-019B960494DF}">
-                <a14:hiddenLine xmlns="" xmlns:a14="http://schemas.microsoft.com/office/drawing/2010/main" w="9525">
+                <a14:hiddenLine xmlns:a14="http://schemas.microsoft.com/office/drawing/2010/main" xmlns="" w="9525">
                   <a:solidFill>
                     <a:srgbClr val="000000"/>
                   </a:solidFill>
@@ -2474,7 +2474,7 @@
             </a:ln>
             <a:extLst>
               <a:ext uri="{91240B29-F687-4f45-9708-019B960494DF}">
-                <a14:hiddenLine xmlns="" xmlns:a14="http://schemas.microsoft.com/office/drawing/2010/main" w="9525">
+                <a14:hiddenLine xmlns:a14="http://schemas.microsoft.com/office/drawing/2010/main" xmlns="" w="9525">
                   <a:solidFill>
                     <a:srgbClr val="000000"/>
                   </a:solidFill>
@@ -2536,7 +2536,7 @@
             </a:ln>
             <a:extLst>
               <a:ext uri="{91240B29-F687-4f45-9708-019B960494DF}">
-                <a14:hiddenLine xmlns="" xmlns:a14="http://schemas.microsoft.com/office/drawing/2010/main" w="9525">
+                <a14:hiddenLine xmlns:a14="http://schemas.microsoft.com/office/drawing/2010/main" xmlns="" w="9525">
                   <a:solidFill>
                     <a:srgbClr val="000000"/>
                   </a:solidFill>
@@ -2598,7 +2598,7 @@
             </a:ln>
             <a:extLst>
               <a:ext uri="{91240B29-F687-4f45-9708-019B960494DF}">
-                <a14:hiddenLine xmlns="" xmlns:a14="http://schemas.microsoft.com/office/drawing/2010/main" w="9525">
+                <a14:hiddenLine xmlns:a14="http://schemas.microsoft.com/office/drawing/2010/main" xmlns="" w="9525">
                   <a:solidFill>
                     <a:srgbClr val="000000"/>
                   </a:solidFill>
@@ -2688,7 +2688,7 @@
             </a:ln>
             <a:extLst>
               <a:ext uri="{91240B29-F687-4f45-9708-019B960494DF}">
-                <a14:hiddenLine xmlns="" xmlns:a14="http://schemas.microsoft.com/office/drawing/2010/main" w="9525">
+                <a14:hiddenLine xmlns:a14="http://schemas.microsoft.com/office/drawing/2010/main" xmlns="" w="9525">
                   <a:solidFill>
                     <a:srgbClr val="000000"/>
                   </a:solidFill>
@@ -2756,7 +2756,7 @@
             </a:ln>
             <a:extLst>
               <a:ext uri="{91240B29-F687-4f45-9708-019B960494DF}">
-                <a14:hiddenLine xmlns="" xmlns:a14="http://schemas.microsoft.com/office/drawing/2010/main" w="9525">
+                <a14:hiddenLine xmlns:a14="http://schemas.microsoft.com/office/drawing/2010/main" xmlns="" w="9525">
                   <a:solidFill>
                     <a:srgbClr val="000000"/>
                   </a:solidFill>
@@ -2818,7 +2818,7 @@
             </a:ln>
             <a:extLst>
               <a:ext uri="{91240B29-F687-4f45-9708-019B960494DF}">
-                <a14:hiddenLine xmlns="" xmlns:a14="http://schemas.microsoft.com/office/drawing/2010/main" w="9525">
+                <a14:hiddenLine xmlns:a14="http://schemas.microsoft.com/office/drawing/2010/main" xmlns="" w="9525">
                   <a:solidFill>
                     <a:srgbClr val="000000"/>
                   </a:solidFill>
@@ -2908,7 +2908,7 @@
             </a:ln>
             <a:extLst>
               <a:ext uri="{91240B29-F687-4f45-9708-019B960494DF}">
-                <a14:hiddenLine xmlns="" xmlns:a14="http://schemas.microsoft.com/office/drawing/2010/main" w="9525">
+                <a14:hiddenLine xmlns:a14="http://schemas.microsoft.com/office/drawing/2010/main" xmlns="" w="9525">
                   <a:solidFill>
                     <a:srgbClr val="000000"/>
                   </a:solidFill>
@@ -2970,7 +2970,7 @@
             </a:ln>
             <a:extLst>
               <a:ext uri="{91240B29-F687-4f45-9708-019B960494DF}">
-                <a14:hiddenLine xmlns="" xmlns:a14="http://schemas.microsoft.com/office/drawing/2010/main" w="9525">
+                <a14:hiddenLine xmlns:a14="http://schemas.microsoft.com/office/drawing/2010/main" xmlns="" w="9525">
                   <a:solidFill>
                     <a:srgbClr val="000000"/>
                   </a:solidFill>
@@ -3060,7 +3060,7 @@
             </a:ln>
             <a:extLst>
               <a:ext uri="{91240B29-F687-4f45-9708-019B960494DF}">
-                <a14:hiddenLine xmlns="" xmlns:a14="http://schemas.microsoft.com/office/drawing/2010/main" w="9525">
+                <a14:hiddenLine xmlns:a14="http://schemas.microsoft.com/office/drawing/2010/main" xmlns="" w="9525">
                   <a:solidFill>
                     <a:srgbClr val="000000"/>
                   </a:solidFill>
@@ -3122,7 +3122,7 @@
             </a:ln>
             <a:extLst>
               <a:ext uri="{91240B29-F687-4f45-9708-019B960494DF}">
-                <a14:hiddenLine xmlns="" xmlns:a14="http://schemas.microsoft.com/office/drawing/2010/main" w="9525">
+                <a14:hiddenLine xmlns:a14="http://schemas.microsoft.com/office/drawing/2010/main" xmlns="" w="9525">
                   <a:solidFill>
                     <a:srgbClr val="000000"/>
                   </a:solidFill>
@@ -3212,7 +3212,7 @@
             </a:ln>
             <a:extLst>
               <a:ext uri="{91240B29-F687-4f45-9708-019B960494DF}">
-                <a14:hiddenLine xmlns="" xmlns:a14="http://schemas.microsoft.com/office/drawing/2010/main" w="9525">
+                <a14:hiddenLine xmlns:a14="http://schemas.microsoft.com/office/drawing/2010/main" xmlns="" w="9525">
                   <a:solidFill>
                     <a:srgbClr val="000000"/>
                   </a:solidFill>
@@ -3246,7 +3246,7 @@
             </a:ln>
             <a:extLst>
               <a:ext uri="{91240B29-F687-4f45-9708-019B960494DF}">
-                <a14:hiddenLine xmlns="" xmlns:a14="http://schemas.microsoft.com/office/drawing/2010/main" w="9525">
+                <a14:hiddenLine xmlns:a14="http://schemas.microsoft.com/office/drawing/2010/main" xmlns="" w="9525">
                   <a:solidFill>
                     <a:srgbClr val="000000"/>
                   </a:solidFill>
@@ -3311,7 +3311,7 @@
             </a:ln>
             <a:extLst>
               <a:ext uri="{91240B29-F687-4f45-9708-019B960494DF}">
-                <a14:hiddenLine xmlns="" xmlns:a14="http://schemas.microsoft.com/office/drawing/2010/main" w="9525">
+                <a14:hiddenLine xmlns:a14="http://schemas.microsoft.com/office/drawing/2010/main" xmlns="" w="9525">
                   <a:solidFill>
                     <a:srgbClr val="000000"/>
                   </a:solidFill>
@@ -3401,7 +3401,7 @@
             </a:ln>
             <a:extLst>
               <a:ext uri="{91240B29-F687-4f45-9708-019B960494DF}">
-                <a14:hiddenLine xmlns="" xmlns:a14="http://schemas.microsoft.com/office/drawing/2010/main" w="9525">
+                <a14:hiddenLine xmlns:a14="http://schemas.microsoft.com/office/drawing/2010/main" xmlns="" w="9525">
                   <a:solidFill>
                     <a:srgbClr val="000000"/>
                   </a:solidFill>
@@ -3463,7 +3463,7 @@
             </a:ln>
             <a:extLst>
               <a:ext uri="{91240B29-F687-4f45-9708-019B960494DF}">
-                <a14:hiddenLine xmlns="" xmlns:a14="http://schemas.microsoft.com/office/drawing/2010/main" w="9525">
+                <a14:hiddenLine xmlns:a14="http://schemas.microsoft.com/office/drawing/2010/main" xmlns="" w="9525">
                   <a:solidFill>
                     <a:srgbClr val="000000"/>
                   </a:solidFill>
@@ -3553,7 +3553,7 @@
             </a:ln>
             <a:extLst>
               <a:ext uri="{91240B29-F687-4f45-9708-019B960494DF}">
-                <a14:hiddenLine xmlns="" xmlns:a14="http://schemas.microsoft.com/office/drawing/2010/main" w="9525">
+                <a14:hiddenLine xmlns:a14="http://schemas.microsoft.com/office/drawing/2010/main" xmlns="" w="9525">
                   <a:solidFill>
                     <a:srgbClr val="000000"/>
                   </a:solidFill>
@@ -3643,7 +3643,7 @@
             </a:ln>
             <a:extLst>
               <a:ext uri="{91240B29-F687-4f45-9708-019B960494DF}">
-                <a14:hiddenLine xmlns="" xmlns:a14="http://schemas.microsoft.com/office/drawing/2010/main" w="9525">
+                <a14:hiddenLine xmlns:a14="http://schemas.microsoft.com/office/drawing/2010/main" xmlns="" w="9525">
                   <a:solidFill>
                     <a:srgbClr val="000000"/>
                   </a:solidFill>
@@ -3708,7 +3708,7 @@
             </a:ln>
             <a:extLst>
               <a:ext uri="{91240B29-F687-4f45-9708-019B960494DF}">
-                <a14:hiddenLine xmlns="" xmlns:a14="http://schemas.microsoft.com/office/drawing/2010/main" w="9525">
+                <a14:hiddenLine xmlns:a14="http://schemas.microsoft.com/office/drawing/2010/main" xmlns="" w="9525">
                   <a:solidFill>
                     <a:srgbClr val="000000"/>
                   </a:solidFill>
@@ -3770,7 +3770,7 @@
             </a:ln>
             <a:extLst>
               <a:ext uri="{91240B29-F687-4f45-9708-019B960494DF}">
-                <a14:hiddenLine xmlns="" xmlns:a14="http://schemas.microsoft.com/office/drawing/2010/main" w="9525">
+                <a14:hiddenLine xmlns:a14="http://schemas.microsoft.com/office/drawing/2010/main" xmlns="" w="9525">
                   <a:solidFill>
                     <a:srgbClr val="000000"/>
                   </a:solidFill>
@@ -3860,7 +3860,7 @@
             </a:ln>
             <a:extLst>
               <a:ext uri="{91240B29-F687-4f45-9708-019B960494DF}">
-                <a14:hiddenLine xmlns="" xmlns:a14="http://schemas.microsoft.com/office/drawing/2010/main" w="9525">
+                <a14:hiddenLine xmlns:a14="http://schemas.microsoft.com/office/drawing/2010/main" xmlns="" w="9525">
                   <a:solidFill>
                     <a:srgbClr val="000000"/>
                   </a:solidFill>
@@ -3950,7 +3950,7 @@
             </a:ln>
             <a:extLst>
               <a:ext uri="{91240B29-F687-4f45-9708-019B960494DF}">
-                <a14:hiddenLine xmlns="" xmlns:a14="http://schemas.microsoft.com/office/drawing/2010/main" w="9525">
+                <a14:hiddenLine xmlns:a14="http://schemas.microsoft.com/office/drawing/2010/main" xmlns="" w="9525">
                   <a:solidFill>
                     <a:srgbClr val="000000"/>
                   </a:solidFill>
@@ -4012,7 +4012,7 @@
             </a:ln>
             <a:extLst>
               <a:ext uri="{91240B29-F687-4f45-9708-019B960494DF}">
-                <a14:hiddenLine xmlns="" xmlns:a14="http://schemas.microsoft.com/office/drawing/2010/main" w="9525">
+                <a14:hiddenLine xmlns:a14="http://schemas.microsoft.com/office/drawing/2010/main" xmlns="" w="9525">
                   <a:solidFill>
                     <a:srgbClr val="000000"/>
                   </a:solidFill>
@@ -4132,7 +4132,7 @@
             </a:ln>
             <a:extLst>
               <a:ext uri="{91240B29-F687-4f45-9708-019B960494DF}">
-                <a14:hiddenLine xmlns="" xmlns:a14="http://schemas.microsoft.com/office/drawing/2010/main" w="9525">
+                <a14:hiddenLine xmlns:a14="http://schemas.microsoft.com/office/drawing/2010/main" xmlns="" w="9525">
                   <a:solidFill>
                     <a:srgbClr val="000000"/>
                   </a:solidFill>
@@ -4200,7 +4200,7 @@
             </a:ln>
             <a:extLst>
               <a:ext uri="{91240B29-F687-4f45-9708-019B960494DF}">
-                <a14:hiddenLine xmlns="" xmlns:a14="http://schemas.microsoft.com/office/drawing/2010/main" w="9525">
+                <a14:hiddenLine xmlns:a14="http://schemas.microsoft.com/office/drawing/2010/main" xmlns="" w="9525">
                   <a:solidFill>
                     <a:srgbClr val="000000"/>
                   </a:solidFill>
@@ -4290,7 +4290,7 @@
             </a:ln>
             <a:extLst>
               <a:ext uri="{91240B29-F687-4f45-9708-019B960494DF}">
-                <a14:hiddenLine xmlns="" xmlns:a14="http://schemas.microsoft.com/office/drawing/2010/main" w="9525">
+                <a14:hiddenLine xmlns:a14="http://schemas.microsoft.com/office/drawing/2010/main" xmlns="" w="9525">
                   <a:solidFill>
                     <a:srgbClr val="000000"/>
                   </a:solidFill>
@@ -9019,7 +9019,7 @@
           <a:noFill/>
           <a:extLst>
             <a:ext uri="{909E8E84-426E-40dd-AFC4-6F175D3DCCD1}">
-              <a14:hiddenFill xmlns="" xmlns:a14="http://schemas.microsoft.com/office/drawing/2010/main">
+              <a14:hiddenFill xmlns:a14="http://schemas.microsoft.com/office/drawing/2010/main" xmlns="">
                 <a:solidFill>
                   <a:srgbClr val="FFFFFF"/>
                 </a:solidFill>
@@ -9093,7 +9093,7 @@
               </a:ln>
               <a:extLst>
                 <a:ext uri="{91240B29-F687-4f45-9708-019B960494DF}">
-                  <a14:hiddenLine xmlns="" xmlns:a14="http://schemas.microsoft.com/office/drawing/2010/main" w="9525">
+                  <a14:hiddenLine xmlns:a14="http://schemas.microsoft.com/office/drawing/2010/main" xmlns="" w="9525">
                     <a:solidFill>
                       <a:srgbClr val="000000"/>
                     </a:solidFill>
@@ -9183,7 +9183,7 @@
               </a:ln>
               <a:extLst>
                 <a:ext uri="{91240B29-F687-4f45-9708-019B960494DF}">
-                  <a14:hiddenLine xmlns="" xmlns:a14="http://schemas.microsoft.com/office/drawing/2010/main" w="9525">
+                  <a14:hiddenLine xmlns:a14="http://schemas.microsoft.com/office/drawing/2010/main" xmlns="" w="9525">
                     <a:solidFill>
                       <a:srgbClr val="000000"/>
                     </a:solidFill>
@@ -9273,7 +9273,7 @@
               </a:ln>
               <a:extLst>
                 <a:ext uri="{91240B29-F687-4f45-9708-019B960494DF}">
-                  <a14:hiddenLine xmlns="" xmlns:a14="http://schemas.microsoft.com/office/drawing/2010/main" w="9525">
+                  <a14:hiddenLine xmlns:a14="http://schemas.microsoft.com/office/drawing/2010/main" xmlns="" w="9525">
                     <a:solidFill>
                       <a:srgbClr val="000000"/>
                     </a:solidFill>
@@ -9335,7 +9335,7 @@
               </a:ln>
               <a:extLst>
                 <a:ext uri="{91240B29-F687-4f45-9708-019B960494DF}">
-                  <a14:hiddenLine xmlns="" xmlns:a14="http://schemas.microsoft.com/office/drawing/2010/main" w="9525">
+                  <a14:hiddenLine xmlns:a14="http://schemas.microsoft.com/office/drawing/2010/main" xmlns="" w="9525">
                     <a:solidFill>
                       <a:srgbClr val="000000"/>
                     </a:solidFill>
@@ -9425,7 +9425,7 @@
               </a:ln>
               <a:extLst>
                 <a:ext uri="{91240B29-F687-4f45-9708-019B960494DF}">
-                  <a14:hiddenLine xmlns="" xmlns:a14="http://schemas.microsoft.com/office/drawing/2010/main" w="9525">
+                  <a14:hiddenLine xmlns:a14="http://schemas.microsoft.com/office/drawing/2010/main" xmlns="" w="9525">
                     <a:solidFill>
                       <a:srgbClr val="000000"/>
                     </a:solidFill>
@@ -9487,7 +9487,7 @@
               </a:ln>
               <a:extLst>
                 <a:ext uri="{91240B29-F687-4f45-9708-019B960494DF}">
-                  <a14:hiddenLine xmlns="" xmlns:a14="http://schemas.microsoft.com/office/drawing/2010/main" w="9525">
+                  <a14:hiddenLine xmlns:a14="http://schemas.microsoft.com/office/drawing/2010/main" xmlns="" w="9525">
                     <a:solidFill>
                       <a:srgbClr val="000000"/>
                     </a:solidFill>
@@ -9549,7 +9549,7 @@
               </a:ln>
               <a:extLst>
                 <a:ext uri="{91240B29-F687-4f45-9708-019B960494DF}">
-                  <a14:hiddenLine xmlns="" xmlns:a14="http://schemas.microsoft.com/office/drawing/2010/main" w="9525">
+                  <a14:hiddenLine xmlns:a14="http://schemas.microsoft.com/office/drawing/2010/main" xmlns="" w="9525">
                     <a:solidFill>
                       <a:srgbClr val="000000"/>
                     </a:solidFill>
@@ -9639,7 +9639,7 @@
               </a:ln>
               <a:extLst>
                 <a:ext uri="{91240B29-F687-4f45-9708-019B960494DF}">
-                  <a14:hiddenLine xmlns="" xmlns:a14="http://schemas.microsoft.com/office/drawing/2010/main" w="9525">
+                  <a14:hiddenLine xmlns:a14="http://schemas.microsoft.com/office/drawing/2010/main" xmlns="" w="9525">
                     <a:solidFill>
                       <a:srgbClr val="000000"/>
                     </a:solidFill>
@@ -9729,7 +9729,7 @@
               </a:ln>
               <a:extLst>
                 <a:ext uri="{91240B29-F687-4f45-9708-019B960494DF}">
-                  <a14:hiddenLine xmlns="" xmlns:a14="http://schemas.microsoft.com/office/drawing/2010/main" w="9525">
+                  <a14:hiddenLine xmlns:a14="http://schemas.microsoft.com/office/drawing/2010/main" xmlns="" w="9525">
                     <a:solidFill>
                       <a:srgbClr val="000000"/>
                     </a:solidFill>
@@ -9791,7 +9791,7 @@
               </a:ln>
               <a:extLst>
                 <a:ext uri="{91240B29-F687-4f45-9708-019B960494DF}">
-                  <a14:hiddenLine xmlns="" xmlns:a14="http://schemas.microsoft.com/office/drawing/2010/main" w="9525">
+                  <a14:hiddenLine xmlns:a14="http://schemas.microsoft.com/office/drawing/2010/main" xmlns="" w="9525">
                     <a:solidFill>
                       <a:srgbClr val="000000"/>
                     </a:solidFill>
@@ -9901,7 +9901,7 @@
               </a:ln>
               <a:extLst>
                 <a:ext uri="{91240B29-F687-4f45-9708-019B960494DF}">
-                  <a14:hiddenLine xmlns="" xmlns:a14="http://schemas.microsoft.com/office/drawing/2010/main" w="9525">
+                  <a14:hiddenLine xmlns:a14="http://schemas.microsoft.com/office/drawing/2010/main" xmlns="" w="9525">
                     <a:solidFill>
                       <a:srgbClr val="000000"/>
                     </a:solidFill>
@@ -9985,7 +9985,7 @@
               </a:ln>
               <a:extLst>
                 <a:ext uri="{91240B29-F687-4f45-9708-019B960494DF}">
-                  <a14:hiddenLine xmlns="" xmlns:a14="http://schemas.microsoft.com/office/drawing/2010/main" w="9525">
+                  <a14:hiddenLine xmlns:a14="http://schemas.microsoft.com/office/drawing/2010/main" xmlns="" w="9525">
                     <a:solidFill>
                       <a:srgbClr val="000000"/>
                     </a:solidFill>
@@ -10047,7 +10047,7 @@
               </a:ln>
               <a:extLst>
                 <a:ext uri="{91240B29-F687-4f45-9708-019B960494DF}">
-                  <a14:hiddenLine xmlns="" xmlns:a14="http://schemas.microsoft.com/office/drawing/2010/main" w="9525">
+                  <a14:hiddenLine xmlns:a14="http://schemas.microsoft.com/office/drawing/2010/main" xmlns="" w="9525">
                     <a:solidFill>
                       <a:srgbClr val="000000"/>
                     </a:solidFill>
@@ -10109,7 +10109,7 @@
               </a:ln>
               <a:extLst>
                 <a:ext uri="{91240B29-F687-4f45-9708-019B960494DF}">
-                  <a14:hiddenLine xmlns="" xmlns:a14="http://schemas.microsoft.com/office/drawing/2010/main" w="9525">
+                  <a14:hiddenLine xmlns:a14="http://schemas.microsoft.com/office/drawing/2010/main" xmlns="" w="9525">
                     <a:solidFill>
                       <a:srgbClr val="000000"/>
                     </a:solidFill>
@@ -10199,7 +10199,7 @@
               </a:ln>
               <a:extLst>
                 <a:ext uri="{91240B29-F687-4f45-9708-019B960494DF}">
-                  <a14:hiddenLine xmlns="" xmlns:a14="http://schemas.microsoft.com/office/drawing/2010/main" w="9525">
+                  <a14:hiddenLine xmlns:a14="http://schemas.microsoft.com/office/drawing/2010/main" xmlns="" w="9525">
                     <a:solidFill>
                       <a:srgbClr val="000000"/>
                     </a:solidFill>
@@ -10233,7 +10233,7 @@
               </a:ln>
               <a:extLst>
                 <a:ext uri="{91240B29-F687-4f45-9708-019B960494DF}">
-                  <a14:hiddenLine xmlns="" xmlns:a14="http://schemas.microsoft.com/office/drawing/2010/main" w="9525">
+                  <a14:hiddenLine xmlns:a14="http://schemas.microsoft.com/office/drawing/2010/main" xmlns="" w="9525">
                     <a:solidFill>
                       <a:srgbClr val="000000"/>
                     </a:solidFill>
@@ -10298,7 +10298,7 @@
               </a:ln>
               <a:extLst>
                 <a:ext uri="{91240B29-F687-4f45-9708-019B960494DF}">
-                  <a14:hiddenLine xmlns="" xmlns:a14="http://schemas.microsoft.com/office/drawing/2010/main" w="9525">
+                  <a14:hiddenLine xmlns:a14="http://schemas.microsoft.com/office/drawing/2010/main" xmlns="" w="9525">
                     <a:solidFill>
                       <a:srgbClr val="000000"/>
                     </a:solidFill>
@@ -10388,7 +10388,7 @@
               </a:ln>
               <a:extLst>
                 <a:ext uri="{91240B29-F687-4f45-9708-019B960494DF}">
-                  <a14:hiddenLine xmlns="" xmlns:a14="http://schemas.microsoft.com/office/drawing/2010/main" w="9525">
+                  <a14:hiddenLine xmlns:a14="http://schemas.microsoft.com/office/drawing/2010/main" xmlns="" w="9525">
                     <a:solidFill>
                       <a:srgbClr val="000000"/>
                     </a:solidFill>
@@ -10450,7 +10450,7 @@
               </a:ln>
               <a:extLst>
                 <a:ext uri="{91240B29-F687-4f45-9708-019B960494DF}">
-                  <a14:hiddenLine xmlns="" xmlns:a14="http://schemas.microsoft.com/office/drawing/2010/main" w="9525">
+                  <a14:hiddenLine xmlns:a14="http://schemas.microsoft.com/office/drawing/2010/main" xmlns="" w="9525">
                     <a:solidFill>
                       <a:srgbClr val="000000"/>
                     </a:solidFill>
@@ -10540,7 +10540,7 @@
               </a:ln>
               <a:extLst>
                 <a:ext uri="{91240B29-F687-4f45-9708-019B960494DF}">
-                  <a14:hiddenLine xmlns="" xmlns:a14="http://schemas.microsoft.com/office/drawing/2010/main" w="9525">
+                  <a14:hiddenLine xmlns:a14="http://schemas.microsoft.com/office/drawing/2010/main" xmlns="" w="9525">
                     <a:solidFill>
                       <a:srgbClr val="000000"/>
                     </a:solidFill>
@@ -10605,7 +10605,7 @@
               </a:ln>
               <a:extLst>
                 <a:ext uri="{91240B29-F687-4f45-9708-019B960494DF}">
-                  <a14:hiddenLine xmlns="" xmlns:a14="http://schemas.microsoft.com/office/drawing/2010/main" w="9525">
+                  <a14:hiddenLine xmlns:a14="http://schemas.microsoft.com/office/drawing/2010/main" xmlns="" w="9525">
                     <a:solidFill>
                       <a:srgbClr val="000000"/>
                     </a:solidFill>
@@ -10667,7 +10667,7 @@
               </a:ln>
               <a:extLst>
                 <a:ext uri="{91240B29-F687-4f45-9708-019B960494DF}">
-                  <a14:hiddenLine xmlns="" xmlns:a14="http://schemas.microsoft.com/office/drawing/2010/main" w="9525">
+                  <a14:hiddenLine xmlns:a14="http://schemas.microsoft.com/office/drawing/2010/main" xmlns="" w="9525">
                     <a:solidFill>
                       <a:srgbClr val="000000"/>
                     </a:solidFill>
@@ -10757,7 +10757,7 @@
               </a:ln>
               <a:extLst>
                 <a:ext uri="{91240B29-F687-4f45-9708-019B960494DF}">
-                  <a14:hiddenLine xmlns="" xmlns:a14="http://schemas.microsoft.com/office/drawing/2010/main" w="9525">
+                  <a14:hiddenLine xmlns:a14="http://schemas.microsoft.com/office/drawing/2010/main" xmlns="" w="9525">
                     <a:solidFill>
                       <a:srgbClr val="000000"/>
                     </a:solidFill>
@@ -10847,7 +10847,7 @@
               </a:ln>
               <a:extLst>
                 <a:ext uri="{91240B29-F687-4f45-9708-019B960494DF}">
-                  <a14:hiddenLine xmlns="" xmlns:a14="http://schemas.microsoft.com/office/drawing/2010/main" w="9525">
+                  <a14:hiddenLine xmlns:a14="http://schemas.microsoft.com/office/drawing/2010/main" xmlns="" w="9525">
                     <a:solidFill>
                       <a:srgbClr val="000000"/>
                     </a:solidFill>
@@ -10912,7 +10912,7 @@
               </a:ln>
               <a:extLst>
                 <a:ext uri="{91240B29-F687-4f45-9708-019B960494DF}">
-                  <a14:hiddenLine xmlns="" xmlns:a14="http://schemas.microsoft.com/office/drawing/2010/main" w="9525">
+                  <a14:hiddenLine xmlns:a14="http://schemas.microsoft.com/office/drawing/2010/main" xmlns="" w="9525">
                     <a:solidFill>
                       <a:srgbClr val="000000"/>
                     </a:solidFill>
@@ -11032,7 +11032,7 @@
               </a:ln>
               <a:extLst>
                 <a:ext uri="{91240B29-F687-4f45-9708-019B960494DF}">
-                  <a14:hiddenLine xmlns="" xmlns:a14="http://schemas.microsoft.com/office/drawing/2010/main" w="9525">
+                  <a14:hiddenLine xmlns:a14="http://schemas.microsoft.com/office/drawing/2010/main" xmlns="" w="9525">
                     <a:solidFill>
                       <a:srgbClr val="000000"/>
                     </a:solidFill>
@@ -11113,7 +11113,7 @@
               </a:ln>
               <a:extLst>
                 <a:ext uri="{91240B29-F687-4f45-9708-019B960494DF}">
-                  <a14:hiddenLine xmlns="" xmlns:a14="http://schemas.microsoft.com/office/drawing/2010/main" w="9525">
+                  <a14:hiddenLine xmlns:a14="http://schemas.microsoft.com/office/drawing/2010/main" xmlns="" w="9525">
                     <a:solidFill>
                       <a:srgbClr val="000000"/>
                     </a:solidFill>
@@ -11228,7 +11228,7 @@
               </a:ln>
               <a:extLst>
                 <a:ext uri="{91240B29-F687-4f45-9708-019B960494DF}">
-                  <a14:hiddenLine xmlns="" xmlns:a14="http://schemas.microsoft.com/office/drawing/2010/main" w="9525">
+                  <a14:hiddenLine xmlns:a14="http://schemas.microsoft.com/office/drawing/2010/main" xmlns="" w="9525">
                     <a:solidFill>
                       <a:srgbClr val="000000"/>
                     </a:solidFill>
@@ -11318,7 +11318,7 @@
               </a:ln>
               <a:extLst>
                 <a:ext uri="{91240B29-F687-4f45-9708-019B960494DF}">
-                  <a14:hiddenLine xmlns="" xmlns:a14="http://schemas.microsoft.com/office/drawing/2010/main" w="9525">
+                  <a14:hiddenLine xmlns:a14="http://schemas.microsoft.com/office/drawing/2010/main" xmlns="" w="9525">
                     <a:solidFill>
                       <a:srgbClr val="000000"/>
                     </a:solidFill>
@@ -11383,7 +11383,7 @@
               </a:ln>
               <a:extLst>
                 <a:ext uri="{91240B29-F687-4f45-9708-019B960494DF}">
-                  <a14:hiddenLine xmlns="" xmlns:a14="http://schemas.microsoft.com/office/drawing/2010/main" w="9525">
+                  <a14:hiddenLine xmlns:a14="http://schemas.microsoft.com/office/drawing/2010/main" xmlns="" w="9525">
                     <a:solidFill>
                       <a:srgbClr val="000000"/>
                     </a:solidFill>
@@ -11473,7 +11473,7 @@
               </a:ln>
               <a:extLst>
                 <a:ext uri="{91240B29-F687-4f45-9708-019B960494DF}">
-                  <a14:hiddenLine xmlns="" xmlns:a14="http://schemas.microsoft.com/office/drawing/2010/main" w="9525">
+                  <a14:hiddenLine xmlns:a14="http://schemas.microsoft.com/office/drawing/2010/main" xmlns="" w="9525">
                     <a:solidFill>
                       <a:srgbClr val="000000"/>
                     </a:solidFill>
@@ -11541,7 +11541,7 @@
               </a:ln>
               <a:extLst>
                 <a:ext uri="{91240B29-F687-4f45-9708-019B960494DF}">
-                  <a14:hiddenLine xmlns="" xmlns:a14="http://schemas.microsoft.com/office/drawing/2010/main" w="9525">
+                  <a14:hiddenLine xmlns:a14="http://schemas.microsoft.com/office/drawing/2010/main" xmlns="" w="9525">
                     <a:solidFill>
                       <a:srgbClr val="000000"/>
                     </a:solidFill>
@@ -11631,7 +11631,7 @@
               </a:ln>
               <a:extLst>
                 <a:ext uri="{91240B29-F687-4f45-9708-019B960494DF}">
-                  <a14:hiddenLine xmlns="" xmlns:a14="http://schemas.microsoft.com/office/drawing/2010/main" w="9525">
+                  <a14:hiddenLine xmlns:a14="http://schemas.microsoft.com/office/drawing/2010/main" xmlns="" w="9525">
                     <a:solidFill>
                       <a:srgbClr val="000000"/>
                     </a:solidFill>
@@ -11699,7 +11699,7 @@
               </a:ln>
               <a:extLst>
                 <a:ext uri="{91240B29-F687-4f45-9708-019B960494DF}">
-                  <a14:hiddenLine xmlns="" xmlns:a14="http://schemas.microsoft.com/office/drawing/2010/main" w="9525">
+                  <a14:hiddenLine xmlns:a14="http://schemas.microsoft.com/office/drawing/2010/main" xmlns="" w="9525">
                     <a:solidFill>
                       <a:srgbClr val="000000"/>
                     </a:solidFill>
@@ -11789,7 +11789,7 @@
               </a:ln>
               <a:extLst>
                 <a:ext uri="{91240B29-F687-4f45-9708-019B960494DF}">
-                  <a14:hiddenLine xmlns="" xmlns:a14="http://schemas.microsoft.com/office/drawing/2010/main" w="9525">
+                  <a14:hiddenLine xmlns:a14="http://schemas.microsoft.com/office/drawing/2010/main" xmlns="" w="9525">
                     <a:solidFill>
                       <a:srgbClr val="000000"/>
                     </a:solidFill>
@@ -11823,7 +11823,7 @@
               </a:ln>
               <a:extLst>
                 <a:ext uri="{91240B29-F687-4f45-9708-019B960494DF}">
-                  <a14:hiddenLine xmlns="" xmlns:a14="http://schemas.microsoft.com/office/drawing/2010/main" w="9525">
+                  <a14:hiddenLine xmlns:a14="http://schemas.microsoft.com/office/drawing/2010/main" xmlns="" w="9525">
                     <a:solidFill>
                       <a:srgbClr val="000000"/>
                     </a:solidFill>
@@ -12962,8 +12962,8 @@
         </p:nvSpPr>
         <p:spPr>
           <a:xfrm>
-            <a:off x="1086905" y="454199"/>
-            <a:ext cx="9905998" cy="1478570"/>
+            <a:off x="1399107" y="136379"/>
+            <a:ext cx="9905998" cy="1085591"/>
           </a:xfrm>
         </p:spPr>
         <p:txBody>
@@ -12972,1767 +12972,52 @@
           <a:p>
             <a:r>
               <a:rPr lang="en-US" dirty="0" smtClean="0"/>
-              <a:t>High Level Design </a:t>
+              <a:t>High Level Design</a:t>
             </a:r>
             <a:endParaRPr lang="en-US" dirty="0"/>
           </a:p>
         </p:txBody>
       </p:sp>
-      <p:sp>
-        <p:nvSpPr>
-          <p:cNvPr id="4" name="Rectangle 3"/>
-          <p:cNvSpPr/>
+      <p:pic>
+        <p:nvPicPr>
+          <p:cNvPr id="4" name="Picture 3"/>
+          <p:cNvPicPr>
+            <a:picLocks noChangeAspect="1"/>
+          </p:cNvPicPr>
           <p:nvPr/>
-        </p:nvSpPr>
-        <p:spPr bwMode="auto">
-          <a:xfrm>
-            <a:off x="1942173" y="2990666"/>
-            <a:ext cx="914400" cy="2743200"/>
-          </a:xfrm>
-          <a:prstGeom prst="rect">
-            <a:avLst/>
-          </a:prstGeom>
-          <a:ln>
-            <a:headEnd/>
-            <a:tailEnd type="triangle" w="med" len="med"/>
-          </a:ln>
-        </p:spPr>
-        <p:style>
-          <a:lnRef idx="2">
-            <a:schemeClr val="dk1">
-              <a:shade val="50000"/>
-            </a:schemeClr>
-          </a:lnRef>
-          <a:fillRef idx="1">
-            <a:schemeClr val="dk1"/>
-          </a:fillRef>
-          <a:effectRef idx="0">
-            <a:schemeClr val="dk1"/>
-          </a:effectRef>
-          <a:fontRef idx="minor">
-            <a:schemeClr val="lt1"/>
-          </a:fontRef>
-        </p:style>
-        <p:txBody>
-          <a:bodyPr rtlCol="0" anchor="ctr"/>
-          <a:lstStyle/>
-          <a:p>
-            <a:pPr algn="ctr"/>
-            <a:r>
-              <a:rPr lang="en-US" sz="1800" dirty="0" smtClean="0">
-                <a:latin typeface="Arial" pitchFamily="34" charset="0"/>
-                <a:cs typeface="Arial" pitchFamily="34" charset="0"/>
-              </a:rPr>
-              <a:t>Signal Inputs</a:t>
-            </a:r>
-            <a:endParaRPr lang="en-US" sz="1800" dirty="0">
-              <a:latin typeface="Arial" pitchFamily="34" charset="0"/>
-              <a:cs typeface="Arial" pitchFamily="34" charset="0"/>
-            </a:endParaRPr>
-          </a:p>
-        </p:txBody>
-      </p:sp>
-      <p:sp>
-        <p:nvSpPr>
-          <p:cNvPr id="5" name="Rectangle 4"/>
-          <p:cNvSpPr/>
-          <p:nvPr/>
-        </p:nvSpPr>
-        <p:spPr bwMode="auto">
-          <a:xfrm>
-            <a:off x="8409708" y="3187931"/>
-            <a:ext cx="1066800" cy="1752600"/>
-          </a:xfrm>
-          <a:prstGeom prst="rect">
-            <a:avLst/>
-          </a:prstGeom>
-          <a:ln>
-            <a:headEnd/>
-            <a:tailEnd type="triangle" w="med" len="med"/>
-          </a:ln>
-        </p:spPr>
-        <p:style>
-          <a:lnRef idx="2">
-            <a:schemeClr val="dk1">
-              <a:shade val="50000"/>
-            </a:schemeClr>
-          </a:lnRef>
-          <a:fillRef idx="1">
-            <a:schemeClr val="dk1"/>
-          </a:fillRef>
-          <a:effectRef idx="0">
-            <a:schemeClr val="dk1"/>
-          </a:effectRef>
-          <a:fontRef idx="minor">
-            <a:schemeClr val="lt1"/>
-          </a:fontRef>
-        </p:style>
-        <p:txBody>
-          <a:bodyPr rtlCol="0" anchor="ctr"/>
-          <a:lstStyle/>
-          <a:p>
-            <a:pPr algn="ctr"/>
-            <a:r>
-              <a:rPr lang="en-US" dirty="0" smtClean="0">
-                <a:latin typeface="Arial" pitchFamily="34" charset="0"/>
-                <a:cs typeface="Arial" pitchFamily="34" charset="0"/>
-              </a:rPr>
-              <a:t>Draw Pixels</a:t>
-            </a:r>
-            <a:endParaRPr lang="en-US" sz="1800" dirty="0">
-              <a:latin typeface="Arial" pitchFamily="34" charset="0"/>
-              <a:cs typeface="Arial" pitchFamily="34" charset="0"/>
-            </a:endParaRPr>
-          </a:p>
-        </p:txBody>
-      </p:sp>
-      <p:cxnSp>
-        <p:nvCxnSpPr>
-          <p:cNvPr id="6" name="Straight Arrow Connector 5"/>
-          <p:cNvCxnSpPr/>
-          <p:nvPr/>
-        </p:nvCxnSpPr>
-        <p:spPr bwMode="auto">
-          <a:xfrm flipV="1">
-            <a:off x="2999508" y="3372875"/>
-            <a:ext cx="914400" cy="1"/>
-          </a:xfrm>
-          <a:prstGeom prst="straightConnector1">
-            <a:avLst/>
-          </a:prstGeom>
-          <a:solidFill>
-            <a:schemeClr val="accent1"/>
-          </a:solidFill>
-          <a:ln w="12700" cap="flat" cmpd="sng" algn="ctr">
-            <a:solidFill>
-              <a:schemeClr val="tx1"/>
-            </a:solidFill>
-            <a:prstDash val="solid"/>
-            <a:round/>
-            <a:headEnd type="none" w="med" len="med"/>
-            <a:tailEnd type="triangle"/>
-          </a:ln>
-          <a:effectLst/>
-        </p:spPr>
-      </p:cxnSp>
-      <p:cxnSp>
-        <p:nvCxnSpPr>
-          <p:cNvPr id="7" name="Straight Arrow Connector 6"/>
-          <p:cNvCxnSpPr/>
-          <p:nvPr/>
-        </p:nvCxnSpPr>
-        <p:spPr bwMode="auto">
-          <a:xfrm>
-            <a:off x="2999508" y="3949931"/>
-            <a:ext cx="914400" cy="0"/>
-          </a:xfrm>
-          <a:prstGeom prst="straightConnector1">
-            <a:avLst/>
-          </a:prstGeom>
-          <a:solidFill>
-            <a:schemeClr val="accent1"/>
-          </a:solidFill>
-          <a:ln w="12700" cap="flat" cmpd="sng" algn="ctr">
-            <a:solidFill>
-              <a:schemeClr val="tx1"/>
-            </a:solidFill>
-            <a:prstDash val="solid"/>
-            <a:round/>
-            <a:headEnd type="none" w="med" len="med"/>
-            <a:tailEnd type="triangle"/>
-          </a:ln>
-          <a:effectLst/>
-        </p:spPr>
-      </p:cxnSp>
-      <p:cxnSp>
-        <p:nvCxnSpPr>
-          <p:cNvPr id="8" name="Straight Arrow Connector 7"/>
-          <p:cNvCxnSpPr/>
-          <p:nvPr/>
-        </p:nvCxnSpPr>
-        <p:spPr bwMode="auto">
-          <a:xfrm>
-            <a:off x="2999508" y="4635731"/>
-            <a:ext cx="962757" cy="15264"/>
-          </a:xfrm>
-          <a:prstGeom prst="straightConnector1">
-            <a:avLst/>
-          </a:prstGeom>
-          <a:solidFill>
-            <a:schemeClr val="accent1"/>
-          </a:solidFill>
-          <a:ln w="12700" cap="flat" cmpd="sng" algn="ctr">
-            <a:solidFill>
-              <a:schemeClr val="tx1"/>
-            </a:solidFill>
-            <a:prstDash val="solid"/>
-            <a:round/>
-            <a:headEnd type="none" w="med" len="med"/>
-            <a:tailEnd type="triangle"/>
-          </a:ln>
-          <a:effectLst/>
-        </p:spPr>
-      </p:cxnSp>
-      <p:cxnSp>
-        <p:nvCxnSpPr>
-          <p:cNvPr id="9" name="Straight Arrow Connector 8"/>
-          <p:cNvCxnSpPr/>
-          <p:nvPr/>
-        </p:nvCxnSpPr>
-        <p:spPr bwMode="auto">
-          <a:xfrm>
-            <a:off x="2999508" y="5169131"/>
-            <a:ext cx="962757" cy="0"/>
-          </a:xfrm>
-          <a:prstGeom prst="straightConnector1">
-            <a:avLst/>
-          </a:prstGeom>
-          <a:solidFill>
-            <a:schemeClr val="accent1"/>
-          </a:solidFill>
-          <a:ln w="12700" cap="flat" cmpd="sng" algn="ctr">
-            <a:solidFill>
-              <a:schemeClr val="tx1"/>
-            </a:solidFill>
-            <a:prstDash val="solid"/>
-            <a:round/>
-            <a:headEnd type="none" w="med" len="med"/>
-            <a:tailEnd type="triangle"/>
-          </a:ln>
-          <a:effectLst/>
-        </p:spPr>
-      </p:cxnSp>
-      <p:sp>
-        <p:nvSpPr>
-          <p:cNvPr id="10" name="Rectangle 9"/>
-          <p:cNvSpPr/>
-          <p:nvPr/>
-        </p:nvSpPr>
-        <p:spPr bwMode="auto">
-          <a:xfrm>
-            <a:off x="3990108" y="3035531"/>
-            <a:ext cx="990600" cy="2628900"/>
-          </a:xfrm>
-          <a:prstGeom prst="rect">
-            <a:avLst/>
-          </a:prstGeom>
-          <a:ln>
-            <a:headEnd/>
-            <a:tailEnd type="triangle" w="med" len="med"/>
-          </a:ln>
-        </p:spPr>
-        <p:style>
-          <a:lnRef idx="2">
-            <a:schemeClr val="dk1">
-              <a:shade val="50000"/>
-            </a:schemeClr>
-          </a:lnRef>
-          <a:fillRef idx="1">
-            <a:schemeClr val="dk1"/>
-          </a:fillRef>
-          <a:effectRef idx="0">
-            <a:schemeClr val="dk1"/>
-          </a:effectRef>
-          <a:fontRef idx="minor">
-            <a:schemeClr val="lt1"/>
-          </a:fontRef>
-        </p:style>
-        <p:txBody>
-          <a:bodyPr rtlCol="0" anchor="ctr"/>
-          <a:lstStyle/>
-          <a:p>
-            <a:pPr algn="ctr"/>
-            <a:r>
-              <a:rPr lang="en-US" sz="1800" dirty="0" smtClean="0">
-                <a:latin typeface="Arial" pitchFamily="34" charset="0"/>
-                <a:cs typeface="Arial" pitchFamily="34" charset="0"/>
-              </a:rPr>
-              <a:t>Update position</a:t>
-            </a:r>
-            <a:endParaRPr lang="en-US" sz="1800" dirty="0">
-              <a:latin typeface="Arial" pitchFamily="34" charset="0"/>
-              <a:cs typeface="Arial" pitchFamily="34" charset="0"/>
-            </a:endParaRPr>
-          </a:p>
-        </p:txBody>
-      </p:sp>
-      <p:sp>
-        <p:nvSpPr>
-          <p:cNvPr id="11" name="Rectangle 10"/>
-          <p:cNvSpPr/>
-          <p:nvPr/>
-        </p:nvSpPr>
-        <p:spPr bwMode="auto">
-          <a:xfrm>
-            <a:off x="6188185" y="2425931"/>
-            <a:ext cx="1066800" cy="990600"/>
-          </a:xfrm>
-          <a:prstGeom prst="rect">
-            <a:avLst/>
-          </a:prstGeom>
-          <a:ln>
-            <a:headEnd/>
-            <a:tailEnd type="triangle" w="med" len="med"/>
-          </a:ln>
-        </p:spPr>
-        <p:style>
-          <a:lnRef idx="2">
-            <a:schemeClr val="dk1">
-              <a:shade val="50000"/>
-            </a:schemeClr>
-          </a:lnRef>
-          <a:fillRef idx="1">
-            <a:schemeClr val="dk1"/>
-          </a:fillRef>
-          <a:effectRef idx="0">
-            <a:schemeClr val="dk1"/>
-          </a:effectRef>
-          <a:fontRef idx="minor">
-            <a:schemeClr val="lt1"/>
-          </a:fontRef>
-        </p:style>
-        <p:txBody>
-          <a:bodyPr rtlCol="0" anchor="ctr"/>
-          <a:lstStyle/>
-          <a:p>
-            <a:pPr algn="ctr"/>
-            <a:r>
-              <a:rPr lang="en-US" sz="1800" dirty="0" smtClean="0">
-                <a:latin typeface="Arial" pitchFamily="34" charset="0"/>
-                <a:cs typeface="Arial" pitchFamily="34" charset="0"/>
-              </a:rPr>
-              <a:t>Check Collision x</a:t>
-            </a:r>
-            <a:endParaRPr lang="en-US" sz="1800" dirty="0">
-              <a:latin typeface="Arial" pitchFamily="34" charset="0"/>
-              <a:cs typeface="Arial" pitchFamily="34" charset="0"/>
-            </a:endParaRPr>
-          </a:p>
-        </p:txBody>
-      </p:sp>
-      <p:cxnSp>
-        <p:nvCxnSpPr>
-          <p:cNvPr id="12" name="Straight Arrow Connector 11"/>
-          <p:cNvCxnSpPr/>
-          <p:nvPr/>
-        </p:nvCxnSpPr>
-        <p:spPr bwMode="auto">
-          <a:xfrm flipV="1">
-            <a:off x="5077423" y="3069235"/>
-            <a:ext cx="1104900" cy="381000"/>
-          </a:xfrm>
-          <a:prstGeom prst="straightConnector1">
-            <a:avLst/>
-          </a:prstGeom>
-          <a:solidFill>
-            <a:schemeClr val="accent1"/>
-          </a:solidFill>
-          <a:ln w="12700" cap="flat" cmpd="sng" algn="ctr">
-            <a:solidFill>
-              <a:schemeClr val="tx1"/>
-            </a:solidFill>
-            <a:prstDash val="solid"/>
-            <a:round/>
-            <a:headEnd type="none" w="med" len="med"/>
-            <a:tailEnd type="triangle"/>
-          </a:ln>
-          <a:effectLst/>
-        </p:spPr>
-      </p:cxnSp>
-      <p:cxnSp>
-        <p:nvCxnSpPr>
-          <p:cNvPr id="13" name="Straight Arrow Connector 12"/>
-          <p:cNvCxnSpPr/>
-          <p:nvPr/>
-        </p:nvCxnSpPr>
-        <p:spPr bwMode="auto">
-          <a:xfrm flipV="1">
-            <a:off x="5058373" y="2564837"/>
-            <a:ext cx="1129812" cy="457200"/>
-          </a:xfrm>
-          <a:prstGeom prst="straightConnector1">
-            <a:avLst/>
-          </a:prstGeom>
-          <a:solidFill>
-            <a:schemeClr val="accent1"/>
-          </a:solidFill>
-          <a:ln w="12700" cap="flat" cmpd="sng" algn="ctr">
-            <a:solidFill>
-              <a:schemeClr val="tx1"/>
-            </a:solidFill>
-            <a:prstDash val="solid"/>
-            <a:round/>
-            <a:headEnd type="none" w="med" len="med"/>
-            <a:tailEnd type="triangle"/>
-          </a:ln>
-          <a:effectLst/>
-        </p:spPr>
-      </p:cxnSp>
-      <p:sp>
-        <p:nvSpPr>
-          <p:cNvPr id="14" name="Rectangle 13"/>
-          <p:cNvSpPr/>
-          <p:nvPr/>
-        </p:nvSpPr>
-        <p:spPr bwMode="auto">
-          <a:xfrm>
-            <a:off x="6188185" y="4711931"/>
-            <a:ext cx="1093177" cy="1143000"/>
-          </a:xfrm>
-          <a:prstGeom prst="rect">
-            <a:avLst/>
-          </a:prstGeom>
-          <a:ln>
-            <a:headEnd/>
-            <a:tailEnd type="triangle" w="med" len="med"/>
-          </a:ln>
-        </p:spPr>
-        <p:style>
-          <a:lnRef idx="2">
-            <a:schemeClr val="dk1">
-              <a:shade val="50000"/>
-            </a:schemeClr>
-          </a:lnRef>
-          <a:fillRef idx="1">
-            <a:schemeClr val="dk1"/>
-          </a:fillRef>
-          <a:effectRef idx="0">
-            <a:schemeClr val="dk1"/>
-          </a:effectRef>
-          <a:fontRef idx="minor">
-            <a:schemeClr val="lt1"/>
-          </a:fontRef>
-        </p:style>
-        <p:txBody>
-          <a:bodyPr rtlCol="0" anchor="ctr"/>
-          <a:lstStyle/>
-          <a:p>
-            <a:pPr algn="ctr"/>
-            <a:r>
-              <a:rPr lang="en-US" sz="1800" dirty="0" smtClean="0">
-                <a:latin typeface="Arial" pitchFamily="34" charset="0"/>
-                <a:cs typeface="Arial" pitchFamily="34" charset="0"/>
-              </a:rPr>
-              <a:t>Check Collision y</a:t>
-            </a:r>
-            <a:endParaRPr lang="en-US" sz="1800" dirty="0">
-              <a:latin typeface="Arial" pitchFamily="34" charset="0"/>
-              <a:cs typeface="Arial" pitchFamily="34" charset="0"/>
-            </a:endParaRPr>
-          </a:p>
-        </p:txBody>
-      </p:sp>
-      <p:cxnSp>
-        <p:nvCxnSpPr>
-          <p:cNvPr id="15" name="Straight Arrow Connector 14"/>
-          <p:cNvCxnSpPr/>
-          <p:nvPr/>
-        </p:nvCxnSpPr>
-        <p:spPr bwMode="auto">
-          <a:xfrm>
-            <a:off x="5056908" y="4711931"/>
-            <a:ext cx="1104900" cy="381000"/>
-          </a:xfrm>
-          <a:prstGeom prst="straightConnector1">
-            <a:avLst/>
-          </a:prstGeom>
-          <a:solidFill>
-            <a:schemeClr val="accent1"/>
-          </a:solidFill>
-          <a:ln w="12700" cap="flat" cmpd="sng" algn="ctr">
-            <a:solidFill>
-              <a:schemeClr val="tx1"/>
-            </a:solidFill>
-            <a:prstDash val="solid"/>
-            <a:round/>
-            <a:headEnd type="none" w="med" len="med"/>
-            <a:tailEnd type="triangle"/>
-          </a:ln>
-          <a:effectLst/>
-        </p:spPr>
-      </p:cxnSp>
-      <p:cxnSp>
-        <p:nvCxnSpPr>
-          <p:cNvPr id="16" name="Straight Arrow Connector 15"/>
-          <p:cNvCxnSpPr/>
-          <p:nvPr/>
-        </p:nvCxnSpPr>
-        <p:spPr bwMode="auto">
-          <a:xfrm>
-            <a:off x="5007085" y="5054831"/>
-            <a:ext cx="1129812" cy="457200"/>
-          </a:xfrm>
-          <a:prstGeom prst="straightConnector1">
-            <a:avLst/>
-          </a:prstGeom>
-          <a:solidFill>
-            <a:schemeClr val="accent1"/>
-          </a:solidFill>
-          <a:ln w="12700" cap="flat" cmpd="sng" algn="ctr">
-            <a:solidFill>
-              <a:schemeClr val="tx1"/>
-            </a:solidFill>
-            <a:prstDash val="solid"/>
-            <a:round/>
-            <a:headEnd type="none" w="med" len="med"/>
-            <a:tailEnd type="triangle"/>
-          </a:ln>
-          <a:effectLst/>
-        </p:spPr>
-      </p:cxnSp>
-      <p:cxnSp>
-        <p:nvCxnSpPr>
-          <p:cNvPr id="17" name="Straight Arrow Connector 16"/>
-          <p:cNvCxnSpPr/>
-          <p:nvPr/>
-        </p:nvCxnSpPr>
-        <p:spPr bwMode="auto">
-          <a:xfrm>
-            <a:off x="7243788" y="2864037"/>
-            <a:ext cx="1128346" cy="533400"/>
-          </a:xfrm>
-          <a:prstGeom prst="straightConnector1">
-            <a:avLst/>
-          </a:prstGeom>
-          <a:solidFill>
-            <a:schemeClr val="accent1"/>
-          </a:solidFill>
-          <a:ln w="12700" cap="flat" cmpd="sng" algn="ctr">
-            <a:solidFill>
-              <a:schemeClr val="tx1"/>
-            </a:solidFill>
-            <a:prstDash val="solid"/>
-            <a:round/>
-            <a:headEnd type="none" w="med" len="med"/>
-            <a:tailEnd type="triangle"/>
-          </a:ln>
-          <a:effectLst/>
-        </p:spPr>
-      </p:cxnSp>
-      <p:cxnSp>
-        <p:nvCxnSpPr>
-          <p:cNvPr id="18" name="Straight Arrow Connector 17"/>
-          <p:cNvCxnSpPr/>
-          <p:nvPr/>
-        </p:nvCxnSpPr>
-        <p:spPr bwMode="auto">
-          <a:xfrm>
-            <a:off x="7275369" y="3194750"/>
-            <a:ext cx="1122484" cy="522287"/>
-          </a:xfrm>
-          <a:prstGeom prst="straightConnector1">
-            <a:avLst/>
-          </a:prstGeom>
-          <a:solidFill>
-            <a:schemeClr val="accent1"/>
-          </a:solidFill>
-          <a:ln w="12700" cap="flat" cmpd="sng" algn="ctr">
-            <a:solidFill>
-              <a:schemeClr val="tx1"/>
-            </a:solidFill>
-            <a:prstDash val="solid"/>
-            <a:round/>
-            <a:headEnd type="none" w="med" len="med"/>
-            <a:tailEnd type="triangle"/>
-          </a:ln>
-          <a:effectLst/>
-        </p:spPr>
-      </p:cxnSp>
-      <p:cxnSp>
-        <p:nvCxnSpPr>
-          <p:cNvPr id="19" name="Straight Arrow Connector 18"/>
-          <p:cNvCxnSpPr/>
-          <p:nvPr/>
-        </p:nvCxnSpPr>
-        <p:spPr bwMode="auto">
-          <a:xfrm flipV="1">
-            <a:off x="7332650" y="4679598"/>
-            <a:ext cx="1039897" cy="622081"/>
-          </a:xfrm>
-          <a:prstGeom prst="straightConnector1">
-            <a:avLst/>
-          </a:prstGeom>
-          <a:solidFill>
-            <a:schemeClr val="accent1"/>
-          </a:solidFill>
-          <a:ln w="12700" cap="flat" cmpd="sng" algn="ctr">
-            <a:solidFill>
-              <a:schemeClr val="tx1"/>
-            </a:solidFill>
-            <a:prstDash val="solid"/>
-            <a:round/>
-            <a:headEnd type="none" w="med" len="med"/>
-            <a:tailEnd type="triangle"/>
-          </a:ln>
-          <a:effectLst/>
-        </p:spPr>
-      </p:cxnSp>
-      <p:cxnSp>
-        <p:nvCxnSpPr>
-          <p:cNvPr id="20" name="Straight Arrow Connector 19"/>
-          <p:cNvCxnSpPr/>
-          <p:nvPr/>
-        </p:nvCxnSpPr>
-        <p:spPr bwMode="auto">
-          <a:xfrm flipV="1">
-            <a:off x="7274796" y="4861186"/>
-            <a:ext cx="1096107" cy="720634"/>
-          </a:xfrm>
-          <a:prstGeom prst="straightConnector1">
-            <a:avLst/>
-          </a:prstGeom>
-          <a:solidFill>
-            <a:schemeClr val="accent1"/>
-          </a:solidFill>
-          <a:ln w="12700" cap="flat" cmpd="sng" algn="ctr">
-            <a:solidFill>
-              <a:schemeClr val="tx1"/>
-            </a:solidFill>
-            <a:prstDash val="solid"/>
-            <a:round/>
-            <a:headEnd type="none" w="med" len="med"/>
-            <a:tailEnd type="triangle"/>
-          </a:ln>
-          <a:effectLst/>
-        </p:spPr>
-      </p:cxnSp>
-      <p:cxnSp>
-        <p:nvCxnSpPr>
-          <p:cNvPr id="21" name="Straight Arrow Connector 20"/>
-          <p:cNvCxnSpPr>
-            <a:endCxn id="5" idx="0"/>
-          </p:cNvCxnSpPr>
-          <p:nvPr/>
-        </p:nvCxnSpPr>
-        <p:spPr bwMode="auto">
-          <a:xfrm flipH="1">
-            <a:off x="8943108" y="2425931"/>
-            <a:ext cx="2931" cy="762000"/>
-          </a:xfrm>
-          <a:prstGeom prst="straightConnector1">
-            <a:avLst/>
-          </a:prstGeom>
-          <a:solidFill>
-            <a:schemeClr val="accent1"/>
-          </a:solidFill>
-          <a:ln w="12700" cap="flat" cmpd="sng" algn="ctr">
-            <a:solidFill>
-              <a:schemeClr val="tx1"/>
-            </a:solidFill>
-            <a:prstDash val="solid"/>
-            <a:round/>
-            <a:headEnd type="none" w="med" len="med"/>
-            <a:tailEnd type="triangle"/>
-          </a:ln>
-          <a:effectLst/>
-        </p:spPr>
-      </p:cxnSp>
-      <p:cxnSp>
-        <p:nvCxnSpPr>
-          <p:cNvPr id="22" name="Straight Arrow Connector 21"/>
-          <p:cNvCxnSpPr/>
-          <p:nvPr/>
-        </p:nvCxnSpPr>
-        <p:spPr bwMode="auto">
-          <a:xfrm>
-            <a:off x="9476508" y="3634018"/>
-            <a:ext cx="685800" cy="0"/>
-          </a:xfrm>
-          <a:prstGeom prst="straightConnector1">
-            <a:avLst/>
-          </a:prstGeom>
-          <a:solidFill>
-            <a:schemeClr val="accent1"/>
-          </a:solidFill>
-          <a:ln w="12700" cap="flat" cmpd="sng" algn="ctr">
-            <a:solidFill>
-              <a:srgbClr val="FF0000"/>
-            </a:solidFill>
-            <a:prstDash val="solid"/>
-            <a:round/>
-            <a:headEnd type="none" w="med" len="med"/>
-            <a:tailEnd type="triangle"/>
-          </a:ln>
-          <a:effectLst/>
-        </p:spPr>
-      </p:cxnSp>
-      <p:cxnSp>
-        <p:nvCxnSpPr>
-          <p:cNvPr id="23" name="Straight Arrow Connector 22"/>
-          <p:cNvCxnSpPr/>
-          <p:nvPr/>
-        </p:nvCxnSpPr>
-        <p:spPr bwMode="auto">
-          <a:xfrm>
-            <a:off x="9476508" y="4102331"/>
-            <a:ext cx="685800" cy="0"/>
-          </a:xfrm>
-          <a:prstGeom prst="straightConnector1">
-            <a:avLst/>
-          </a:prstGeom>
-          <a:solidFill>
-            <a:schemeClr val="accent1"/>
-          </a:solidFill>
-          <a:ln w="12700" cap="flat" cmpd="sng" algn="ctr">
-            <a:solidFill>
-              <a:srgbClr val="00B050"/>
-            </a:solidFill>
-            <a:prstDash val="solid"/>
-            <a:round/>
-            <a:headEnd type="none" w="med" len="med"/>
-            <a:tailEnd type="triangle"/>
-          </a:ln>
-          <a:effectLst/>
-        </p:spPr>
-      </p:cxnSp>
-      <p:cxnSp>
-        <p:nvCxnSpPr>
-          <p:cNvPr id="24" name="Straight Arrow Connector 23"/>
-          <p:cNvCxnSpPr/>
-          <p:nvPr/>
-        </p:nvCxnSpPr>
-        <p:spPr bwMode="auto">
-          <a:xfrm>
-            <a:off x="9476508" y="4635731"/>
-            <a:ext cx="685800" cy="0"/>
-          </a:xfrm>
-          <a:prstGeom prst="straightConnector1">
-            <a:avLst/>
-          </a:prstGeom>
-          <a:solidFill>
-            <a:schemeClr val="accent1"/>
-          </a:solidFill>
-          <a:ln w="12700" cap="flat" cmpd="sng" algn="ctr">
-            <a:solidFill>
-              <a:srgbClr val="0000FF"/>
-            </a:solidFill>
-            <a:prstDash val="solid"/>
-            <a:round/>
-            <a:headEnd type="none" w="med" len="med"/>
-            <a:tailEnd type="triangle"/>
-          </a:ln>
-          <a:effectLst/>
-        </p:spPr>
-      </p:cxnSp>
-      <p:sp>
-        <p:nvSpPr>
-          <p:cNvPr id="25" name="Rectangle 24"/>
-          <p:cNvSpPr/>
-          <p:nvPr/>
-        </p:nvSpPr>
-        <p:spPr bwMode="auto">
-          <a:xfrm>
-            <a:off x="3107946" y="3004213"/>
-            <a:ext cx="675543" cy="292462"/>
-          </a:xfrm>
-          <a:prstGeom prst="rect">
-            <a:avLst/>
-          </a:prstGeom>
-          <a:ln>
-            <a:headEnd/>
-            <a:tailEnd type="triangle" w="med" len="med"/>
-          </a:ln>
-        </p:spPr>
-        <p:style>
-          <a:lnRef idx="2">
-            <a:schemeClr val="accent2">
-              <a:shade val="50000"/>
-            </a:schemeClr>
-          </a:lnRef>
-          <a:fillRef idx="1">
-            <a:schemeClr val="accent2"/>
-          </a:fillRef>
-          <a:effectRef idx="0">
-            <a:schemeClr val="accent2"/>
-          </a:effectRef>
-          <a:fontRef idx="minor">
-            <a:schemeClr val="lt1"/>
-          </a:fontRef>
-        </p:style>
-        <p:txBody>
-          <a:bodyPr rtlCol="0" anchor="ctr"/>
-          <a:lstStyle/>
-          <a:p>
-            <a:pPr algn="ctr"/>
-            <a:r>
-              <a:rPr lang="en-US" sz="1200" dirty="0" smtClean="0">
-                <a:latin typeface="Arial" pitchFamily="34" charset="0"/>
-                <a:cs typeface="Arial" pitchFamily="34" charset="0"/>
-              </a:rPr>
-              <a:t>Box</a:t>
-            </a:r>
-            <a:endParaRPr lang="en-US" sz="1200" dirty="0">
-              <a:latin typeface="Arial" pitchFamily="34" charset="0"/>
-              <a:cs typeface="Arial" pitchFamily="34" charset="0"/>
-            </a:endParaRPr>
-          </a:p>
-        </p:txBody>
-      </p:sp>
-      <p:sp>
-        <p:nvSpPr>
-          <p:cNvPr id="26" name="Rectangle 25"/>
-          <p:cNvSpPr/>
-          <p:nvPr/>
-        </p:nvSpPr>
-        <p:spPr bwMode="auto">
-          <a:xfrm>
-            <a:off x="3151908" y="3492731"/>
-            <a:ext cx="669681" cy="380999"/>
-          </a:xfrm>
-          <a:prstGeom prst="rect">
-            <a:avLst/>
-          </a:prstGeom>
-          <a:ln>
-            <a:headEnd/>
-            <a:tailEnd type="triangle" w="med" len="med"/>
-          </a:ln>
-        </p:spPr>
-        <p:style>
-          <a:lnRef idx="2">
-            <a:schemeClr val="accent2">
-              <a:shade val="50000"/>
-            </a:schemeClr>
-          </a:lnRef>
-          <a:fillRef idx="1">
-            <a:schemeClr val="accent2"/>
-          </a:fillRef>
-          <a:effectRef idx="0">
-            <a:schemeClr val="accent2"/>
-          </a:effectRef>
-          <a:fontRef idx="minor">
-            <a:schemeClr val="lt1"/>
-          </a:fontRef>
-        </p:style>
-        <p:txBody>
-          <a:bodyPr rtlCol="0" anchor="ctr"/>
-          <a:lstStyle/>
-          <a:p>
-            <a:pPr algn="ctr"/>
-            <a:r>
-              <a:rPr lang="en-US" sz="1200" dirty="0" smtClean="0">
-                <a:latin typeface="Arial" pitchFamily="34" charset="0"/>
-                <a:cs typeface="Arial" pitchFamily="34" charset="0"/>
-              </a:rPr>
-              <a:t>Paddle 1</a:t>
-            </a:r>
-            <a:endParaRPr lang="en-US" sz="1200" dirty="0">
-              <a:latin typeface="Arial" pitchFamily="34" charset="0"/>
-              <a:cs typeface="Arial" pitchFamily="34" charset="0"/>
-            </a:endParaRPr>
-          </a:p>
-        </p:txBody>
-      </p:sp>
-      <p:sp>
-        <p:nvSpPr>
-          <p:cNvPr id="27" name="Rectangle 26"/>
-          <p:cNvSpPr/>
-          <p:nvPr/>
-        </p:nvSpPr>
-        <p:spPr bwMode="auto">
-          <a:xfrm>
-            <a:off x="3151908" y="4102330"/>
-            <a:ext cx="669681" cy="424657"/>
-          </a:xfrm>
-          <a:prstGeom prst="rect">
-            <a:avLst/>
-          </a:prstGeom>
-          <a:ln>
-            <a:headEnd/>
-            <a:tailEnd type="triangle" w="med" len="med"/>
-          </a:ln>
-        </p:spPr>
-        <p:style>
-          <a:lnRef idx="2">
-            <a:schemeClr val="accent2">
-              <a:shade val="50000"/>
-            </a:schemeClr>
-          </a:lnRef>
-          <a:fillRef idx="1">
-            <a:schemeClr val="accent2"/>
-          </a:fillRef>
-          <a:effectRef idx="0">
-            <a:schemeClr val="accent2"/>
-          </a:effectRef>
-          <a:fontRef idx="minor">
-            <a:schemeClr val="lt1"/>
-          </a:fontRef>
-        </p:style>
-        <p:txBody>
-          <a:bodyPr rtlCol="0" anchor="ctr"/>
-          <a:lstStyle/>
-          <a:p>
-            <a:pPr algn="ctr"/>
-            <a:r>
-              <a:rPr lang="en-US" sz="1200" dirty="0" smtClean="0">
-                <a:latin typeface="Arial" pitchFamily="34" charset="0"/>
-                <a:cs typeface="Arial" pitchFamily="34" charset="0"/>
-              </a:rPr>
-              <a:t>Paddle</a:t>
-            </a:r>
-            <a:r>
-              <a:rPr lang="en-US" sz="1800" dirty="0" smtClean="0">
-                <a:latin typeface="Arial" pitchFamily="34" charset="0"/>
-                <a:cs typeface="Arial" pitchFamily="34" charset="0"/>
-              </a:rPr>
-              <a:t> </a:t>
-            </a:r>
-            <a:r>
-              <a:rPr lang="en-US" sz="1200" dirty="0" smtClean="0">
-                <a:latin typeface="Arial" pitchFamily="34" charset="0"/>
-                <a:cs typeface="Arial" pitchFamily="34" charset="0"/>
-              </a:rPr>
-              <a:t>2</a:t>
-            </a:r>
-            <a:endParaRPr lang="en-US" sz="1200" dirty="0">
-              <a:latin typeface="Arial" pitchFamily="34" charset="0"/>
-              <a:cs typeface="Arial" pitchFamily="34" charset="0"/>
-            </a:endParaRPr>
-          </a:p>
-        </p:txBody>
-      </p:sp>
-      <p:sp>
-        <p:nvSpPr>
-          <p:cNvPr id="28" name="Rectangle 27"/>
-          <p:cNvSpPr/>
-          <p:nvPr/>
-        </p:nvSpPr>
-        <p:spPr bwMode="auto">
-          <a:xfrm>
-            <a:off x="3195137" y="4799906"/>
-            <a:ext cx="523142" cy="304800"/>
-          </a:xfrm>
-          <a:prstGeom prst="rect">
-            <a:avLst/>
-          </a:prstGeom>
-          <a:ln>
-            <a:headEnd/>
-            <a:tailEnd type="triangle" w="med" len="med"/>
-          </a:ln>
-        </p:spPr>
-        <p:style>
-          <a:lnRef idx="2">
-            <a:schemeClr val="accent2">
-              <a:shade val="50000"/>
-            </a:schemeClr>
-          </a:lnRef>
-          <a:fillRef idx="1">
-            <a:schemeClr val="accent2"/>
-          </a:fillRef>
-          <a:effectRef idx="0">
-            <a:schemeClr val="accent2"/>
-          </a:effectRef>
-          <a:fontRef idx="minor">
-            <a:schemeClr val="lt1"/>
-          </a:fontRef>
-        </p:style>
-        <p:txBody>
-          <a:bodyPr rtlCol="0" anchor="ctr"/>
-          <a:lstStyle/>
-          <a:p>
-            <a:pPr algn="ctr"/>
-            <a:r>
-              <a:rPr lang="en-US" sz="1200" dirty="0" smtClean="0">
-                <a:latin typeface="Arial" pitchFamily="34" charset="0"/>
-                <a:cs typeface="Arial" pitchFamily="34" charset="0"/>
-              </a:rPr>
-              <a:t>CLK</a:t>
-            </a:r>
-            <a:endParaRPr lang="en-US" sz="1200" dirty="0">
-              <a:latin typeface="Arial" pitchFamily="34" charset="0"/>
-              <a:cs typeface="Arial" pitchFamily="34" charset="0"/>
-            </a:endParaRPr>
-          </a:p>
-        </p:txBody>
-      </p:sp>
-      <p:cxnSp>
-        <p:nvCxnSpPr>
-          <p:cNvPr id="29" name="Straight Arrow Connector 28"/>
-          <p:cNvCxnSpPr/>
-          <p:nvPr/>
-        </p:nvCxnSpPr>
-        <p:spPr bwMode="auto">
-          <a:xfrm flipV="1">
-            <a:off x="5017869" y="3378277"/>
-            <a:ext cx="1181100" cy="500856"/>
-          </a:xfrm>
-          <a:prstGeom prst="straightConnector1">
-            <a:avLst/>
-          </a:prstGeom>
-          <a:solidFill>
-            <a:schemeClr val="accent1"/>
-          </a:solidFill>
-          <a:ln w="12700" cap="flat" cmpd="sng" algn="ctr">
-            <a:solidFill>
-              <a:schemeClr val="tx1"/>
-            </a:solidFill>
-            <a:prstDash val="solid"/>
-            <a:round/>
-            <a:headEnd type="none" w="med" len="med"/>
-            <a:tailEnd type="triangle"/>
-          </a:ln>
-          <a:effectLst/>
-        </p:spPr>
-      </p:cxnSp>
-      <p:sp>
-        <p:nvSpPr>
-          <p:cNvPr id="30" name="Rectangle 29"/>
-          <p:cNvSpPr/>
-          <p:nvPr/>
-        </p:nvSpPr>
-        <p:spPr bwMode="auto">
-          <a:xfrm rot="20245664">
-            <a:off x="5180630" y="2640457"/>
-            <a:ext cx="608867" cy="162963"/>
-          </a:xfrm>
-          <a:prstGeom prst="rect">
-            <a:avLst/>
-          </a:prstGeom>
-          <a:ln>
-            <a:headEnd/>
-            <a:tailEnd type="triangle" w="med" len="med"/>
-          </a:ln>
-        </p:spPr>
-        <p:style>
-          <a:lnRef idx="2">
-            <a:schemeClr val="accent2">
-              <a:shade val="50000"/>
-            </a:schemeClr>
-          </a:lnRef>
-          <a:fillRef idx="1">
-            <a:schemeClr val="accent2"/>
-          </a:fillRef>
-          <a:effectRef idx="0">
-            <a:schemeClr val="accent2"/>
-          </a:effectRef>
-          <a:fontRef idx="minor">
-            <a:schemeClr val="lt1"/>
-          </a:fontRef>
-        </p:style>
-        <p:txBody>
-          <a:bodyPr rtlCol="0" anchor="ctr"/>
-          <a:lstStyle/>
-          <a:p>
-            <a:pPr algn="ctr"/>
-            <a:r>
-              <a:rPr lang="en-US" sz="1200" dirty="0" smtClean="0">
-                <a:latin typeface="Arial" pitchFamily="34" charset="0"/>
-                <a:cs typeface="Arial" pitchFamily="34" charset="0"/>
-              </a:rPr>
-              <a:t>Box X</a:t>
-            </a:r>
-            <a:endParaRPr lang="en-US" sz="1200" dirty="0">
-              <a:latin typeface="Arial" pitchFamily="34" charset="0"/>
-              <a:cs typeface="Arial" pitchFamily="34" charset="0"/>
-            </a:endParaRPr>
-          </a:p>
-        </p:txBody>
-      </p:sp>
-      <p:sp>
-        <p:nvSpPr>
-          <p:cNvPr id="31" name="Rectangle 30"/>
-          <p:cNvSpPr/>
-          <p:nvPr/>
-        </p:nvSpPr>
-        <p:spPr bwMode="auto">
-          <a:xfrm rot="20328255">
-            <a:off x="5050680" y="2993035"/>
-            <a:ext cx="1092445" cy="152400"/>
-          </a:xfrm>
-          <a:prstGeom prst="rect">
-            <a:avLst/>
-          </a:prstGeom>
-          <a:ln>
-            <a:headEnd/>
-            <a:tailEnd type="triangle" w="med" len="med"/>
-          </a:ln>
-        </p:spPr>
-        <p:style>
-          <a:lnRef idx="2">
-            <a:schemeClr val="accent2">
-              <a:shade val="50000"/>
-            </a:schemeClr>
-          </a:lnRef>
-          <a:fillRef idx="1">
-            <a:schemeClr val="accent2"/>
-          </a:fillRef>
-          <a:effectRef idx="0">
-            <a:schemeClr val="accent2"/>
-          </a:effectRef>
-          <a:fontRef idx="minor">
-            <a:schemeClr val="lt1"/>
-          </a:fontRef>
-        </p:style>
-        <p:txBody>
-          <a:bodyPr rtlCol="0" anchor="ctr"/>
-          <a:lstStyle/>
-          <a:p>
-            <a:pPr algn="ctr"/>
-            <a:r>
-              <a:rPr lang="en-US" sz="1200" dirty="0" smtClean="0">
-                <a:latin typeface="Arial" pitchFamily="34" charset="0"/>
-                <a:cs typeface="Arial" pitchFamily="34" charset="0"/>
-              </a:rPr>
-              <a:t>Paddle 1 X</a:t>
-            </a:r>
-            <a:endParaRPr lang="en-US" sz="1200" dirty="0">
-              <a:latin typeface="Arial" pitchFamily="34" charset="0"/>
-              <a:cs typeface="Arial" pitchFamily="34" charset="0"/>
-            </a:endParaRPr>
-          </a:p>
-        </p:txBody>
-      </p:sp>
-      <p:sp>
-        <p:nvSpPr>
-          <p:cNvPr id="32" name="Rectangle 31"/>
-          <p:cNvSpPr/>
-          <p:nvPr/>
-        </p:nvSpPr>
-        <p:spPr bwMode="auto">
-          <a:xfrm rot="20181737">
-            <a:off x="5058299" y="3412167"/>
-            <a:ext cx="1148862" cy="145010"/>
-          </a:xfrm>
-          <a:prstGeom prst="rect">
-            <a:avLst/>
-          </a:prstGeom>
-          <a:ln>
-            <a:headEnd/>
-            <a:tailEnd type="triangle" w="med" len="med"/>
-          </a:ln>
-        </p:spPr>
-        <p:style>
-          <a:lnRef idx="2">
-            <a:schemeClr val="accent2">
-              <a:shade val="50000"/>
-            </a:schemeClr>
-          </a:lnRef>
-          <a:fillRef idx="1">
-            <a:schemeClr val="accent2"/>
-          </a:fillRef>
-          <a:effectRef idx="0">
-            <a:schemeClr val="accent2"/>
-          </a:effectRef>
-          <a:fontRef idx="minor">
-            <a:schemeClr val="lt1"/>
-          </a:fontRef>
-        </p:style>
-        <p:txBody>
-          <a:bodyPr rtlCol="0" anchor="ctr"/>
-          <a:lstStyle/>
-          <a:p>
-            <a:pPr algn="ctr"/>
-            <a:r>
-              <a:rPr lang="en-US" sz="1200" dirty="0" smtClean="0">
-                <a:latin typeface="Arial" pitchFamily="34" charset="0"/>
-                <a:cs typeface="Arial" pitchFamily="34" charset="0"/>
-              </a:rPr>
-              <a:t>Paddle 2 X</a:t>
-            </a:r>
-            <a:endParaRPr lang="en-US" sz="1200" dirty="0">
-              <a:latin typeface="Arial" pitchFamily="34" charset="0"/>
-              <a:cs typeface="Arial" pitchFamily="34" charset="0"/>
-            </a:endParaRPr>
-          </a:p>
-        </p:txBody>
-      </p:sp>
-      <p:cxnSp>
-        <p:nvCxnSpPr>
-          <p:cNvPr id="33" name="Straight Arrow Connector 32"/>
-          <p:cNvCxnSpPr/>
-          <p:nvPr/>
-        </p:nvCxnSpPr>
-        <p:spPr bwMode="auto">
-          <a:xfrm>
-            <a:off x="5007085" y="5435831"/>
-            <a:ext cx="1107590" cy="381000"/>
-          </a:xfrm>
-          <a:prstGeom prst="straightConnector1">
-            <a:avLst/>
-          </a:prstGeom>
-          <a:solidFill>
-            <a:schemeClr val="accent1"/>
-          </a:solidFill>
-          <a:ln w="12700" cap="flat" cmpd="sng" algn="ctr">
-            <a:solidFill>
-              <a:schemeClr val="tx1"/>
-            </a:solidFill>
-            <a:prstDash val="solid"/>
-            <a:round/>
-            <a:headEnd type="none" w="med" len="med"/>
-            <a:tailEnd type="triangle"/>
-          </a:ln>
-          <a:effectLst/>
-        </p:spPr>
-      </p:cxnSp>
-      <p:sp>
-        <p:nvSpPr>
-          <p:cNvPr id="34" name="Rectangle 33"/>
-          <p:cNvSpPr/>
-          <p:nvPr/>
-        </p:nvSpPr>
-        <p:spPr bwMode="auto">
-          <a:xfrm rot="1190527">
-            <a:off x="5243011" y="4611037"/>
-            <a:ext cx="707781" cy="248414"/>
-          </a:xfrm>
-          <a:prstGeom prst="rect">
-            <a:avLst/>
-          </a:prstGeom>
-          <a:ln>
-            <a:headEnd/>
-            <a:tailEnd type="triangle" w="med" len="med"/>
-          </a:ln>
-        </p:spPr>
-        <p:style>
-          <a:lnRef idx="2">
-            <a:schemeClr val="accent2">
-              <a:shade val="50000"/>
-            </a:schemeClr>
-          </a:lnRef>
-          <a:fillRef idx="1">
-            <a:schemeClr val="accent2"/>
-          </a:fillRef>
-          <a:effectRef idx="0">
-            <a:schemeClr val="accent2"/>
-          </a:effectRef>
-          <a:fontRef idx="minor">
-            <a:schemeClr val="lt1"/>
-          </a:fontRef>
-        </p:style>
-        <p:txBody>
-          <a:bodyPr rtlCol="0" anchor="ctr"/>
-          <a:lstStyle/>
-          <a:p>
-            <a:pPr algn="ctr"/>
-            <a:r>
-              <a:rPr lang="en-US" sz="1200" dirty="0" smtClean="0">
-                <a:latin typeface="Arial" pitchFamily="34" charset="0"/>
-                <a:cs typeface="Arial" pitchFamily="34" charset="0"/>
-              </a:rPr>
-              <a:t>Box Y</a:t>
-            </a:r>
-            <a:endParaRPr lang="en-US" sz="1200" dirty="0">
-              <a:latin typeface="Arial" pitchFamily="34" charset="0"/>
-              <a:cs typeface="Arial" pitchFamily="34" charset="0"/>
-            </a:endParaRPr>
-          </a:p>
-        </p:txBody>
-      </p:sp>
-      <p:sp>
-        <p:nvSpPr>
-          <p:cNvPr id="35" name="Rectangle 34"/>
-          <p:cNvSpPr/>
-          <p:nvPr/>
-        </p:nvSpPr>
-        <p:spPr bwMode="auto">
-          <a:xfrm rot="1318118">
-            <a:off x="5057359" y="5009172"/>
-            <a:ext cx="996462" cy="191068"/>
-          </a:xfrm>
-          <a:prstGeom prst="rect">
-            <a:avLst/>
-          </a:prstGeom>
-          <a:ln>
-            <a:headEnd/>
-            <a:tailEnd type="triangle" w="med" len="med"/>
-          </a:ln>
-        </p:spPr>
-        <p:style>
-          <a:lnRef idx="2">
-            <a:schemeClr val="accent2">
-              <a:shade val="50000"/>
-            </a:schemeClr>
-          </a:lnRef>
-          <a:fillRef idx="1">
-            <a:schemeClr val="accent2"/>
-          </a:fillRef>
-          <a:effectRef idx="0">
-            <a:schemeClr val="accent2"/>
-          </a:effectRef>
-          <a:fontRef idx="minor">
-            <a:schemeClr val="lt1"/>
-          </a:fontRef>
-        </p:style>
-        <p:txBody>
-          <a:bodyPr rtlCol="0" anchor="ctr"/>
-          <a:lstStyle/>
-          <a:p>
-            <a:pPr algn="ctr"/>
-            <a:r>
-              <a:rPr lang="en-US" sz="1200" dirty="0" smtClean="0">
-                <a:latin typeface="Arial" pitchFamily="34" charset="0"/>
-                <a:cs typeface="Arial" pitchFamily="34" charset="0"/>
-              </a:rPr>
-              <a:t>Paddle 1 Y</a:t>
-            </a:r>
-            <a:endParaRPr lang="en-US" sz="1200" dirty="0">
-              <a:latin typeface="Arial" pitchFamily="34" charset="0"/>
-              <a:cs typeface="Arial" pitchFamily="34" charset="0"/>
-            </a:endParaRPr>
-          </a:p>
-        </p:txBody>
-      </p:sp>
-      <p:sp>
-        <p:nvSpPr>
-          <p:cNvPr id="36" name="Rectangle 35"/>
-          <p:cNvSpPr/>
-          <p:nvPr/>
-        </p:nvSpPr>
-        <p:spPr bwMode="auto">
-          <a:xfrm rot="1206919">
-            <a:off x="5052817" y="5409486"/>
-            <a:ext cx="992066" cy="146998"/>
-          </a:xfrm>
-          <a:prstGeom prst="rect">
-            <a:avLst/>
-          </a:prstGeom>
-          <a:ln>
-            <a:headEnd/>
-            <a:tailEnd type="triangle" w="med" len="med"/>
-          </a:ln>
-        </p:spPr>
-        <p:style>
-          <a:lnRef idx="2">
-            <a:schemeClr val="accent2">
-              <a:shade val="50000"/>
-            </a:schemeClr>
-          </a:lnRef>
-          <a:fillRef idx="1">
-            <a:schemeClr val="accent2"/>
-          </a:fillRef>
-          <a:effectRef idx="0">
-            <a:schemeClr val="accent2"/>
-          </a:effectRef>
-          <a:fontRef idx="minor">
-            <a:schemeClr val="lt1"/>
-          </a:fontRef>
-        </p:style>
-        <p:txBody>
-          <a:bodyPr rtlCol="0" anchor="ctr"/>
-          <a:lstStyle/>
-          <a:p>
-            <a:pPr algn="ctr"/>
-            <a:r>
-              <a:rPr lang="en-US" sz="1200" dirty="0" smtClean="0">
-                <a:latin typeface="Arial" pitchFamily="34" charset="0"/>
-                <a:cs typeface="Arial" pitchFamily="34" charset="0"/>
-              </a:rPr>
-              <a:t>Paddle 2 Y</a:t>
-            </a:r>
-            <a:endParaRPr lang="en-US" sz="1200" dirty="0">
-              <a:latin typeface="Arial" pitchFamily="34" charset="0"/>
-              <a:cs typeface="Arial" pitchFamily="34" charset="0"/>
-            </a:endParaRPr>
-          </a:p>
-        </p:txBody>
-      </p:sp>
-      <p:sp>
-        <p:nvSpPr>
-          <p:cNvPr id="37" name="Rectangle 36"/>
-          <p:cNvSpPr/>
-          <p:nvPr/>
-        </p:nvSpPr>
-        <p:spPr bwMode="auto">
-          <a:xfrm>
-            <a:off x="8562108" y="2094144"/>
-            <a:ext cx="762000" cy="331787"/>
-          </a:xfrm>
-          <a:prstGeom prst="rect">
-            <a:avLst/>
-          </a:prstGeom>
-          <a:ln>
-            <a:headEnd/>
-            <a:tailEnd type="triangle" w="med" len="med"/>
-          </a:ln>
-        </p:spPr>
-        <p:style>
-          <a:lnRef idx="2">
-            <a:schemeClr val="dk1">
-              <a:shade val="50000"/>
-            </a:schemeClr>
-          </a:lnRef>
-          <a:fillRef idx="1">
-            <a:schemeClr val="dk1"/>
-          </a:fillRef>
-          <a:effectRef idx="0">
-            <a:schemeClr val="dk1"/>
-          </a:effectRef>
-          <a:fontRef idx="minor">
-            <a:schemeClr val="lt1"/>
-          </a:fontRef>
-        </p:style>
-        <p:txBody>
-          <a:bodyPr rtlCol="0" anchor="ctr"/>
-          <a:lstStyle/>
-          <a:p>
-            <a:pPr algn="ctr"/>
-            <a:r>
-              <a:rPr lang="en-US" sz="1200" dirty="0" smtClean="0">
-                <a:latin typeface="Arial" pitchFamily="34" charset="0"/>
-                <a:cs typeface="Arial" pitchFamily="34" charset="0"/>
-              </a:rPr>
-              <a:t>CLK</a:t>
-            </a:r>
-            <a:endParaRPr lang="en-US" sz="1200" dirty="0">
-              <a:latin typeface="Arial" pitchFamily="34" charset="0"/>
-              <a:cs typeface="Arial" pitchFamily="34" charset="0"/>
-            </a:endParaRPr>
-          </a:p>
-        </p:txBody>
-      </p:sp>
-      <p:cxnSp>
-        <p:nvCxnSpPr>
-          <p:cNvPr id="41" name="Straight Arrow Connector 40"/>
-          <p:cNvCxnSpPr/>
-          <p:nvPr/>
-        </p:nvCxnSpPr>
+        </p:nvPicPr>
+        <p:blipFill>
+          <a:blip r:embed="rId2">
+            <a:extLst>
+              <a:ext uri="{28A0092B-C50C-407E-A947-70E740481C1C}">
+                <a14:useLocalDpi xmlns:a14="http://schemas.microsoft.com/office/drawing/2010/main" val="0"/>
+              </a:ext>
+            </a:extLst>
+          </a:blip>
+          <a:stretch>
+            <a:fillRect/>
+          </a:stretch>
+        </p:blipFill>
         <p:spPr>
-          <a:xfrm flipV="1">
-            <a:off x="7284816" y="4362266"/>
-            <a:ext cx="1022050" cy="527844"/>
-          </a:xfrm>
-          <a:prstGeom prst="straightConnector1">
-            <a:avLst/>
-          </a:prstGeom>
-          <a:ln>
-            <a:solidFill>
-              <a:schemeClr val="tx1"/>
-            </a:solidFill>
-            <a:tailEnd type="triangle"/>
-          </a:ln>
-        </p:spPr>
-        <p:style>
-          <a:lnRef idx="1">
-            <a:schemeClr val="accent1"/>
-          </a:lnRef>
-          <a:fillRef idx="0">
-            <a:schemeClr val="accent1"/>
-          </a:fillRef>
-          <a:effectRef idx="0">
-            <a:schemeClr val="accent1"/>
-          </a:effectRef>
-          <a:fontRef idx="minor">
-            <a:schemeClr val="tx1"/>
-          </a:fontRef>
-        </p:style>
-      </p:cxnSp>
-      <p:cxnSp>
-        <p:nvCxnSpPr>
-          <p:cNvPr id="43" name="Straight Arrow Connector 42"/>
-          <p:cNvCxnSpPr/>
-          <p:nvPr/>
-        </p:nvCxnSpPr>
-        <p:spPr>
-          <a:xfrm>
-            <a:off x="7319461" y="2455607"/>
-            <a:ext cx="1101969" cy="600895"/>
-          </a:xfrm>
-          <a:prstGeom prst="straightConnector1">
-            <a:avLst/>
-          </a:prstGeom>
-          <a:ln>
-            <a:solidFill>
-              <a:schemeClr val="tx1"/>
-            </a:solidFill>
-            <a:tailEnd type="triangle"/>
-          </a:ln>
-        </p:spPr>
-        <p:style>
-          <a:lnRef idx="1">
-            <a:schemeClr val="accent1"/>
-          </a:lnRef>
-          <a:fillRef idx="0">
-            <a:schemeClr val="accent1"/>
-          </a:fillRef>
-          <a:effectRef idx="0">
-            <a:schemeClr val="accent1"/>
-          </a:effectRef>
-          <a:fontRef idx="minor">
-            <a:schemeClr val="tx1"/>
-          </a:fontRef>
-        </p:style>
-      </p:cxnSp>
-      <p:sp>
-        <p:nvSpPr>
-          <p:cNvPr id="45" name="Rectangle 44"/>
-          <p:cNvSpPr/>
-          <p:nvPr/>
-        </p:nvSpPr>
-        <p:spPr>
-          <a:xfrm rot="1805853">
-            <a:off x="7417257" y="2529590"/>
-            <a:ext cx="1002084" cy="175337"/>
+          <a:xfrm rot="10800000">
+            <a:off x="2066894" y="1221970"/>
+            <a:ext cx="8570424" cy="4987637"/>
           </a:xfrm>
           <a:prstGeom prst="rect">
             <a:avLst/>
           </a:prstGeom>
         </p:spPr>
-        <p:style>
-          <a:lnRef idx="2">
-            <a:schemeClr val="accent2">
-              <a:shade val="50000"/>
-            </a:schemeClr>
-          </a:lnRef>
-          <a:fillRef idx="1">
-            <a:schemeClr val="accent2"/>
-          </a:fillRef>
-          <a:effectRef idx="0">
-            <a:schemeClr val="accent2"/>
-          </a:effectRef>
-          <a:fontRef idx="minor">
-            <a:schemeClr val="lt1"/>
-          </a:fontRef>
-        </p:style>
-        <p:txBody>
-          <a:bodyPr rtlCol="0" anchor="ctr"/>
-          <a:lstStyle/>
-          <a:p>
-            <a:pPr algn="ctr"/>
-            <a:r>
-              <a:rPr lang="en-US" sz="1200" dirty="0" smtClean="0"/>
-              <a:t>Box X Next</a:t>
-            </a:r>
-            <a:endParaRPr lang="en-US" sz="1200" dirty="0"/>
-          </a:p>
-        </p:txBody>
-      </p:sp>
-      <p:sp>
-        <p:nvSpPr>
-          <p:cNvPr id="46" name="Rectangle 45"/>
-          <p:cNvSpPr/>
-          <p:nvPr/>
-        </p:nvSpPr>
-        <p:spPr>
-          <a:xfrm rot="1628090">
-            <a:off x="7217313" y="2856786"/>
-            <a:ext cx="1238597" cy="230717"/>
-          </a:xfrm>
-          <a:prstGeom prst="rect">
-            <a:avLst/>
-          </a:prstGeom>
-        </p:spPr>
-        <p:style>
-          <a:lnRef idx="2">
-            <a:schemeClr val="accent2">
-              <a:shade val="50000"/>
-            </a:schemeClr>
-          </a:lnRef>
-          <a:fillRef idx="1">
-            <a:schemeClr val="accent2"/>
-          </a:fillRef>
-          <a:effectRef idx="0">
-            <a:schemeClr val="accent2"/>
-          </a:effectRef>
-          <a:fontRef idx="minor">
-            <a:schemeClr val="lt1"/>
-          </a:fontRef>
-        </p:style>
-        <p:txBody>
-          <a:bodyPr rtlCol="0" anchor="ctr"/>
-          <a:lstStyle/>
-          <a:p>
-            <a:pPr algn="ctr"/>
-            <a:r>
-              <a:rPr lang="en-US" sz="1200" dirty="0" smtClean="0"/>
-              <a:t>Paddle 1 X Next</a:t>
-            </a:r>
-            <a:endParaRPr lang="en-US" sz="1200" dirty="0"/>
-          </a:p>
-        </p:txBody>
-      </p:sp>
-      <p:sp>
-        <p:nvSpPr>
-          <p:cNvPr id="47" name="Rectangle 46"/>
-          <p:cNvSpPr/>
-          <p:nvPr/>
-        </p:nvSpPr>
-        <p:spPr>
-          <a:xfrm rot="1560034">
-            <a:off x="7239749" y="3187631"/>
-            <a:ext cx="1223357" cy="202278"/>
-          </a:xfrm>
-          <a:prstGeom prst="rect">
-            <a:avLst/>
-          </a:prstGeom>
-        </p:spPr>
-        <p:style>
-          <a:lnRef idx="2">
-            <a:schemeClr val="accent2">
-              <a:shade val="50000"/>
-            </a:schemeClr>
-          </a:lnRef>
-          <a:fillRef idx="1">
-            <a:schemeClr val="accent2"/>
-          </a:fillRef>
-          <a:effectRef idx="0">
-            <a:schemeClr val="accent2"/>
-          </a:effectRef>
-          <a:fontRef idx="minor">
-            <a:schemeClr val="lt1"/>
-          </a:fontRef>
-        </p:style>
-        <p:txBody>
-          <a:bodyPr rtlCol="0" anchor="ctr"/>
-          <a:lstStyle/>
-          <a:p>
-            <a:pPr algn="ctr"/>
-            <a:r>
-              <a:rPr lang="en-US" sz="1200" dirty="0" smtClean="0"/>
-              <a:t>Paddle 2 X Next</a:t>
-            </a:r>
-            <a:endParaRPr lang="en-US" sz="1200" dirty="0"/>
-          </a:p>
-        </p:txBody>
-      </p:sp>
-      <p:sp>
-        <p:nvSpPr>
-          <p:cNvPr id="48" name="Rectangle 47"/>
-          <p:cNvSpPr/>
-          <p:nvPr/>
-        </p:nvSpPr>
-        <p:spPr>
-          <a:xfrm rot="20084610">
-            <a:off x="7227098" y="4373720"/>
-            <a:ext cx="933446" cy="202060"/>
-          </a:xfrm>
-          <a:prstGeom prst="rect">
-            <a:avLst/>
-          </a:prstGeom>
-        </p:spPr>
-        <p:style>
-          <a:lnRef idx="2">
-            <a:schemeClr val="accent2">
-              <a:shade val="50000"/>
-            </a:schemeClr>
-          </a:lnRef>
-          <a:fillRef idx="1">
-            <a:schemeClr val="accent2"/>
-          </a:fillRef>
-          <a:effectRef idx="0">
-            <a:schemeClr val="accent2"/>
-          </a:effectRef>
-          <a:fontRef idx="minor">
-            <a:schemeClr val="lt1"/>
-          </a:fontRef>
-        </p:style>
-        <p:txBody>
-          <a:bodyPr rtlCol="0" anchor="ctr"/>
-          <a:lstStyle/>
-          <a:p>
-            <a:pPr algn="ctr"/>
-            <a:r>
-              <a:rPr lang="en-US" sz="1200" dirty="0" smtClean="0"/>
-              <a:t>Box Y Next</a:t>
-            </a:r>
-            <a:endParaRPr lang="en-US" sz="1200" dirty="0"/>
-          </a:p>
-        </p:txBody>
-      </p:sp>
-      <p:sp>
-        <p:nvSpPr>
-          <p:cNvPr id="49" name="Rectangle 48"/>
-          <p:cNvSpPr/>
-          <p:nvPr/>
-        </p:nvSpPr>
-        <p:spPr>
-          <a:xfrm rot="19823053">
-            <a:off x="7228540" y="4693973"/>
-            <a:ext cx="1228372" cy="208257"/>
-          </a:xfrm>
-          <a:prstGeom prst="rect">
-            <a:avLst/>
-          </a:prstGeom>
-        </p:spPr>
-        <p:style>
-          <a:lnRef idx="2">
-            <a:schemeClr val="accent2">
-              <a:shade val="50000"/>
-            </a:schemeClr>
-          </a:lnRef>
-          <a:fillRef idx="1">
-            <a:schemeClr val="accent2"/>
-          </a:fillRef>
-          <a:effectRef idx="0">
-            <a:schemeClr val="accent2"/>
-          </a:effectRef>
-          <a:fontRef idx="minor">
-            <a:schemeClr val="lt1"/>
-          </a:fontRef>
-        </p:style>
-        <p:txBody>
-          <a:bodyPr rtlCol="0" anchor="ctr"/>
-          <a:lstStyle/>
-          <a:p>
-            <a:pPr algn="ctr"/>
-            <a:r>
-              <a:rPr lang="en-US" sz="1200" dirty="0" smtClean="0"/>
-              <a:t>Paddle 1 Y Next</a:t>
-            </a:r>
-            <a:endParaRPr lang="en-US" sz="1200" dirty="0"/>
-          </a:p>
-        </p:txBody>
-      </p:sp>
-      <p:sp>
-        <p:nvSpPr>
-          <p:cNvPr id="50" name="Rectangle 49"/>
-          <p:cNvSpPr/>
-          <p:nvPr/>
-        </p:nvSpPr>
-        <p:spPr>
-          <a:xfrm rot="19414979">
-            <a:off x="7261472" y="5276267"/>
-            <a:ext cx="1249872" cy="138170"/>
-          </a:xfrm>
-          <a:prstGeom prst="rect">
-            <a:avLst/>
-          </a:prstGeom>
-        </p:spPr>
-        <p:style>
-          <a:lnRef idx="2">
-            <a:schemeClr val="accent2">
-              <a:shade val="50000"/>
-            </a:schemeClr>
-          </a:lnRef>
-          <a:fillRef idx="1">
-            <a:schemeClr val="accent2"/>
-          </a:fillRef>
-          <a:effectRef idx="0">
-            <a:schemeClr val="accent2"/>
-          </a:effectRef>
-          <a:fontRef idx="minor">
-            <a:schemeClr val="lt1"/>
-          </a:fontRef>
-        </p:style>
-        <p:txBody>
-          <a:bodyPr rtlCol="0" anchor="ctr"/>
-          <a:lstStyle/>
-          <a:p>
-            <a:pPr algn="ctr"/>
-            <a:r>
-              <a:rPr lang="en-US" sz="1200" dirty="0" smtClean="0"/>
-              <a:t>Paddle 2 Y Next</a:t>
-            </a:r>
-            <a:endParaRPr lang="en-US" sz="1200" dirty="0"/>
-          </a:p>
-        </p:txBody>
-      </p:sp>
+      </p:pic>
     </p:spTree>
     <p:extLst>
       <p:ext uri="{BB962C8B-B14F-4D97-AF65-F5344CB8AC3E}">
-        <p14:creationId xmlns:p14="http://schemas.microsoft.com/office/powerpoint/2010/main" val="362923051"/>
+        <p14:creationId xmlns:p14="http://schemas.microsoft.com/office/powerpoint/2010/main" val="150366468"/>
       </p:ext>
     </p:extLst>
   </p:cSld>
   <p:clrMapOvr>
     <a:masterClrMapping/>
   </p:clrMapOvr>
-  <p:timing>
-    <p:tnLst>
-      <p:par>
-        <p:cTn id="1" dur="indefinite" restart="never" nodeType="tmRoot"/>
-      </p:par>
-    </p:tnLst>
-  </p:timing>
 </p:sld>
 </file>
 
@@ -14806,11 +13091,7 @@
           <a:p>
             <a:r>
               <a:rPr lang="en-US" dirty="0" smtClean="0"/>
-              <a:t>Successful scaling of ball and paddles</a:t>
-            </a:r>
-            <a:r>
-              <a:rPr lang="en-US" dirty="0" smtClean="0"/>
-              <a:t>.</a:t>
+              <a:t>Successful scaling of ball and paddles.</a:t>
             </a:r>
           </a:p>
           <a:p>
@@ -14950,7 +13231,6 @@
               <a:rPr lang="en-US" dirty="0" smtClean="0"/>
               <a:t>Reaching some of our other stretch goals such as utilizing the attachable joysticks.</a:t>
             </a:r>
-            <a:endParaRPr lang="en-US" dirty="0" smtClean="0"/>
           </a:p>
           <a:p>
             <a:pPr marL="0" indent="0">

</xml_diff>